<commit_message>
error in running loop starting at line 241
Error in ct_set$Ct[threshold.ct_index] : invalid subscript type 'list'
>
I think this is from line 254?
</commit_message>
<xml_diff>
--- a/holmes_groupmeeting_12-4.pptx
+++ b/holmes_groupmeeting_12-4.pptx
@@ -5,12 +5,13 @@
     <p:sldMasterId id="2147483648" r:id="rId1"/>
   </p:sldMasterIdLst>
   <p:notesMasterIdLst>
-    <p:notesMasterId r:id="rId5"/>
+    <p:notesMasterId r:id="rId6"/>
   </p:notesMasterIdLst>
   <p:sldIdLst>
     <p:sldId id="256" r:id="rId2"/>
     <p:sldId id="257" r:id="rId3"/>
     <p:sldId id="258" r:id="rId4"/>
+    <p:sldId id="259" r:id="rId5"/>
   </p:sldIdLst>
   <p:sldSz cx="12192000" cy="6858000"/>
   <p:notesSz cx="6858000" cy="9144000"/>
@@ -506,6 +507,107 @@
           <a:lstStyle/>
           <a:p>
             <a:r>
+              <a:rPr lang="en-US" dirty="0"/>
+              <a:t>Is this just showing the same thing as the other figure, with the line / panel swapped?</a:t>
+            </a:r>
+          </a:p>
+        </p:txBody>
+      </p:sp>
+      <p:sp>
+        <p:nvSpPr>
+          <p:cNvPr id="4" name="Slide Number Placeholder 3"/>
+          <p:cNvSpPr>
+            <a:spLocks noGrp="1"/>
+          </p:cNvSpPr>
+          <p:nvPr>
+            <p:ph type="sldNum" sz="quarter" idx="5"/>
+          </p:nvPr>
+        </p:nvSpPr>
+        <p:spPr/>
+        <p:txBody>
+          <a:bodyPr/>
+          <a:lstStyle/>
+          <a:p>
+            <a:fld id="{979C91EE-241E-744B-9BE8-C0788DCF3837}" type="slidenum">
+              <a:rPr lang="en-US" smtClean="0"/>
+              <a:t>2</a:t>
+            </a:fld>
+            <a:endParaRPr lang="en-US"/>
+          </a:p>
+        </p:txBody>
+      </p:sp>
+    </p:spTree>
+    <p:extLst>
+      <p:ext uri="{BB962C8B-B14F-4D97-AF65-F5344CB8AC3E}">
+        <p14:creationId xmlns:p14="http://schemas.microsoft.com/office/powerpoint/2010/main" val="2620872402"/>
+      </p:ext>
+    </p:extLst>
+  </p:cSld>
+  <p:clrMapOvr>
+    <a:masterClrMapping/>
+  </p:clrMapOvr>
+</p:notes>
+</file>
+
+<file path=ppt/notesSlides/notesSlide2.xml><?xml version="1.0" encoding="utf-8"?>
+<p:notes xmlns:a="http://schemas.openxmlformats.org/drawingml/2006/main" xmlns:r="http://schemas.openxmlformats.org/officeDocument/2006/relationships" xmlns:p="http://schemas.openxmlformats.org/presentationml/2006/main">
+  <p:cSld>
+    <p:spTree>
+      <p:nvGrpSpPr>
+        <p:cNvPr id="1" name=""/>
+        <p:cNvGrpSpPr/>
+        <p:nvPr/>
+      </p:nvGrpSpPr>
+      <p:grpSpPr>
+        <a:xfrm>
+          <a:off x="0" y="0"/>
+          <a:ext cx="0" cy="0"/>
+          <a:chOff x="0" y="0"/>
+          <a:chExt cx="0" cy="0"/>
+        </a:xfrm>
+      </p:grpSpPr>
+      <p:sp>
+        <p:nvSpPr>
+          <p:cNvPr id="2" name="Slide Image Placeholder 1"/>
+          <p:cNvSpPr>
+            <a:spLocks noGrp="1" noRot="1" noChangeAspect="1"/>
+          </p:cNvSpPr>
+          <p:nvPr>
+            <p:ph type="sldImg"/>
+          </p:nvPr>
+        </p:nvSpPr>
+        <p:spPr/>
+      </p:sp>
+      <p:sp>
+        <p:nvSpPr>
+          <p:cNvPr id="3" name="Notes Placeholder 2"/>
+          <p:cNvSpPr>
+            <a:spLocks noGrp="1"/>
+          </p:cNvSpPr>
+          <p:nvPr>
+            <p:ph type="body" idx="1"/>
+          </p:nvPr>
+        </p:nvSpPr>
+        <p:spPr/>
+        <p:txBody>
+          <a:bodyPr/>
+          <a:lstStyle/>
+          <a:p>
+            <a:r>
+              <a:rPr lang="en-US" sz="1200" dirty="0"/>
+              <a:t>Vary proportion of population w/ Ct &gt; </a:t>
+            </a:r>
+            <a:r>
+              <a:rPr lang="en-US" sz="1200" dirty="0" err="1"/>
+              <a:t>LoD</a:t>
+            </a:r>
+            <a:r>
+              <a:rPr lang="en-US" sz="1200" dirty="0"/>
+              <a:t>, proportion of tests positive, and pool size</a:t>
+            </a:r>
+          </a:p>
+          <a:p>
+            <a:r>
               <a:rPr lang="en-US" sz="1200" dirty="0"/>
               <a:t>(assay analytic sensitivity = constant)</a:t>
             </a:r>
@@ -743,7 +845,287 @@
                 <a:ea typeface="+mn-ea"/>
                 <a:cs typeface="+mn-cs"/>
               </a:rPr>
-              <a:t>Comparing uncorrelated and correlated: don’t have a </a:t>
+              <a:t>Comparing uncorrelated and correlated: don’t have a consistent trend??</a:t>
+            </a:r>
+            <a:endParaRPr lang="en-US" dirty="0"/>
+          </a:p>
+          <a:p>
+            <a:endParaRPr lang="en-US" dirty="0"/>
+          </a:p>
+          <a:p>
+            <a:r>
+              <a:rPr lang="en-US" dirty="0"/>
+              <a:t>COMPARING WITHIN A GIVEN PANEL</a:t>
+            </a:r>
+          </a:p>
+          <a:p>
+            <a:r>
+              <a:rPr lang="en-US" dirty="0"/>
+              <a:t>At a given sensitivity and proportion of samples with Ct&gt;</a:t>
+            </a:r>
+            <a:r>
+              <a:rPr lang="en-US" dirty="0" err="1"/>
+              <a:t>LoD</a:t>
+            </a:r>
+            <a:r>
+              <a:rPr lang="en-US" dirty="0"/>
+              <a:t>, greater proportion of tests positive increases PPA</a:t>
+            </a:r>
+          </a:p>
+        </p:txBody>
+      </p:sp>
+      <p:sp>
+        <p:nvSpPr>
+          <p:cNvPr id="4" name="Slide Number Placeholder 3"/>
+          <p:cNvSpPr>
+            <a:spLocks noGrp="1"/>
+          </p:cNvSpPr>
+          <p:nvPr>
+            <p:ph type="sldNum" sz="quarter" idx="5"/>
+          </p:nvPr>
+        </p:nvSpPr>
+        <p:spPr/>
+        <p:txBody>
+          <a:bodyPr/>
+          <a:lstStyle/>
+          <a:p>
+            <a:fld id="{979C91EE-241E-744B-9BE8-C0788DCF3837}" type="slidenum">
+              <a:rPr lang="en-US" smtClean="0"/>
+              <a:t>3</a:t>
+            </a:fld>
+            <a:endParaRPr lang="en-US"/>
+          </a:p>
+        </p:txBody>
+      </p:sp>
+    </p:spTree>
+    <p:extLst>
+      <p:ext uri="{BB962C8B-B14F-4D97-AF65-F5344CB8AC3E}">
+        <p14:creationId xmlns:p14="http://schemas.microsoft.com/office/powerpoint/2010/main" val="3070357843"/>
+      </p:ext>
+    </p:extLst>
+  </p:cSld>
+  <p:clrMapOvr>
+    <a:masterClrMapping/>
+  </p:clrMapOvr>
+</p:notes>
+</file>
+
+<file path=ppt/notesSlides/notesSlide3.xml><?xml version="1.0" encoding="utf-8"?>
+<p:notes xmlns:a="http://schemas.openxmlformats.org/drawingml/2006/main" xmlns:r="http://schemas.openxmlformats.org/officeDocument/2006/relationships" xmlns:p="http://schemas.openxmlformats.org/presentationml/2006/main">
+  <p:cSld>
+    <p:spTree>
+      <p:nvGrpSpPr>
+        <p:cNvPr id="1" name=""/>
+        <p:cNvGrpSpPr/>
+        <p:nvPr/>
+      </p:nvGrpSpPr>
+      <p:grpSpPr>
+        <a:xfrm>
+          <a:off x="0" y="0"/>
+          <a:ext cx="0" cy="0"/>
+          <a:chOff x="0" y="0"/>
+          <a:chExt cx="0" cy="0"/>
+        </a:xfrm>
+      </p:grpSpPr>
+      <p:sp>
+        <p:nvSpPr>
+          <p:cNvPr id="2" name="Slide Image Placeholder 1"/>
+          <p:cNvSpPr>
+            <a:spLocks noGrp="1" noRot="1" noChangeAspect="1"/>
+          </p:cNvSpPr>
+          <p:nvPr>
+            <p:ph type="sldImg"/>
+          </p:nvPr>
+        </p:nvSpPr>
+        <p:spPr/>
+      </p:sp>
+      <p:sp>
+        <p:nvSpPr>
+          <p:cNvPr id="3" name="Notes Placeholder 2"/>
+          <p:cNvSpPr>
+            <a:spLocks noGrp="1"/>
+          </p:cNvSpPr>
+          <p:nvPr>
+            <p:ph type="body" idx="1"/>
+          </p:nvPr>
+        </p:nvSpPr>
+        <p:spPr/>
+        <p:txBody>
+          <a:bodyPr/>
+          <a:lstStyle/>
+          <a:p>
+            <a:r>
+              <a:rPr lang="en-US" sz="1200" dirty="0"/>
+              <a:t>Vary proportion of population w/ Ct &gt; </a:t>
+            </a:r>
+            <a:r>
+              <a:rPr lang="en-US" sz="1200" dirty="0" err="1"/>
+              <a:t>LoD</a:t>
+            </a:r>
+            <a:r>
+              <a:rPr lang="en-US" sz="1200" dirty="0"/>
+              <a:t>, proportion of tests positive, and pool size</a:t>
+            </a:r>
+          </a:p>
+          <a:p>
+            <a:r>
+              <a:rPr lang="en-US" sz="1200" dirty="0"/>
+              <a:t>(assay analytic sensitivity = constant)</a:t>
+            </a:r>
+            <a:endParaRPr lang="en-US" sz="1200" kern="1200" dirty="0">
+              <a:solidFill>
+                <a:schemeClr val="tx1"/>
+              </a:solidFill>
+              <a:effectLst/>
+              <a:latin typeface="+mn-lt"/>
+              <a:ea typeface="+mn-ea"/>
+              <a:cs typeface="+mn-cs"/>
+            </a:endParaRPr>
+          </a:p>
+          <a:p>
+            <a:pPr marL="0" marR="0" lvl="0" indent="0" algn="l" defTabSz="914400" rtl="0" eaLnBrk="1" fontAlgn="auto" latinLnBrk="0" hangingPunct="1">
+              <a:lnSpc>
+                <a:spcPct val="100000"/>
+              </a:lnSpc>
+              <a:spcBef>
+                <a:spcPts val="0"/>
+              </a:spcBef>
+              <a:spcAft>
+                <a:spcPts val="0"/>
+              </a:spcAft>
+              <a:buClrTx/>
+              <a:buSzTx/>
+              <a:buFontTx/>
+              <a:buNone/>
+              <a:tabLst/>
+              <a:defRPr/>
+            </a:pPr>
+            <a:endParaRPr lang="en-US" sz="1200" kern="1200" dirty="0">
+              <a:solidFill>
+                <a:schemeClr val="tx1"/>
+              </a:solidFill>
+              <a:effectLst/>
+              <a:latin typeface="+mn-lt"/>
+              <a:ea typeface="+mn-ea"/>
+              <a:cs typeface="+mn-cs"/>
+            </a:endParaRPr>
+          </a:p>
+          <a:p>
+            <a:pPr marL="171450" marR="0" lvl="0" indent="-171450" algn="l" defTabSz="914400" rtl="0" eaLnBrk="1" fontAlgn="auto" latinLnBrk="0" hangingPunct="1">
+              <a:lnSpc>
+                <a:spcPct val="100000"/>
+              </a:lnSpc>
+              <a:spcBef>
+                <a:spcPts val="0"/>
+              </a:spcBef>
+              <a:spcAft>
+                <a:spcPts val="0"/>
+              </a:spcAft>
+              <a:buClrTx/>
+              <a:buSzTx/>
+              <a:buFont typeface="Arial" panose="020B0604020202020204" pitchFamily="34" charset="0"/>
+              <a:buChar char="•"/>
+              <a:tabLst/>
+              <a:defRPr/>
+            </a:pPr>
+            <a:r>
+              <a:rPr lang="en-US" sz="1200" kern="1200" dirty="0">
+                <a:solidFill>
+                  <a:schemeClr val="tx1"/>
+                </a:solidFill>
+                <a:effectLst/>
+                <a:latin typeface="+mn-lt"/>
+                <a:ea typeface="+mn-ea"/>
+                <a:cs typeface="+mn-cs"/>
+              </a:rPr>
+              <a:t>Expected tests per sample using a 2-stage pooled testing design (if a group tests positive, every individual is re-tested)</a:t>
+            </a:r>
+          </a:p>
+          <a:p>
+            <a:pPr marL="171450" marR="0" lvl="0" indent="-171450" algn="l" defTabSz="914400" rtl="0" eaLnBrk="1" fontAlgn="auto" latinLnBrk="0" hangingPunct="1">
+              <a:lnSpc>
+                <a:spcPct val="100000"/>
+              </a:lnSpc>
+              <a:spcBef>
+                <a:spcPts val="0"/>
+              </a:spcBef>
+              <a:spcAft>
+                <a:spcPts val="0"/>
+              </a:spcAft>
+              <a:buClrTx/>
+              <a:buSzTx/>
+              <a:buFont typeface="Arial" panose="020B0604020202020204" pitchFamily="34" charset="0"/>
+              <a:buChar char="•"/>
+              <a:tabLst/>
+              <a:defRPr/>
+            </a:pPr>
+            <a:endParaRPr lang="en-US" sz="1200" kern="1200" dirty="0">
+              <a:solidFill>
+                <a:schemeClr val="tx1"/>
+              </a:solidFill>
+              <a:effectLst/>
+              <a:latin typeface="+mn-lt"/>
+              <a:ea typeface="+mn-ea"/>
+              <a:cs typeface="+mn-cs"/>
+            </a:endParaRPr>
+          </a:p>
+          <a:p>
+            <a:pPr marL="171450" marR="0" lvl="0" indent="-171450" algn="l" defTabSz="914400" rtl="0" eaLnBrk="1" fontAlgn="auto" latinLnBrk="0" hangingPunct="1">
+              <a:lnSpc>
+                <a:spcPct val="100000"/>
+              </a:lnSpc>
+              <a:spcBef>
+                <a:spcPts val="0"/>
+              </a:spcBef>
+              <a:spcAft>
+                <a:spcPts val="0"/>
+              </a:spcAft>
+              <a:buClrTx/>
+              <a:buSzTx/>
+              <a:buFont typeface="Arial" panose="020B0604020202020204" pitchFamily="34" charset="0"/>
+              <a:buChar char="•"/>
+              <a:tabLst/>
+              <a:defRPr/>
+            </a:pPr>
+            <a:endParaRPr lang="en-US" sz="1200" kern="1200" dirty="0">
+              <a:solidFill>
+                <a:schemeClr val="tx1"/>
+              </a:solidFill>
+              <a:effectLst/>
+              <a:latin typeface="+mn-lt"/>
+              <a:ea typeface="+mn-ea"/>
+              <a:cs typeface="+mn-cs"/>
+            </a:endParaRPr>
+          </a:p>
+          <a:p>
+            <a:pPr marL="0" marR="0" lvl="0" indent="0" algn="l" defTabSz="914400" rtl="0" eaLnBrk="1" fontAlgn="auto" latinLnBrk="0" hangingPunct="1">
+              <a:lnSpc>
+                <a:spcPct val="100000"/>
+              </a:lnSpc>
+              <a:spcBef>
+                <a:spcPts val="0"/>
+              </a:spcBef>
+              <a:spcAft>
+                <a:spcPts val="0"/>
+              </a:spcAft>
+              <a:buClrTx/>
+              <a:buSzTx/>
+              <a:buFontTx/>
+              <a:buNone/>
+              <a:tabLst/>
+              <a:defRPr/>
+            </a:pPr>
+            <a:r>
+              <a:rPr lang="en-US" sz="1200" kern="1200" dirty="0">
+                <a:solidFill>
+                  <a:schemeClr val="tx1"/>
+                </a:solidFill>
+                <a:effectLst/>
+                <a:latin typeface="+mn-lt"/>
+                <a:ea typeface="+mn-ea"/>
+                <a:cs typeface="+mn-cs"/>
+              </a:rPr>
+              <a:t>Average expected tests per sample is almost entirely determined by pool size </a:t>
             </a:r>
             <a:r>
               <a:rPr lang="en-US" sz="1200" kern="1200">
@@ -755,32 +1137,9 @@
                 <a:ea typeface="+mn-ea"/>
                 <a:cs typeface="+mn-cs"/>
               </a:rPr>
-              <a:t>consistent trend??</a:t>
+              <a:t>and prevalence</a:t>
             </a:r>
             <a:endParaRPr lang="en-US" dirty="0"/>
-          </a:p>
-          <a:p>
-            <a:endParaRPr lang="en-US" dirty="0"/>
-          </a:p>
-          <a:p>
-            <a:r>
-              <a:rPr lang="en-US" dirty="0"/>
-              <a:t>COMPARING WITHIN A GIVEN PANEL</a:t>
-            </a:r>
-          </a:p>
-          <a:p>
-            <a:r>
-              <a:rPr lang="en-US" dirty="0"/>
-              <a:t>At a given sensitivity and proportion of samples with Ct&gt;</a:t>
-            </a:r>
-            <a:r>
-              <a:rPr lang="en-US" dirty="0" err="1"/>
-              <a:t>LoD</a:t>
-            </a:r>
-            <a:r>
-              <a:rPr lang="en-US" dirty="0"/>
-              <a:t>, greater proportion of tests positive increases PPA</a:t>
-            </a:r>
           </a:p>
         </p:txBody>
       </p:sp>
@@ -801,7 +1160,7 @@
           <a:p>
             <a:fld id="{979C91EE-241E-744B-9BE8-C0788DCF3837}" type="slidenum">
               <a:rPr lang="en-US" smtClean="0"/>
-              <a:t>3</a:t>
+              <a:t>4</a:t>
             </a:fld>
             <a:endParaRPr lang="en-US"/>
           </a:p>
@@ -810,7 +1169,7 @@
     </p:spTree>
     <p:extLst>
       <p:ext uri="{BB962C8B-B14F-4D97-AF65-F5344CB8AC3E}">
-        <p14:creationId xmlns:p14="http://schemas.microsoft.com/office/powerpoint/2010/main" val="3070357843"/>
+        <p14:creationId xmlns:p14="http://schemas.microsoft.com/office/powerpoint/2010/main" val="3357749785"/>
       </p:ext>
     </p:extLst>
   </p:cSld>
@@ -4156,7 +4515,7 @@
           </p:nvPr>
         </p:nvPicPr>
         <p:blipFill>
-          <a:blip r:embed="rId2"/>
+          <a:blip r:embed="rId3"/>
           <a:stretch>
             <a:fillRect/>
           </a:stretch>
@@ -4228,13 +4587,16 @@
           <a:p>
             <a:r>
               <a:rPr lang="en-US" sz="3000" dirty="0"/>
-              <a:t>Vary proportion of population w/ Ct &gt; </a:t>
+              <a:t>Expected PPA as function of pool size, proportion Ct&gt;</a:t>
             </a:r>
             <a:r>
               <a:rPr lang="en-US" sz="3000" dirty="0" err="1"/>
               <a:t>LoD</a:t>
             </a:r>
-            <a:endParaRPr lang="en-US" sz="3000" dirty="0"/>
+            <a:r>
+              <a:rPr lang="en-US" sz="3000" dirty="0"/>
+              <a:t>, proportion of tests positive</a:t>
+            </a:r>
           </a:p>
         </p:txBody>
       </p:sp>
@@ -4271,6 +4633,108 @@
     <p:extLst>
       <p:ext uri="{BB962C8B-B14F-4D97-AF65-F5344CB8AC3E}">
         <p14:creationId xmlns:p14="http://schemas.microsoft.com/office/powerpoint/2010/main" val="3349247749"/>
+      </p:ext>
+    </p:extLst>
+  </p:cSld>
+  <p:clrMapOvr>
+    <a:masterClrMapping/>
+  </p:clrMapOvr>
+</p:sld>
+</file>
+
+<file path=ppt/slides/slide4.xml><?xml version="1.0" encoding="utf-8"?>
+<p:sld xmlns:a="http://schemas.openxmlformats.org/drawingml/2006/main" xmlns:r="http://schemas.openxmlformats.org/officeDocument/2006/relationships" xmlns:p="http://schemas.openxmlformats.org/presentationml/2006/main">
+  <p:cSld>
+    <p:spTree>
+      <p:nvGrpSpPr>
+        <p:cNvPr id="1" name=""/>
+        <p:cNvGrpSpPr/>
+        <p:nvPr/>
+      </p:nvGrpSpPr>
+      <p:grpSpPr>
+        <a:xfrm>
+          <a:off x="0" y="0"/>
+          <a:ext cx="0" cy="0"/>
+          <a:chOff x="0" y="0"/>
+          <a:chExt cx="0" cy="0"/>
+        </a:xfrm>
+      </p:grpSpPr>
+      <p:sp>
+        <p:nvSpPr>
+          <p:cNvPr id="2" name="Title 1">
+            <a:extLst>
+              <a:ext uri="{FF2B5EF4-FFF2-40B4-BE49-F238E27FC236}">
+                <a16:creationId xmlns:a16="http://schemas.microsoft.com/office/drawing/2014/main" id="{69AA7B9F-BCD5-3F4C-9DA7-97ACDCA6ED24}"/>
+              </a:ext>
+            </a:extLst>
+          </p:cNvPr>
+          <p:cNvSpPr>
+            <a:spLocks noGrp="1"/>
+          </p:cNvSpPr>
+          <p:nvPr>
+            <p:ph type="title"/>
+          </p:nvPr>
+        </p:nvSpPr>
+        <p:spPr>
+          <a:xfrm>
+            <a:off x="201593" y="168356"/>
+            <a:ext cx="10515600" cy="1325563"/>
+          </a:xfrm>
+        </p:spPr>
+        <p:txBody>
+          <a:bodyPr>
+            <a:normAutofit fontScale="90000"/>
+          </a:bodyPr>
+          <a:lstStyle/>
+          <a:p>
+            <a:r>
+              <a:rPr lang="en-US" dirty="0"/>
+              <a:t>Expected tests per sample as function of pool size, proportion Ct&gt;</a:t>
+            </a:r>
+            <a:r>
+              <a:rPr lang="en-US" dirty="0" err="1"/>
+              <a:t>LoD</a:t>
+            </a:r>
+            <a:r>
+              <a:rPr lang="en-US" dirty="0"/>
+              <a:t>, proportion of tests positive</a:t>
+            </a:r>
+          </a:p>
+        </p:txBody>
+      </p:sp>
+      <p:pic>
+        <p:nvPicPr>
+          <p:cNvPr id="5" name="Content Placeholder 4">
+            <a:extLst>
+              <a:ext uri="{FF2B5EF4-FFF2-40B4-BE49-F238E27FC236}">
+                <a16:creationId xmlns:a16="http://schemas.microsoft.com/office/drawing/2014/main" id="{69C61B70-EFF4-7947-8C7B-35FB47A0F37E}"/>
+              </a:ext>
+            </a:extLst>
+          </p:cNvPr>
+          <p:cNvPicPr>
+            <a:picLocks noGrp="1" noChangeAspect="1"/>
+          </p:cNvPicPr>
+          <p:nvPr>
+            <p:ph idx="1"/>
+          </p:nvPr>
+        </p:nvPicPr>
+        <p:blipFill>
+          <a:blip r:embed="rId3"/>
+          <a:stretch>
+            <a:fillRect/>
+          </a:stretch>
+        </p:blipFill>
+        <p:spPr>
+          <a:xfrm>
+            <a:off x="2614930" y="1825625"/>
+            <a:ext cx="6962140" cy="4351338"/>
+          </a:xfrm>
+        </p:spPr>
+      </p:pic>
+    </p:spTree>
+    <p:extLst>
+      <p:ext uri="{BB962C8B-B14F-4D97-AF65-F5344CB8AC3E}">
+        <p14:creationId xmlns:p14="http://schemas.microsoft.com/office/powerpoint/2010/main" val="3577100395"/>
       </p:ext>
     </p:extLst>
   </p:cSld>

</xml_diff>

<commit_message>
useful papers on correlated samples
</commit_message>
<xml_diff>
--- a/holmes_groupmeeting_12-4.pptx
+++ b/holmes_groupmeeting_12-4.pptx
@@ -2,16 +2,19 @@
 <file path=ppt/presentation.xml><?xml version="1.0" encoding="utf-8"?>
 <p:presentation xmlns:a="http://schemas.openxmlformats.org/drawingml/2006/main" xmlns:r="http://schemas.openxmlformats.org/officeDocument/2006/relationships" xmlns:p="http://schemas.openxmlformats.org/presentationml/2006/main" saveSubsetFonts="1" autoCompressPictures="0">
   <p:sldMasterIdLst>
-    <p:sldMasterId id="2147483648" r:id="rId1"/>
+    <p:sldMasterId id="2147483684" r:id="rId1"/>
   </p:sldMasterIdLst>
   <p:notesMasterIdLst>
-    <p:notesMasterId r:id="rId6"/>
+    <p:notesMasterId r:id="rId9"/>
   </p:notesMasterIdLst>
   <p:sldIdLst>
     <p:sldId id="256" r:id="rId2"/>
-    <p:sldId id="257" r:id="rId3"/>
-    <p:sldId id="258" r:id="rId4"/>
-    <p:sldId id="259" r:id="rId5"/>
+    <p:sldId id="262" r:id="rId3"/>
+    <p:sldId id="260" r:id="rId4"/>
+    <p:sldId id="261" r:id="rId5"/>
+    <p:sldId id="257" r:id="rId6"/>
+    <p:sldId id="258" r:id="rId7"/>
+    <p:sldId id="259" r:id="rId8"/>
   </p:sldIdLst>
   <p:sldSz cx="12192000" cy="6858000"/>
   <p:notesSz cx="6858000" cy="9144000"/>
@@ -19,7 +22,7 @@
     <a:defPPr>
       <a:defRPr lang="en-US"/>
     </a:defPPr>
-    <a:lvl1pPr marL="0" algn="l" defTabSz="914400" rtl="0" eaLnBrk="1" latinLnBrk="0" hangingPunct="1">
+    <a:lvl1pPr marL="0" algn="l" defTabSz="457200" rtl="0" eaLnBrk="1" latinLnBrk="0" hangingPunct="1">
       <a:defRPr sz="1800" kern="1200">
         <a:solidFill>
           <a:schemeClr val="tx1"/>
@@ -29,7 +32,7 @@
         <a:cs typeface="+mn-cs"/>
       </a:defRPr>
     </a:lvl1pPr>
-    <a:lvl2pPr marL="457200" algn="l" defTabSz="914400" rtl="0" eaLnBrk="1" latinLnBrk="0" hangingPunct="1">
+    <a:lvl2pPr marL="457200" algn="l" defTabSz="457200" rtl="0" eaLnBrk="1" latinLnBrk="0" hangingPunct="1">
       <a:defRPr sz="1800" kern="1200">
         <a:solidFill>
           <a:schemeClr val="tx1"/>
@@ -39,7 +42,7 @@
         <a:cs typeface="+mn-cs"/>
       </a:defRPr>
     </a:lvl2pPr>
-    <a:lvl3pPr marL="914400" algn="l" defTabSz="914400" rtl="0" eaLnBrk="1" latinLnBrk="0" hangingPunct="1">
+    <a:lvl3pPr marL="914400" algn="l" defTabSz="457200" rtl="0" eaLnBrk="1" latinLnBrk="0" hangingPunct="1">
       <a:defRPr sz="1800" kern="1200">
         <a:solidFill>
           <a:schemeClr val="tx1"/>
@@ -49,7 +52,7 @@
         <a:cs typeface="+mn-cs"/>
       </a:defRPr>
     </a:lvl3pPr>
-    <a:lvl4pPr marL="1371600" algn="l" defTabSz="914400" rtl="0" eaLnBrk="1" latinLnBrk="0" hangingPunct="1">
+    <a:lvl4pPr marL="1371600" algn="l" defTabSz="457200" rtl="0" eaLnBrk="1" latinLnBrk="0" hangingPunct="1">
       <a:defRPr sz="1800" kern="1200">
         <a:solidFill>
           <a:schemeClr val="tx1"/>
@@ -59,7 +62,7 @@
         <a:cs typeface="+mn-cs"/>
       </a:defRPr>
     </a:lvl4pPr>
-    <a:lvl5pPr marL="1828800" algn="l" defTabSz="914400" rtl="0" eaLnBrk="1" latinLnBrk="0" hangingPunct="1">
+    <a:lvl5pPr marL="1828800" algn="l" defTabSz="457200" rtl="0" eaLnBrk="1" latinLnBrk="0" hangingPunct="1">
       <a:defRPr sz="1800" kern="1200">
         <a:solidFill>
           <a:schemeClr val="tx1"/>
@@ -69,7 +72,7 @@
         <a:cs typeface="+mn-cs"/>
       </a:defRPr>
     </a:lvl5pPr>
-    <a:lvl6pPr marL="2286000" algn="l" defTabSz="914400" rtl="0" eaLnBrk="1" latinLnBrk="0" hangingPunct="1">
+    <a:lvl6pPr marL="2286000" algn="l" defTabSz="457200" rtl="0" eaLnBrk="1" latinLnBrk="0" hangingPunct="1">
       <a:defRPr sz="1800" kern="1200">
         <a:solidFill>
           <a:schemeClr val="tx1"/>
@@ -79,7 +82,7 @@
         <a:cs typeface="+mn-cs"/>
       </a:defRPr>
     </a:lvl6pPr>
-    <a:lvl7pPr marL="2743200" algn="l" defTabSz="914400" rtl="0" eaLnBrk="1" latinLnBrk="0" hangingPunct="1">
+    <a:lvl7pPr marL="2743200" algn="l" defTabSz="457200" rtl="0" eaLnBrk="1" latinLnBrk="0" hangingPunct="1">
       <a:defRPr sz="1800" kern="1200">
         <a:solidFill>
           <a:schemeClr val="tx1"/>
@@ -89,7 +92,7 @@
         <a:cs typeface="+mn-cs"/>
       </a:defRPr>
     </a:lvl7pPr>
-    <a:lvl8pPr marL="3200400" algn="l" defTabSz="914400" rtl="0" eaLnBrk="1" latinLnBrk="0" hangingPunct="1">
+    <a:lvl8pPr marL="3200400" algn="l" defTabSz="457200" rtl="0" eaLnBrk="1" latinLnBrk="0" hangingPunct="1">
       <a:defRPr sz="1800" kern="1200">
         <a:solidFill>
           <a:schemeClr val="tx1"/>
@@ -99,7 +102,7 @@
         <a:cs typeface="+mn-cs"/>
       </a:defRPr>
     </a:lvl8pPr>
-    <a:lvl9pPr marL="3657600" algn="l" defTabSz="914400" rtl="0" eaLnBrk="1" latinLnBrk="0" hangingPunct="1">
+    <a:lvl9pPr marL="3657600" algn="l" defTabSz="457200" rtl="0" eaLnBrk="1" latinLnBrk="0" hangingPunct="1">
       <a:defRPr sz="1800" kern="1200">
         <a:solidFill>
           <a:schemeClr val="tx1"/>
@@ -506,10 +509,30 @@
           <a:bodyPr/>
           <a:lstStyle/>
           <a:p>
+            <a:pPr marL="0" marR="0" lvl="0" indent="0" algn="l" defTabSz="914400" rtl="0" eaLnBrk="1" fontAlgn="auto" latinLnBrk="0" hangingPunct="1">
+              <a:lnSpc>
+                <a:spcPct val="100000"/>
+              </a:lnSpc>
+              <a:spcBef>
+                <a:spcPts val="0"/>
+              </a:spcBef>
+              <a:spcAft>
+                <a:spcPts val="0"/>
+              </a:spcAft>
+              <a:buClrTx/>
+              <a:buSzTx/>
+              <a:buFontTx/>
+              <a:buNone/>
+              <a:tabLst/>
+              <a:defRPr/>
+            </a:pPr>
             <a:r>
               <a:rPr lang="en-US" dirty="0"/>
-              <a:t>Is this just showing the same thing as the other figure, with the line / panel swapped?</a:t>
-            </a:r>
+              <a:t> A test that registers a positive result after 12 rounds, for a CT value of 12, starts out with more than 10 million times as much viral genetic material as a sample with a CT value of 35)</a:t>
+            </a:r>
+          </a:p>
+          <a:p>
+            <a:endParaRPr lang="en-US" dirty="0"/>
           </a:p>
         </p:txBody>
       </p:sp>
@@ -530,7 +553,7 @@
           <a:p>
             <a:fld id="{979C91EE-241E-744B-9BE8-C0788DCF3837}" type="slidenum">
               <a:rPr lang="en-US" smtClean="0"/>
-              <a:t>2</a:t>
+              <a:t>3</a:t>
             </a:fld>
             <a:endParaRPr lang="en-US"/>
           </a:p>
@@ -539,7 +562,7 @@
     </p:spTree>
     <p:extLst>
       <p:ext uri="{BB962C8B-B14F-4D97-AF65-F5344CB8AC3E}">
-        <p14:creationId xmlns:p14="http://schemas.microsoft.com/office/powerpoint/2010/main" val="2620872402"/>
+        <p14:creationId xmlns:p14="http://schemas.microsoft.com/office/powerpoint/2010/main" val="3484873468"/>
       </p:ext>
     </p:extLst>
   </p:cSld>
@@ -594,282 +617,8 @@
           <a:lstStyle/>
           <a:p>
             <a:r>
-              <a:rPr lang="en-US" sz="1200" dirty="0"/>
-              <a:t>Vary proportion of population w/ Ct &gt; </a:t>
-            </a:r>
-            <a:r>
-              <a:rPr lang="en-US" sz="1200" dirty="0" err="1"/>
-              <a:t>LoD</a:t>
-            </a:r>
-            <a:r>
-              <a:rPr lang="en-US" sz="1200" dirty="0"/>
-              <a:t>, proportion of tests positive, and pool size</a:t>
-            </a:r>
-          </a:p>
-          <a:p>
-            <a:r>
-              <a:rPr lang="en-US" sz="1200" dirty="0"/>
-              <a:t>(assay analytic sensitivity = constant)</a:t>
-            </a:r>
-          </a:p>
-          <a:p>
-            <a:endParaRPr lang="en-US" sz="1200" kern="1200" dirty="0">
-              <a:solidFill>
-                <a:schemeClr val="tx1"/>
-              </a:solidFill>
-              <a:effectLst/>
-              <a:latin typeface="+mn-lt"/>
-              <a:ea typeface="+mn-ea"/>
-              <a:cs typeface="+mn-cs"/>
-            </a:endParaRPr>
-          </a:p>
-          <a:p>
-            <a:r>
-              <a:rPr lang="en-US" sz="1200" kern="1200" dirty="0">
-                <a:solidFill>
-                  <a:schemeClr val="tx1"/>
-                </a:solidFill>
-                <a:effectLst/>
-                <a:latin typeface="+mn-lt"/>
-                <a:ea typeface="+mn-ea"/>
-                <a:cs typeface="+mn-cs"/>
-              </a:rPr>
-              <a:t>COMPARING ACROSS PANELS</a:t>
-            </a:r>
-          </a:p>
-          <a:p>
-            <a:pPr marL="0" marR="0" lvl="0" indent="0" algn="l" defTabSz="914400" rtl="0" eaLnBrk="1" fontAlgn="auto" latinLnBrk="0" hangingPunct="1">
-              <a:lnSpc>
-                <a:spcPct val="100000"/>
-              </a:lnSpc>
-              <a:spcBef>
-                <a:spcPts val="0"/>
-              </a:spcBef>
-              <a:spcAft>
-                <a:spcPts val="0"/>
-              </a:spcAft>
-              <a:buClrTx/>
-              <a:buSzTx/>
-              <a:buFontTx/>
-              <a:buNone/>
-              <a:tabLst/>
-              <a:defRPr/>
-            </a:pPr>
-            <a:r>
-              <a:rPr lang="en-US" sz="1200" kern="1200" dirty="0">
-                <a:solidFill>
-                  <a:schemeClr val="tx1"/>
-                </a:solidFill>
-                <a:effectLst/>
-                <a:latin typeface="+mn-lt"/>
-                <a:ea typeface="+mn-ea"/>
-                <a:cs typeface="+mn-cs"/>
-              </a:rPr>
-              <a:t>Varying proportion of population w/ Ct &gt; </a:t>
-            </a:r>
-            <a:r>
-              <a:rPr lang="en-US" sz="1200" kern="1200" dirty="0" err="1">
-                <a:solidFill>
-                  <a:schemeClr val="tx1"/>
-                </a:solidFill>
-                <a:effectLst/>
-                <a:latin typeface="+mn-lt"/>
-                <a:ea typeface="+mn-ea"/>
-                <a:cs typeface="+mn-cs"/>
-              </a:rPr>
-              <a:t>LoD</a:t>
-            </a:r>
-            <a:r>
-              <a:rPr lang="en-US" sz="1200" kern="1200" dirty="0">
-                <a:solidFill>
-                  <a:schemeClr val="tx1"/>
-                </a:solidFill>
-                <a:effectLst/>
-                <a:latin typeface="+mn-lt"/>
-                <a:ea typeface="+mn-ea"/>
-                <a:cs typeface="+mn-cs"/>
-              </a:rPr>
-              <a:t> -&gt; compare across panels </a:t>
-            </a:r>
-          </a:p>
-          <a:p>
-            <a:r>
-              <a:rPr lang="en-US" sz="1200" kern="1200" dirty="0">
-                <a:solidFill>
-                  <a:schemeClr val="tx1"/>
-                </a:solidFill>
-                <a:effectLst/>
-                <a:latin typeface="+mn-lt"/>
-                <a:ea typeface="+mn-ea"/>
-                <a:cs typeface="+mn-cs"/>
-              </a:rPr>
-              <a:t>Increasing Ct means LESS viral load in a sample, so we expect that increasing Ct will make a test less sensitive (able to detect positive cases)</a:t>
-            </a:r>
-          </a:p>
-          <a:p>
-            <a:r>
-              <a:rPr lang="en-US" sz="1200" kern="1200" dirty="0">
-                <a:solidFill>
-                  <a:schemeClr val="tx1"/>
-                </a:solidFill>
-                <a:effectLst/>
-                <a:latin typeface="+mn-lt"/>
-                <a:ea typeface="+mn-ea"/>
-                <a:cs typeface="+mn-cs"/>
-              </a:rPr>
-              <a:t>UNCORRELATED DATA (dashed line): Increasing proportion of tested population with C</a:t>
-            </a:r>
-            <a:r>
-              <a:rPr lang="en-US" sz="1200" kern="1200" baseline="-25000" dirty="0">
-                <a:solidFill>
-                  <a:schemeClr val="tx1"/>
-                </a:solidFill>
-                <a:effectLst/>
-                <a:latin typeface="+mn-lt"/>
-                <a:ea typeface="+mn-ea"/>
-                <a:cs typeface="+mn-cs"/>
-              </a:rPr>
-              <a:t>t</a:t>
-            </a:r>
-            <a:r>
-              <a:rPr lang="en-US" sz="1200" kern="1200" dirty="0">
-                <a:solidFill>
-                  <a:schemeClr val="tx1"/>
-                </a:solidFill>
-                <a:effectLst/>
-                <a:latin typeface="+mn-lt"/>
-                <a:ea typeface="+mn-ea"/>
-                <a:cs typeface="+mn-cs"/>
-              </a:rPr>
-              <a:t> value  &gt;95% </a:t>
-            </a:r>
-            <a:r>
-              <a:rPr lang="en-US" sz="1200" kern="1200" dirty="0" err="1">
-                <a:solidFill>
-                  <a:schemeClr val="tx1"/>
-                </a:solidFill>
-                <a:effectLst/>
-                <a:latin typeface="+mn-lt"/>
-                <a:ea typeface="+mn-ea"/>
-                <a:cs typeface="+mn-cs"/>
-              </a:rPr>
-              <a:t>LoD</a:t>
-            </a:r>
-            <a:r>
-              <a:rPr lang="en-US" sz="1200" kern="1200" dirty="0">
-                <a:solidFill>
-                  <a:schemeClr val="tx1"/>
-                </a:solidFill>
-                <a:effectLst/>
-                <a:latin typeface="+mn-lt"/>
-                <a:ea typeface="+mn-ea"/>
-                <a:cs typeface="+mn-cs"/>
-              </a:rPr>
-              <a:t> -&gt; PPA decreases</a:t>
-            </a:r>
-          </a:p>
-          <a:p>
-            <a:r>
               <a:rPr lang="en-US" dirty="0"/>
-              <a:t>CORRELATED DATA (solid line): </a:t>
-            </a:r>
-            <a:r>
-              <a:rPr lang="en-US" sz="1200" kern="1200" dirty="0">
-                <a:solidFill>
-                  <a:schemeClr val="tx1"/>
-                </a:solidFill>
-                <a:effectLst/>
-                <a:latin typeface="+mn-lt"/>
-                <a:ea typeface="+mn-ea"/>
-                <a:cs typeface="+mn-cs"/>
-              </a:rPr>
-              <a:t>Increasing proportion of tested population with C</a:t>
-            </a:r>
-            <a:r>
-              <a:rPr lang="en-US" sz="1200" kern="1200" baseline="-25000" dirty="0">
-                <a:solidFill>
-                  <a:schemeClr val="tx1"/>
-                </a:solidFill>
-                <a:effectLst/>
-                <a:latin typeface="+mn-lt"/>
-                <a:ea typeface="+mn-ea"/>
-                <a:cs typeface="+mn-cs"/>
-              </a:rPr>
-              <a:t>t</a:t>
-            </a:r>
-            <a:r>
-              <a:rPr lang="en-US" sz="1200" kern="1200" dirty="0">
-                <a:solidFill>
-                  <a:schemeClr val="tx1"/>
-                </a:solidFill>
-                <a:effectLst/>
-                <a:latin typeface="+mn-lt"/>
-                <a:ea typeface="+mn-ea"/>
-                <a:cs typeface="+mn-cs"/>
-              </a:rPr>
-              <a:t> value  &gt;95% </a:t>
-            </a:r>
-            <a:r>
-              <a:rPr lang="en-US" sz="1200" kern="1200" dirty="0" err="1">
-                <a:solidFill>
-                  <a:schemeClr val="tx1"/>
-                </a:solidFill>
-                <a:effectLst/>
-                <a:latin typeface="+mn-lt"/>
-                <a:ea typeface="+mn-ea"/>
-                <a:cs typeface="+mn-cs"/>
-              </a:rPr>
-              <a:t>LoD</a:t>
-            </a:r>
-            <a:r>
-              <a:rPr lang="en-US" sz="1200" kern="1200" dirty="0">
-                <a:solidFill>
-                  <a:schemeClr val="tx1"/>
-                </a:solidFill>
-                <a:effectLst/>
-                <a:latin typeface="+mn-lt"/>
-                <a:ea typeface="+mn-ea"/>
-                <a:cs typeface="+mn-cs"/>
-              </a:rPr>
-              <a:t> -&gt; PPA decreases</a:t>
-            </a:r>
-          </a:p>
-          <a:p>
-            <a:r>
-              <a:rPr lang="en-US" sz="1200" kern="1200" dirty="0">
-                <a:solidFill>
-                  <a:schemeClr val="tx1"/>
-                </a:solidFill>
-                <a:effectLst/>
-                <a:latin typeface="+mn-lt"/>
-                <a:ea typeface="+mn-ea"/>
-                <a:cs typeface="+mn-cs"/>
-              </a:rPr>
-              <a:t>Comparing uncorrelated and correlated: don’t have a consistent trend??</a:t>
-            </a:r>
-            <a:endParaRPr lang="en-US" dirty="0"/>
-          </a:p>
-          <a:p>
-            <a:endParaRPr lang="en-US" dirty="0"/>
-          </a:p>
-          <a:p>
-            <a:r>
-              <a:rPr lang="en-US" dirty="0"/>
-              <a:t>COMPARING WITHIN A GIVEN PANEL</a:t>
-            </a:r>
-          </a:p>
-          <a:p>
-            <a:r>
-              <a:rPr lang="en-US" dirty="0"/>
-              <a:t>At a given sensitivity and proportion of samples with Ct&gt;</a:t>
-            </a:r>
-            <a:r>
-              <a:rPr lang="en-US" dirty="0" err="1"/>
-              <a:t>LoD</a:t>
-            </a:r>
-            <a:r>
-              <a:rPr lang="en-US" dirty="0"/>
-              <a:t>, greater proportion of tests positive increases PPA</a:t>
+              <a:t>Is this just showing the same thing as the other figure, with the line / panel swapped?</a:t>
             </a:r>
           </a:p>
         </p:txBody>
@@ -891,7 +640,7 @@
           <a:p>
             <a:fld id="{979C91EE-241E-744B-9BE8-C0788DCF3837}" type="slidenum">
               <a:rPr lang="en-US" smtClean="0"/>
-              <a:t>3</a:t>
+              <a:t>5</a:t>
             </a:fld>
             <a:endParaRPr lang="en-US"/>
           </a:p>
@@ -900,7 +649,7 @@
     </p:spTree>
     <p:extLst>
       <p:ext uri="{BB962C8B-B14F-4D97-AF65-F5344CB8AC3E}">
-        <p14:creationId xmlns:p14="http://schemas.microsoft.com/office/powerpoint/2010/main" val="3070357843"/>
+        <p14:creationId xmlns:p14="http://schemas.microsoft.com/office/powerpoint/2010/main" val="2620872402"/>
       </p:ext>
     </p:extLst>
   </p:cSld>
@@ -972,6 +721,367 @@
               <a:rPr lang="en-US" sz="1200" dirty="0"/>
               <a:t>(assay analytic sensitivity = constant)</a:t>
             </a:r>
+          </a:p>
+          <a:p>
+            <a:endParaRPr lang="en-US" sz="1200" kern="1200" dirty="0">
+              <a:solidFill>
+                <a:schemeClr val="tx1"/>
+              </a:solidFill>
+              <a:effectLst/>
+              <a:latin typeface="+mn-lt"/>
+              <a:ea typeface="+mn-ea"/>
+              <a:cs typeface="+mn-cs"/>
+            </a:endParaRPr>
+          </a:p>
+          <a:p>
+            <a:r>
+              <a:rPr lang="en-US" sz="1200" kern="1200" dirty="0">
+                <a:solidFill>
+                  <a:schemeClr val="tx1"/>
+                </a:solidFill>
+                <a:effectLst/>
+                <a:latin typeface="+mn-lt"/>
+                <a:ea typeface="+mn-ea"/>
+                <a:cs typeface="+mn-cs"/>
+              </a:rPr>
+              <a:t>COMPARING ACROSS PANELS</a:t>
+            </a:r>
+          </a:p>
+          <a:p>
+            <a:pPr marL="0" marR="0" lvl="0" indent="0" algn="l" defTabSz="914400" rtl="0" eaLnBrk="1" fontAlgn="auto" latinLnBrk="0" hangingPunct="1">
+              <a:lnSpc>
+                <a:spcPct val="100000"/>
+              </a:lnSpc>
+              <a:spcBef>
+                <a:spcPts val="0"/>
+              </a:spcBef>
+              <a:spcAft>
+                <a:spcPts val="0"/>
+              </a:spcAft>
+              <a:buClrTx/>
+              <a:buSzTx/>
+              <a:buFontTx/>
+              <a:buNone/>
+              <a:tabLst/>
+              <a:defRPr/>
+            </a:pPr>
+            <a:r>
+              <a:rPr lang="en-US" sz="1200" kern="1200" dirty="0">
+                <a:solidFill>
+                  <a:schemeClr val="tx1"/>
+                </a:solidFill>
+                <a:effectLst/>
+                <a:latin typeface="+mn-lt"/>
+                <a:ea typeface="+mn-ea"/>
+                <a:cs typeface="+mn-cs"/>
+              </a:rPr>
+              <a:t>Varying proportion of population w/ Ct &gt; </a:t>
+            </a:r>
+            <a:r>
+              <a:rPr lang="en-US" sz="1200" kern="1200" dirty="0" err="1">
+                <a:solidFill>
+                  <a:schemeClr val="tx1"/>
+                </a:solidFill>
+                <a:effectLst/>
+                <a:latin typeface="+mn-lt"/>
+                <a:ea typeface="+mn-ea"/>
+                <a:cs typeface="+mn-cs"/>
+              </a:rPr>
+              <a:t>LoD</a:t>
+            </a:r>
+            <a:r>
+              <a:rPr lang="en-US" sz="1200" kern="1200" dirty="0">
+                <a:solidFill>
+                  <a:schemeClr val="tx1"/>
+                </a:solidFill>
+                <a:effectLst/>
+                <a:latin typeface="+mn-lt"/>
+                <a:ea typeface="+mn-ea"/>
+                <a:cs typeface="+mn-cs"/>
+              </a:rPr>
+              <a:t> -&gt; compare across panels </a:t>
+            </a:r>
+          </a:p>
+          <a:p>
+            <a:r>
+              <a:rPr lang="en-US" sz="1200" kern="1200" dirty="0">
+                <a:solidFill>
+                  <a:schemeClr val="tx1"/>
+                </a:solidFill>
+                <a:effectLst/>
+                <a:latin typeface="+mn-lt"/>
+                <a:ea typeface="+mn-ea"/>
+                <a:cs typeface="+mn-cs"/>
+              </a:rPr>
+              <a:t>Increasing Ct means LESS viral load in a sample, so we expect that increasing Ct will make a test less sensitive (able to detect positive cases)</a:t>
+            </a:r>
+          </a:p>
+          <a:p>
+            <a:r>
+              <a:rPr lang="en-US" sz="1200" kern="1200" dirty="0">
+                <a:solidFill>
+                  <a:schemeClr val="tx1"/>
+                </a:solidFill>
+                <a:effectLst/>
+                <a:latin typeface="+mn-lt"/>
+                <a:ea typeface="+mn-ea"/>
+                <a:cs typeface="+mn-cs"/>
+              </a:rPr>
+              <a:t>UNCORRELATED DATA (dashed line): Increasing proportion of tested population with C</a:t>
+            </a:r>
+            <a:r>
+              <a:rPr lang="en-US" sz="1200" kern="1200" baseline="-25000" dirty="0">
+                <a:solidFill>
+                  <a:schemeClr val="tx1"/>
+                </a:solidFill>
+                <a:effectLst/>
+                <a:latin typeface="+mn-lt"/>
+                <a:ea typeface="+mn-ea"/>
+                <a:cs typeface="+mn-cs"/>
+              </a:rPr>
+              <a:t>t</a:t>
+            </a:r>
+            <a:r>
+              <a:rPr lang="en-US" sz="1200" kern="1200" dirty="0">
+                <a:solidFill>
+                  <a:schemeClr val="tx1"/>
+                </a:solidFill>
+                <a:effectLst/>
+                <a:latin typeface="+mn-lt"/>
+                <a:ea typeface="+mn-ea"/>
+                <a:cs typeface="+mn-cs"/>
+              </a:rPr>
+              <a:t> value  &gt;95% </a:t>
+            </a:r>
+            <a:r>
+              <a:rPr lang="en-US" sz="1200" kern="1200" dirty="0" err="1">
+                <a:solidFill>
+                  <a:schemeClr val="tx1"/>
+                </a:solidFill>
+                <a:effectLst/>
+                <a:latin typeface="+mn-lt"/>
+                <a:ea typeface="+mn-ea"/>
+                <a:cs typeface="+mn-cs"/>
+              </a:rPr>
+              <a:t>LoD</a:t>
+            </a:r>
+            <a:r>
+              <a:rPr lang="en-US" sz="1200" kern="1200" dirty="0">
+                <a:solidFill>
+                  <a:schemeClr val="tx1"/>
+                </a:solidFill>
+                <a:effectLst/>
+                <a:latin typeface="+mn-lt"/>
+                <a:ea typeface="+mn-ea"/>
+                <a:cs typeface="+mn-cs"/>
+              </a:rPr>
+              <a:t> -&gt; PPA decreases</a:t>
+            </a:r>
+          </a:p>
+          <a:p>
+            <a:r>
+              <a:rPr lang="en-US" dirty="0"/>
+              <a:t>CORRELATED DATA (solid line): </a:t>
+            </a:r>
+            <a:r>
+              <a:rPr lang="en-US" sz="1200" kern="1200" dirty="0">
+                <a:solidFill>
+                  <a:schemeClr val="tx1"/>
+                </a:solidFill>
+                <a:effectLst/>
+                <a:latin typeface="+mn-lt"/>
+                <a:ea typeface="+mn-ea"/>
+                <a:cs typeface="+mn-cs"/>
+              </a:rPr>
+              <a:t>Increasing proportion of tested population with C</a:t>
+            </a:r>
+            <a:r>
+              <a:rPr lang="en-US" sz="1200" kern="1200" baseline="-25000" dirty="0">
+                <a:solidFill>
+                  <a:schemeClr val="tx1"/>
+                </a:solidFill>
+                <a:effectLst/>
+                <a:latin typeface="+mn-lt"/>
+                <a:ea typeface="+mn-ea"/>
+                <a:cs typeface="+mn-cs"/>
+              </a:rPr>
+              <a:t>t</a:t>
+            </a:r>
+            <a:r>
+              <a:rPr lang="en-US" sz="1200" kern="1200" dirty="0">
+                <a:solidFill>
+                  <a:schemeClr val="tx1"/>
+                </a:solidFill>
+                <a:effectLst/>
+                <a:latin typeface="+mn-lt"/>
+                <a:ea typeface="+mn-ea"/>
+                <a:cs typeface="+mn-cs"/>
+              </a:rPr>
+              <a:t> value  &gt;95% </a:t>
+            </a:r>
+            <a:r>
+              <a:rPr lang="en-US" sz="1200" kern="1200" dirty="0" err="1">
+                <a:solidFill>
+                  <a:schemeClr val="tx1"/>
+                </a:solidFill>
+                <a:effectLst/>
+                <a:latin typeface="+mn-lt"/>
+                <a:ea typeface="+mn-ea"/>
+                <a:cs typeface="+mn-cs"/>
+              </a:rPr>
+              <a:t>LoD</a:t>
+            </a:r>
+            <a:r>
+              <a:rPr lang="en-US" sz="1200" kern="1200" dirty="0">
+                <a:solidFill>
+                  <a:schemeClr val="tx1"/>
+                </a:solidFill>
+                <a:effectLst/>
+                <a:latin typeface="+mn-lt"/>
+                <a:ea typeface="+mn-ea"/>
+                <a:cs typeface="+mn-cs"/>
+              </a:rPr>
+              <a:t> -&gt; PPA decreases</a:t>
+            </a:r>
+          </a:p>
+          <a:p>
+            <a:r>
+              <a:rPr lang="en-US" sz="1200" kern="1200" dirty="0">
+                <a:solidFill>
+                  <a:schemeClr val="tx1"/>
+                </a:solidFill>
+                <a:effectLst/>
+                <a:latin typeface="+mn-lt"/>
+                <a:ea typeface="+mn-ea"/>
+                <a:cs typeface="+mn-cs"/>
+              </a:rPr>
+              <a:t>Comparing uncorrelated and correlated: don’t have a consistent trend??</a:t>
+            </a:r>
+            <a:endParaRPr lang="en-US" dirty="0"/>
+          </a:p>
+          <a:p>
+            <a:endParaRPr lang="en-US" dirty="0"/>
+          </a:p>
+          <a:p>
+            <a:r>
+              <a:rPr lang="en-US" dirty="0"/>
+              <a:t>COMPARING WITHIN A GIVEN PANEL</a:t>
+            </a:r>
+          </a:p>
+          <a:p>
+            <a:r>
+              <a:rPr lang="en-US" dirty="0"/>
+              <a:t>At a given sensitivity and proportion of samples with Ct&gt;</a:t>
+            </a:r>
+            <a:r>
+              <a:rPr lang="en-US" dirty="0" err="1"/>
+              <a:t>LoD</a:t>
+            </a:r>
+            <a:r>
+              <a:rPr lang="en-US" dirty="0"/>
+              <a:t>, greater proportion of tests positive increases PPA</a:t>
+            </a:r>
+          </a:p>
+        </p:txBody>
+      </p:sp>
+      <p:sp>
+        <p:nvSpPr>
+          <p:cNvPr id="4" name="Slide Number Placeholder 3"/>
+          <p:cNvSpPr>
+            <a:spLocks noGrp="1"/>
+          </p:cNvSpPr>
+          <p:nvPr>
+            <p:ph type="sldNum" sz="quarter" idx="5"/>
+          </p:nvPr>
+        </p:nvSpPr>
+        <p:spPr/>
+        <p:txBody>
+          <a:bodyPr/>
+          <a:lstStyle/>
+          <a:p>
+            <a:fld id="{979C91EE-241E-744B-9BE8-C0788DCF3837}" type="slidenum">
+              <a:rPr lang="en-US" smtClean="0"/>
+              <a:t>6</a:t>
+            </a:fld>
+            <a:endParaRPr lang="en-US"/>
+          </a:p>
+        </p:txBody>
+      </p:sp>
+    </p:spTree>
+    <p:extLst>
+      <p:ext uri="{BB962C8B-B14F-4D97-AF65-F5344CB8AC3E}">
+        <p14:creationId xmlns:p14="http://schemas.microsoft.com/office/powerpoint/2010/main" val="3070357843"/>
+      </p:ext>
+    </p:extLst>
+  </p:cSld>
+  <p:clrMapOvr>
+    <a:masterClrMapping/>
+  </p:clrMapOvr>
+</p:notes>
+</file>
+
+<file path=ppt/notesSlides/notesSlide4.xml><?xml version="1.0" encoding="utf-8"?>
+<p:notes xmlns:a="http://schemas.openxmlformats.org/drawingml/2006/main" xmlns:r="http://schemas.openxmlformats.org/officeDocument/2006/relationships" xmlns:p="http://schemas.openxmlformats.org/presentationml/2006/main">
+  <p:cSld>
+    <p:spTree>
+      <p:nvGrpSpPr>
+        <p:cNvPr id="1" name=""/>
+        <p:cNvGrpSpPr/>
+        <p:nvPr/>
+      </p:nvGrpSpPr>
+      <p:grpSpPr>
+        <a:xfrm>
+          <a:off x="0" y="0"/>
+          <a:ext cx="0" cy="0"/>
+          <a:chOff x="0" y="0"/>
+          <a:chExt cx="0" cy="0"/>
+        </a:xfrm>
+      </p:grpSpPr>
+      <p:sp>
+        <p:nvSpPr>
+          <p:cNvPr id="2" name="Slide Image Placeholder 1"/>
+          <p:cNvSpPr>
+            <a:spLocks noGrp="1" noRot="1" noChangeAspect="1"/>
+          </p:cNvSpPr>
+          <p:nvPr>
+            <p:ph type="sldImg"/>
+          </p:nvPr>
+        </p:nvSpPr>
+        <p:spPr/>
+      </p:sp>
+      <p:sp>
+        <p:nvSpPr>
+          <p:cNvPr id="3" name="Notes Placeholder 2"/>
+          <p:cNvSpPr>
+            <a:spLocks noGrp="1"/>
+          </p:cNvSpPr>
+          <p:nvPr>
+            <p:ph type="body" idx="1"/>
+          </p:nvPr>
+        </p:nvSpPr>
+        <p:spPr/>
+        <p:txBody>
+          <a:bodyPr/>
+          <a:lstStyle/>
+          <a:p>
+            <a:r>
+              <a:rPr lang="en-US" sz="1200" dirty="0"/>
+              <a:t>Vary proportion of population w/ Ct &gt; </a:t>
+            </a:r>
+            <a:r>
+              <a:rPr lang="en-US" sz="1200" dirty="0" err="1"/>
+              <a:t>LoD</a:t>
+            </a:r>
+            <a:r>
+              <a:rPr lang="en-US" sz="1200" dirty="0"/>
+              <a:t>, proportion of tests positive, and pool size</a:t>
+            </a:r>
+          </a:p>
+          <a:p>
+            <a:r>
+              <a:rPr lang="en-US" sz="1200" dirty="0"/>
+              <a:t>(assay analytic sensitivity = constant)</a:t>
+            </a:r>
             <a:endParaRPr lang="en-US" sz="1200" kern="1200" dirty="0">
               <a:solidFill>
                 <a:schemeClr val="tx1"/>
@@ -1125,19 +1235,7 @@
                 <a:ea typeface="+mn-ea"/>
                 <a:cs typeface="+mn-cs"/>
               </a:rPr>
-              <a:t>Average expected tests per sample is almost entirely determined by pool size </a:t>
-            </a:r>
-            <a:r>
-              <a:rPr lang="en-US" sz="1200" kern="1200">
-                <a:solidFill>
-                  <a:schemeClr val="tx1"/>
-                </a:solidFill>
-                <a:effectLst/>
-                <a:latin typeface="+mn-lt"/>
-                <a:ea typeface="+mn-ea"/>
-                <a:cs typeface="+mn-cs"/>
-              </a:rPr>
-              <a:t>and prevalence</a:t>
+              <a:t>Average expected tests per sample is almost entirely determined by pool size and prevalence</a:t>
             </a:r>
             <a:endParaRPr lang="en-US" dirty="0"/>
           </a:p>
@@ -1160,7 +1258,7 @@
           <a:p>
             <a:fld id="{979C91EE-241E-744B-9BE8-C0788DCF3837}" type="slidenum">
               <a:rPr lang="en-US" smtClean="0"/>
-              <a:t>4</a:t>
+              <a:t>7</a:t>
             </a:fld>
             <a:endParaRPr lang="en-US"/>
           </a:p>
@@ -1182,6 +1280,14 @@
 <file path=ppt/slideLayouts/slideLayout1.xml><?xml version="1.0" encoding="utf-8"?>
 <p:sldLayout xmlns:a="http://schemas.openxmlformats.org/drawingml/2006/main" xmlns:r="http://schemas.openxmlformats.org/officeDocument/2006/relationships" xmlns:p="http://schemas.openxmlformats.org/presentationml/2006/main" type="title" preserve="1">
   <p:cSld name="Title Slide">
+    <p:bg>
+      <p:bgPr>
+        <a:solidFill>
+          <a:schemeClr val="accent2"/>
+        </a:solidFill>
+        <a:effectLst/>
+      </p:bgPr>
+    </p:bg>
     <p:spTree>
       <p:nvGrpSpPr>
         <p:cNvPr id="1" name=""/>
@@ -1198,69 +1304,82 @@
       </p:grpSpPr>
       <p:sp>
         <p:nvSpPr>
-          <p:cNvPr id="2" name="Title 1">
-            <a:extLst>
-              <a:ext uri="{FF2B5EF4-FFF2-40B4-BE49-F238E27FC236}">
-                <a16:creationId xmlns:a16="http://schemas.microsoft.com/office/drawing/2014/main" id="{75618338-343E-AB4A-BDB4-E0974871FFC8}"/>
-              </a:ext>
-            </a:extLst>
-          </p:cNvPr>
+          <p:cNvPr id="2" name="Title 1"/>
           <p:cNvSpPr>
             <a:spLocks noGrp="1"/>
           </p:cNvSpPr>
           <p:nvPr>
             <p:ph type="ctrTitle"/>
+          </p:nvPr>
+        </p:nvSpPr>
+        <p:spPr bwMode="blackWhite">
+          <a:xfrm>
+            <a:off x="1600200" y="2386744"/>
+            <a:ext cx="8991600" cy="1645920"/>
+          </a:xfrm>
+          <a:solidFill>
+            <a:srgbClr val="FFFFFF"/>
+          </a:solidFill>
+          <a:ln w="38100">
+            <a:solidFill>
+              <a:srgbClr val="404040"/>
+            </a:solidFill>
+          </a:ln>
+        </p:spPr>
+        <p:txBody>
+          <a:bodyPr lIns="274320" rIns="274320" anchor="ctr" anchorCtr="1">
+            <a:normAutofit/>
+          </a:bodyPr>
+          <a:lstStyle>
+            <a:lvl1pPr algn="ctr">
+              <a:defRPr sz="3800">
+                <a:solidFill>
+                  <a:srgbClr val="262626"/>
+                </a:solidFill>
+              </a:defRPr>
+            </a:lvl1pPr>
+          </a:lstStyle>
+          <a:p>
+            <a:r>
+              <a:rPr lang="en-US"/>
+              <a:t>Click to edit Master title style</a:t>
+            </a:r>
+            <a:endParaRPr lang="en-US" dirty="0"/>
+          </a:p>
+        </p:txBody>
+      </p:sp>
+      <p:sp>
+        <p:nvSpPr>
+          <p:cNvPr id="3" name="Subtitle 2"/>
+          <p:cNvSpPr>
+            <a:spLocks noGrp="1"/>
+          </p:cNvSpPr>
+          <p:nvPr>
+            <p:ph type="subTitle" idx="1"/>
           </p:nvPr>
         </p:nvSpPr>
         <p:spPr>
           <a:xfrm>
-            <a:off x="1524000" y="1122363"/>
-            <a:ext cx="9144000" cy="2387600"/>
+            <a:off x="2695194" y="4352544"/>
+            <a:ext cx="6801612" cy="1239894"/>
           </a:xfrm>
+          <a:noFill/>
         </p:spPr>
         <p:txBody>
-          <a:bodyPr anchor="b"/>
-          <a:lstStyle>
-            <a:lvl1pPr algn="ctr">
-              <a:defRPr sz="6000"/>
-            </a:lvl1pPr>
-          </a:lstStyle>
-          <a:p>
-            <a:r>
-              <a:rPr lang="en-US"/>
-              <a:t>Click to edit Master title style</a:t>
-            </a:r>
-          </a:p>
-        </p:txBody>
-      </p:sp>
-      <p:sp>
-        <p:nvSpPr>
-          <p:cNvPr id="3" name="Subtitle 2">
-            <a:extLst>
-              <a:ext uri="{FF2B5EF4-FFF2-40B4-BE49-F238E27FC236}">
-                <a16:creationId xmlns:a16="http://schemas.microsoft.com/office/drawing/2014/main" id="{D2EE8169-F1C1-574D-8E23-74BCBE16F198}"/>
-              </a:ext>
-            </a:extLst>
-          </p:cNvPr>
-          <p:cNvSpPr>
-            <a:spLocks noGrp="1"/>
-          </p:cNvSpPr>
-          <p:nvPr>
-            <p:ph type="subTitle" idx="1"/>
-          </p:nvPr>
-        </p:nvSpPr>
-        <p:spPr>
-          <a:xfrm>
-            <a:off x="1524000" y="3602038"/>
-            <a:ext cx="9144000" cy="1655762"/>
-          </a:xfrm>
-        </p:spPr>
-        <p:txBody>
-          <a:bodyPr/>
+          <a:bodyPr>
+            <a:normAutofit/>
+          </a:bodyPr>
           <a:lstStyle>
             <a:lvl1pPr marL="0" indent="0" algn="ctr">
               <a:buNone/>
-              <a:defRPr sz="2400"/>
+              <a:defRPr sz="2000">
+                <a:solidFill>
+                  <a:schemeClr val="tx1">
+                    <a:lumMod val="75000"/>
+                    <a:lumOff val="25000"/>
+                  </a:schemeClr>
+                </a:solidFill>
+              </a:defRPr>
             </a:lvl1pPr>
             <a:lvl2pPr marL="457200" indent="0" algn="ctr">
               <a:buNone/>
@@ -1300,18 +1419,13 @@
               <a:rPr lang="en-US"/>
               <a:t>Click to edit Master subtitle style</a:t>
             </a:r>
-          </a:p>
-        </p:txBody>
-      </p:sp>
-      <p:sp>
-        <p:nvSpPr>
-          <p:cNvPr id="4" name="Date Placeholder 3">
-            <a:extLst>
-              <a:ext uri="{FF2B5EF4-FFF2-40B4-BE49-F238E27FC236}">
-                <a16:creationId xmlns:a16="http://schemas.microsoft.com/office/drawing/2014/main" id="{E6137505-01B7-C546-865A-7FEEF8DE977F}"/>
-              </a:ext>
-            </a:extLst>
-          </p:cNvPr>
+            <a:endParaRPr lang="en-US" dirty="0"/>
+          </a:p>
+        </p:txBody>
+      </p:sp>
+      <p:sp>
+        <p:nvSpPr>
+          <p:cNvPr id="7" name="Date Placeholder 6"/>
           <p:cNvSpPr>
             <a:spLocks noGrp="1"/>
           </p:cNvSpPr>
@@ -1334,13 +1448,7 @@
       </p:sp>
       <p:sp>
         <p:nvSpPr>
-          <p:cNvPr id="5" name="Footer Placeholder 4">
-            <a:extLst>
-              <a:ext uri="{FF2B5EF4-FFF2-40B4-BE49-F238E27FC236}">
-                <a16:creationId xmlns:a16="http://schemas.microsoft.com/office/drawing/2014/main" id="{0FC73DE7-6E91-8747-9446-9E07F71CF6C0}"/>
-              </a:ext>
-            </a:extLst>
-          </p:cNvPr>
+          <p:cNvPr id="8" name="Footer Placeholder 7"/>
           <p:cNvSpPr>
             <a:spLocks noGrp="1"/>
           </p:cNvSpPr>
@@ -1359,13 +1467,7 @@
       </p:sp>
       <p:sp>
         <p:nvSpPr>
-          <p:cNvPr id="6" name="Slide Number Placeholder 5">
-            <a:extLst>
-              <a:ext uri="{FF2B5EF4-FFF2-40B4-BE49-F238E27FC236}">
-                <a16:creationId xmlns:a16="http://schemas.microsoft.com/office/drawing/2014/main" id="{847F97B3-E947-0749-B889-440B02BD742C}"/>
-              </a:ext>
-            </a:extLst>
-          </p:cNvPr>
+          <p:cNvPr id="9" name="Slide Number Placeholder 8"/>
           <p:cNvSpPr>
             <a:spLocks noGrp="1"/>
           </p:cNvSpPr>
@@ -1389,12 +1491,12 @@
     </p:spTree>
     <p:extLst>
       <p:ext uri="{BB962C8B-B14F-4D97-AF65-F5344CB8AC3E}">
-        <p14:creationId xmlns:p14="http://schemas.microsoft.com/office/powerpoint/2010/main" val="615161832"/>
+        <p14:creationId xmlns:p14="http://schemas.microsoft.com/office/powerpoint/2010/main" val="2741405270"/>
       </p:ext>
     </p:extLst>
   </p:cSld>
   <p:clrMapOvr>
-    <a:masterClrMapping/>
+    <a:overrideClrMapping bg1="dk1" tx1="lt1" bg2="dk2" tx2="lt2" accent1="accent1" accent2="accent2" accent3="accent3" accent4="accent4" accent5="accent5" accent6="accent6" hlink="hlink" folHlink="folHlink"/>
   </p:clrMapOvr>
 </p:sldLayout>
 </file>
@@ -1418,13 +1520,7 @@
       </p:grpSpPr>
       <p:sp>
         <p:nvSpPr>
-          <p:cNvPr id="2" name="Title 1">
-            <a:extLst>
-              <a:ext uri="{FF2B5EF4-FFF2-40B4-BE49-F238E27FC236}">
-                <a16:creationId xmlns:a16="http://schemas.microsoft.com/office/drawing/2014/main" id="{943D1DE4-EC02-714C-ACCD-BC0F30234BAA}"/>
-              </a:ext>
-            </a:extLst>
-          </p:cNvPr>
+          <p:cNvPr id="2" name="Title 1"/>
           <p:cNvSpPr>
             <a:spLocks noGrp="1"/>
           </p:cNvSpPr>
@@ -1441,18 +1537,13 @@
               <a:rPr lang="en-US"/>
               <a:t>Click to edit Master title style</a:t>
             </a:r>
-          </a:p>
-        </p:txBody>
-      </p:sp>
-      <p:sp>
-        <p:nvSpPr>
-          <p:cNvPr id="3" name="Vertical Text Placeholder 2">
-            <a:extLst>
-              <a:ext uri="{FF2B5EF4-FFF2-40B4-BE49-F238E27FC236}">
-                <a16:creationId xmlns:a16="http://schemas.microsoft.com/office/drawing/2014/main" id="{76C314A7-72C8-6E41-A932-7AD8B6BDD460}"/>
-              </a:ext>
-            </a:extLst>
-          </p:cNvPr>
+            <a:endParaRPr lang="en-US" dirty="0"/>
+          </a:p>
+        </p:txBody>
+      </p:sp>
+      <p:sp>
+        <p:nvSpPr>
+          <p:cNvPr id="3" name="Vertical Text Placeholder 2"/>
           <p:cNvSpPr>
             <a:spLocks noGrp="1"/>
           </p:cNvSpPr>
@@ -1498,18 +1589,13 @@
               <a:rPr lang="en-US"/>
               <a:t>Fifth level</a:t>
             </a:r>
-          </a:p>
-        </p:txBody>
-      </p:sp>
-      <p:sp>
-        <p:nvSpPr>
-          <p:cNvPr id="4" name="Date Placeholder 3">
-            <a:extLst>
-              <a:ext uri="{FF2B5EF4-FFF2-40B4-BE49-F238E27FC236}">
-                <a16:creationId xmlns:a16="http://schemas.microsoft.com/office/drawing/2014/main" id="{19884546-7EB9-0B45-8307-79C376543B09}"/>
-              </a:ext>
-            </a:extLst>
-          </p:cNvPr>
+            <a:endParaRPr lang="en-US" dirty="0"/>
+          </a:p>
+        </p:txBody>
+      </p:sp>
+      <p:sp>
+        <p:nvSpPr>
+          <p:cNvPr id="4" name="Date Placeholder 3"/>
           <p:cNvSpPr>
             <a:spLocks noGrp="1"/>
           </p:cNvSpPr>
@@ -1532,13 +1618,7 @@
       </p:sp>
       <p:sp>
         <p:nvSpPr>
-          <p:cNvPr id="5" name="Footer Placeholder 4">
-            <a:extLst>
-              <a:ext uri="{FF2B5EF4-FFF2-40B4-BE49-F238E27FC236}">
-                <a16:creationId xmlns:a16="http://schemas.microsoft.com/office/drawing/2014/main" id="{DFE26036-7757-A145-B957-D3D0AB5D360D}"/>
-              </a:ext>
-            </a:extLst>
-          </p:cNvPr>
+          <p:cNvPr id="5" name="Footer Placeholder 4"/>
           <p:cNvSpPr>
             <a:spLocks noGrp="1"/>
           </p:cNvSpPr>
@@ -1557,13 +1637,7 @@
       </p:sp>
       <p:sp>
         <p:nvSpPr>
-          <p:cNvPr id="6" name="Slide Number Placeholder 5">
-            <a:extLst>
-              <a:ext uri="{FF2B5EF4-FFF2-40B4-BE49-F238E27FC236}">
-                <a16:creationId xmlns:a16="http://schemas.microsoft.com/office/drawing/2014/main" id="{2F93171F-1880-6242-9371-981461C2EE5B}"/>
-              </a:ext>
-            </a:extLst>
-          </p:cNvPr>
+          <p:cNvPr id="6" name="Slide Number Placeholder 5"/>
           <p:cNvSpPr>
             <a:spLocks noGrp="1"/>
           </p:cNvSpPr>
@@ -1587,7 +1661,7 @@
     </p:spTree>
     <p:extLst>
       <p:ext uri="{BB962C8B-B14F-4D97-AF65-F5344CB8AC3E}">
-        <p14:creationId xmlns:p14="http://schemas.microsoft.com/office/powerpoint/2010/main" val="48932720"/>
+        <p14:creationId xmlns:p14="http://schemas.microsoft.com/office/powerpoint/2010/main" val="3649981336"/>
       </p:ext>
     </p:extLst>
   </p:cSld>
@@ -1616,13 +1690,7 @@
       </p:grpSpPr>
       <p:sp>
         <p:nvSpPr>
-          <p:cNvPr id="2" name="Vertical Title 1">
-            <a:extLst>
-              <a:ext uri="{FF2B5EF4-FFF2-40B4-BE49-F238E27FC236}">
-                <a16:creationId xmlns:a16="http://schemas.microsoft.com/office/drawing/2014/main" id="{9C3FA5EF-4BFC-6C42-9958-DEB6D9C7703B}"/>
-              </a:ext>
-            </a:extLst>
-          </p:cNvPr>
+          <p:cNvPr id="2" name="Vertical Title 1"/>
           <p:cNvSpPr>
             <a:spLocks noGrp="1"/>
           </p:cNvSpPr>
@@ -1632,8 +1700,8 @@
         </p:nvSpPr>
         <p:spPr>
           <a:xfrm>
-            <a:off x="8724900" y="365125"/>
-            <a:ext cx="2628900" cy="5811838"/>
+            <a:off x="8653112" y="937260"/>
+            <a:ext cx="1298608" cy="4983480"/>
           </a:xfrm>
         </p:spPr>
         <p:txBody>
@@ -1644,18 +1712,13 @@
               <a:rPr lang="en-US"/>
               <a:t>Click to edit Master title style</a:t>
             </a:r>
-          </a:p>
-        </p:txBody>
-      </p:sp>
-      <p:sp>
-        <p:nvSpPr>
-          <p:cNvPr id="3" name="Vertical Text Placeholder 2">
-            <a:extLst>
-              <a:ext uri="{FF2B5EF4-FFF2-40B4-BE49-F238E27FC236}">
-                <a16:creationId xmlns:a16="http://schemas.microsoft.com/office/drawing/2014/main" id="{F024D31D-C82F-9E4F-8B37-49865490B916}"/>
-              </a:ext>
-            </a:extLst>
-          </p:cNvPr>
+            <a:endParaRPr lang="en-US" dirty="0"/>
+          </a:p>
+        </p:txBody>
+      </p:sp>
+      <p:sp>
+        <p:nvSpPr>
+          <p:cNvPr id="3" name="Vertical Text Placeholder 2"/>
           <p:cNvSpPr>
             <a:spLocks noGrp="1"/>
           </p:cNvSpPr>
@@ -1665,8 +1728,8 @@
         </p:nvSpPr>
         <p:spPr>
           <a:xfrm>
-            <a:off x="838200" y="365125"/>
-            <a:ext cx="7734300" cy="5811838"/>
+            <a:off x="2231136" y="937260"/>
+            <a:ext cx="6198489" cy="4983480"/>
           </a:xfrm>
         </p:spPr>
         <p:txBody>
@@ -1706,18 +1769,13 @@
               <a:rPr lang="en-US"/>
               <a:t>Fifth level</a:t>
             </a:r>
-          </a:p>
-        </p:txBody>
-      </p:sp>
-      <p:sp>
-        <p:nvSpPr>
-          <p:cNvPr id="4" name="Date Placeholder 3">
-            <a:extLst>
-              <a:ext uri="{FF2B5EF4-FFF2-40B4-BE49-F238E27FC236}">
-                <a16:creationId xmlns:a16="http://schemas.microsoft.com/office/drawing/2014/main" id="{5764C940-7C61-884F-844E-D6626ECCAB17}"/>
-              </a:ext>
-            </a:extLst>
-          </p:cNvPr>
+            <a:endParaRPr lang="en-US" dirty="0"/>
+          </a:p>
+        </p:txBody>
+      </p:sp>
+      <p:sp>
+        <p:nvSpPr>
+          <p:cNvPr id="4" name="Date Placeholder 3"/>
           <p:cNvSpPr>
             <a:spLocks noGrp="1"/>
           </p:cNvSpPr>
@@ -1740,13 +1798,7 @@
       </p:sp>
       <p:sp>
         <p:nvSpPr>
-          <p:cNvPr id="5" name="Footer Placeholder 4">
-            <a:extLst>
-              <a:ext uri="{FF2B5EF4-FFF2-40B4-BE49-F238E27FC236}">
-                <a16:creationId xmlns:a16="http://schemas.microsoft.com/office/drawing/2014/main" id="{4B34DB02-7295-9943-985C-C99295630D20}"/>
-              </a:ext>
-            </a:extLst>
-          </p:cNvPr>
+          <p:cNvPr id="5" name="Footer Placeholder 4"/>
           <p:cNvSpPr>
             <a:spLocks noGrp="1"/>
           </p:cNvSpPr>
@@ -1765,13 +1817,7 @@
       </p:sp>
       <p:sp>
         <p:nvSpPr>
-          <p:cNvPr id="6" name="Slide Number Placeholder 5">
-            <a:extLst>
-              <a:ext uri="{FF2B5EF4-FFF2-40B4-BE49-F238E27FC236}">
-                <a16:creationId xmlns:a16="http://schemas.microsoft.com/office/drawing/2014/main" id="{55E35203-CF2E-714B-AFD4-8BECCBCBF899}"/>
-              </a:ext>
-            </a:extLst>
-          </p:cNvPr>
+          <p:cNvPr id="6" name="Slide Number Placeholder 5"/>
           <p:cNvSpPr>
             <a:spLocks noGrp="1"/>
           </p:cNvSpPr>
@@ -1795,7 +1841,7 @@
     </p:spTree>
     <p:extLst>
       <p:ext uri="{BB962C8B-B14F-4D97-AF65-F5344CB8AC3E}">
-        <p14:creationId xmlns:p14="http://schemas.microsoft.com/office/powerpoint/2010/main" val="2437072005"/>
+        <p14:creationId xmlns:p14="http://schemas.microsoft.com/office/powerpoint/2010/main" val="4142612143"/>
       </p:ext>
     </p:extLst>
   </p:cSld>
@@ -1824,13 +1870,7 @@
       </p:grpSpPr>
       <p:sp>
         <p:nvSpPr>
-          <p:cNvPr id="2" name="Title 1">
-            <a:extLst>
-              <a:ext uri="{FF2B5EF4-FFF2-40B4-BE49-F238E27FC236}">
-                <a16:creationId xmlns:a16="http://schemas.microsoft.com/office/drawing/2014/main" id="{8029BF75-2372-0F4C-86DA-80FB39B0E169}"/>
-              </a:ext>
-            </a:extLst>
-          </p:cNvPr>
+          <p:cNvPr id="2" name="Title 1"/>
           <p:cNvSpPr>
             <a:spLocks noGrp="1"/>
           </p:cNvSpPr>
@@ -1847,18 +1887,13 @@
               <a:rPr lang="en-US"/>
               <a:t>Click to edit Master title style</a:t>
             </a:r>
-          </a:p>
-        </p:txBody>
-      </p:sp>
-      <p:sp>
-        <p:nvSpPr>
-          <p:cNvPr id="3" name="Content Placeholder 2">
-            <a:extLst>
-              <a:ext uri="{FF2B5EF4-FFF2-40B4-BE49-F238E27FC236}">
-                <a16:creationId xmlns:a16="http://schemas.microsoft.com/office/drawing/2014/main" id="{5E76AB2A-6B0D-7D40-8BC2-0582F7A5C607}"/>
-              </a:ext>
-            </a:extLst>
-          </p:cNvPr>
+            <a:endParaRPr lang="en-US" dirty="0"/>
+          </a:p>
+        </p:txBody>
+      </p:sp>
+      <p:sp>
+        <p:nvSpPr>
+          <p:cNvPr id="3" name="Content Placeholder 2"/>
           <p:cNvSpPr>
             <a:spLocks noGrp="1"/>
           </p:cNvSpPr>
@@ -1904,18 +1939,13 @@
               <a:rPr lang="en-US"/>
               <a:t>Fifth level</a:t>
             </a:r>
-          </a:p>
-        </p:txBody>
-      </p:sp>
-      <p:sp>
-        <p:nvSpPr>
-          <p:cNvPr id="4" name="Date Placeholder 3">
-            <a:extLst>
-              <a:ext uri="{FF2B5EF4-FFF2-40B4-BE49-F238E27FC236}">
-                <a16:creationId xmlns:a16="http://schemas.microsoft.com/office/drawing/2014/main" id="{264AE8B2-04E4-BD46-8020-D7DF402AA8D9}"/>
-              </a:ext>
-            </a:extLst>
-          </p:cNvPr>
+            <a:endParaRPr lang="en-US" dirty="0"/>
+          </a:p>
+        </p:txBody>
+      </p:sp>
+      <p:sp>
+        <p:nvSpPr>
+          <p:cNvPr id="7" name="Date Placeholder 6"/>
           <p:cNvSpPr>
             <a:spLocks noGrp="1"/>
           </p:cNvSpPr>
@@ -1938,13 +1968,7 @@
       </p:sp>
       <p:sp>
         <p:nvSpPr>
-          <p:cNvPr id="5" name="Footer Placeholder 4">
-            <a:extLst>
-              <a:ext uri="{FF2B5EF4-FFF2-40B4-BE49-F238E27FC236}">
-                <a16:creationId xmlns:a16="http://schemas.microsoft.com/office/drawing/2014/main" id="{9EAE7743-9BE7-FB4E-B8B2-541F99908FCC}"/>
-              </a:ext>
-            </a:extLst>
-          </p:cNvPr>
+          <p:cNvPr id="8" name="Footer Placeholder 7"/>
           <p:cNvSpPr>
             <a:spLocks noGrp="1"/>
           </p:cNvSpPr>
@@ -1963,13 +1987,7 @@
       </p:sp>
       <p:sp>
         <p:nvSpPr>
-          <p:cNvPr id="6" name="Slide Number Placeholder 5">
-            <a:extLst>
-              <a:ext uri="{FF2B5EF4-FFF2-40B4-BE49-F238E27FC236}">
-                <a16:creationId xmlns:a16="http://schemas.microsoft.com/office/drawing/2014/main" id="{40AEB5D4-F247-E44A-9063-B234A6C8A923}"/>
-              </a:ext>
-            </a:extLst>
-          </p:cNvPr>
+          <p:cNvPr id="9" name="Slide Number Placeholder 8"/>
           <p:cNvSpPr>
             <a:spLocks noGrp="1"/>
           </p:cNvSpPr>
@@ -1993,7 +2011,7 @@
     </p:spTree>
     <p:extLst>
       <p:ext uri="{BB962C8B-B14F-4D97-AF65-F5344CB8AC3E}">
-        <p14:creationId xmlns:p14="http://schemas.microsoft.com/office/powerpoint/2010/main" val="197906720"/>
+        <p14:creationId xmlns:p14="http://schemas.microsoft.com/office/powerpoint/2010/main" val="753155664"/>
       </p:ext>
     </p:extLst>
   </p:cSld>
@@ -2006,6 +2024,14 @@
 <file path=ppt/slideLayouts/slideLayout3.xml><?xml version="1.0" encoding="utf-8"?>
 <p:sldLayout xmlns:a="http://schemas.openxmlformats.org/drawingml/2006/main" xmlns:r="http://schemas.openxmlformats.org/officeDocument/2006/relationships" xmlns:p="http://schemas.openxmlformats.org/presentationml/2006/main" type="secHead" preserve="1">
   <p:cSld name="Section Header">
+    <p:bg>
+      <p:bgPr>
+        <a:solidFill>
+          <a:schemeClr val="accent1"/>
+        </a:solidFill>
+        <a:effectLst/>
+      </p:bgPr>
+    </p:bg>
     <p:spTree>
       <p:nvGrpSpPr>
         <p:cNvPr id="1" name=""/>
@@ -2022,73 +2048,76 @@
       </p:grpSpPr>
       <p:sp>
         <p:nvSpPr>
-          <p:cNvPr id="2" name="Title 1">
-            <a:extLst>
-              <a:ext uri="{FF2B5EF4-FFF2-40B4-BE49-F238E27FC236}">
-                <a16:creationId xmlns:a16="http://schemas.microsoft.com/office/drawing/2014/main" id="{4B9D76B1-0E74-3844-850D-67CFF977D313}"/>
-              </a:ext>
-            </a:extLst>
-          </p:cNvPr>
+          <p:cNvPr id="2" name="Title 1"/>
           <p:cNvSpPr>
             <a:spLocks noGrp="1"/>
           </p:cNvSpPr>
           <p:nvPr>
             <p:ph type="title"/>
+          </p:nvPr>
+        </p:nvSpPr>
+        <p:spPr bwMode="blackWhite">
+          <a:xfrm>
+            <a:off x="1600200" y="2386744"/>
+            <a:ext cx="8991600" cy="1645920"/>
+          </a:xfrm>
+          <a:solidFill>
+            <a:srgbClr val="FFFFFF"/>
+          </a:solidFill>
+          <a:ln w="38100">
+            <a:solidFill>
+              <a:srgbClr val="404040"/>
+            </a:solidFill>
+          </a:ln>
+        </p:spPr>
+        <p:txBody>
+          <a:bodyPr lIns="274320" rIns="274320" anchor="ctr" anchorCtr="1">
+            <a:normAutofit/>
+          </a:bodyPr>
+          <a:lstStyle>
+            <a:lvl1pPr>
+              <a:defRPr sz="3800">
+                <a:solidFill>
+                  <a:srgbClr val="262626"/>
+                </a:solidFill>
+              </a:defRPr>
+            </a:lvl1pPr>
+          </a:lstStyle>
+          <a:p>
+            <a:r>
+              <a:rPr lang="en-US"/>
+              <a:t>Click to edit Master title style</a:t>
+            </a:r>
+            <a:endParaRPr lang="en-US" dirty="0"/>
+          </a:p>
+        </p:txBody>
+      </p:sp>
+      <p:sp>
+        <p:nvSpPr>
+          <p:cNvPr id="3" name="Text Placeholder 2"/>
+          <p:cNvSpPr>
+            <a:spLocks noGrp="1"/>
+          </p:cNvSpPr>
+          <p:nvPr>
+            <p:ph type="body" idx="1"/>
           </p:nvPr>
         </p:nvSpPr>
         <p:spPr>
           <a:xfrm>
-            <a:off x="831850" y="1709738"/>
-            <a:ext cx="10515600" cy="2852737"/>
+            <a:off x="2695194" y="4352465"/>
+            <a:ext cx="6801612" cy="1265082"/>
           </a:xfrm>
         </p:spPr>
         <p:txBody>
-          <a:bodyPr anchor="b"/>
-          <a:lstStyle>
-            <a:lvl1pPr>
-              <a:defRPr sz="6000"/>
-            </a:lvl1pPr>
-          </a:lstStyle>
-          <a:p>
-            <a:r>
-              <a:rPr lang="en-US"/>
-              <a:t>Click to edit Master title style</a:t>
-            </a:r>
-          </a:p>
-        </p:txBody>
-      </p:sp>
-      <p:sp>
-        <p:nvSpPr>
-          <p:cNvPr id="3" name="Text Placeholder 2">
-            <a:extLst>
-              <a:ext uri="{FF2B5EF4-FFF2-40B4-BE49-F238E27FC236}">
-                <a16:creationId xmlns:a16="http://schemas.microsoft.com/office/drawing/2014/main" id="{37635594-B0D0-5144-B731-3579FF703717}"/>
-              </a:ext>
-            </a:extLst>
-          </p:cNvPr>
-          <p:cNvSpPr>
-            <a:spLocks noGrp="1"/>
-          </p:cNvSpPr>
-          <p:nvPr>
-            <p:ph type="body" idx="1"/>
-          </p:nvPr>
-        </p:nvSpPr>
-        <p:spPr>
-          <a:xfrm>
-            <a:off x="831850" y="4589463"/>
-            <a:ext cx="10515600" cy="1500187"/>
-          </a:xfrm>
-        </p:spPr>
-        <p:txBody>
-          <a:bodyPr/>
+          <a:bodyPr anchor="t" anchorCtr="1">
+            <a:normAutofit/>
+          </a:bodyPr>
           <a:lstStyle>
             <a:lvl1pPr marL="0" indent="0">
               <a:buNone/>
-              <a:defRPr sz="2400">
+              <a:defRPr sz="2000">
                 <a:solidFill>
-                  <a:schemeClr val="tx1">
-                    <a:tint val="75000"/>
-                  </a:schemeClr>
+                  <a:schemeClr val="tx1"/>
                 </a:solidFill>
               </a:defRPr>
             </a:lvl1pPr>
@@ -2184,13 +2213,7 @@
       </p:sp>
       <p:sp>
         <p:nvSpPr>
-          <p:cNvPr id="4" name="Date Placeholder 3">
-            <a:extLst>
-              <a:ext uri="{FF2B5EF4-FFF2-40B4-BE49-F238E27FC236}">
-                <a16:creationId xmlns:a16="http://schemas.microsoft.com/office/drawing/2014/main" id="{03E60972-33E2-BB4C-91C3-C1BD92801D4F}"/>
-              </a:ext>
-            </a:extLst>
-          </p:cNvPr>
+          <p:cNvPr id="7" name="Date Placeholder 6"/>
           <p:cNvSpPr>
             <a:spLocks noGrp="1"/>
           </p:cNvSpPr>
@@ -2213,13 +2236,7 @@
       </p:sp>
       <p:sp>
         <p:nvSpPr>
-          <p:cNvPr id="5" name="Footer Placeholder 4">
-            <a:extLst>
-              <a:ext uri="{FF2B5EF4-FFF2-40B4-BE49-F238E27FC236}">
-                <a16:creationId xmlns:a16="http://schemas.microsoft.com/office/drawing/2014/main" id="{07A2EDB3-6DE5-DA4A-B0EF-442F20FE3931}"/>
-              </a:ext>
-            </a:extLst>
-          </p:cNvPr>
+          <p:cNvPr id="8" name="Footer Placeholder 7"/>
           <p:cNvSpPr>
             <a:spLocks noGrp="1"/>
           </p:cNvSpPr>
@@ -2238,13 +2255,7 @@
       </p:sp>
       <p:sp>
         <p:nvSpPr>
-          <p:cNvPr id="6" name="Slide Number Placeholder 5">
-            <a:extLst>
-              <a:ext uri="{FF2B5EF4-FFF2-40B4-BE49-F238E27FC236}">
-                <a16:creationId xmlns:a16="http://schemas.microsoft.com/office/drawing/2014/main" id="{F6A20E6D-0027-264C-BF01-BFD38C059181}"/>
-              </a:ext>
-            </a:extLst>
-          </p:cNvPr>
+          <p:cNvPr id="9" name="Slide Number Placeholder 8"/>
           <p:cNvSpPr>
             <a:spLocks noGrp="1"/>
           </p:cNvSpPr>
@@ -2268,12 +2279,12 @@
     </p:spTree>
     <p:extLst>
       <p:ext uri="{BB962C8B-B14F-4D97-AF65-F5344CB8AC3E}">
-        <p14:creationId xmlns:p14="http://schemas.microsoft.com/office/powerpoint/2010/main" val="1793972555"/>
+        <p14:creationId xmlns:p14="http://schemas.microsoft.com/office/powerpoint/2010/main" val="1974411801"/>
       </p:ext>
     </p:extLst>
   </p:cSld>
   <p:clrMapOvr>
-    <a:masterClrMapping/>
+    <a:overrideClrMapping bg1="dk1" tx1="lt1" bg2="dk2" tx2="lt2" accent1="accent1" accent2="accent2" accent3="accent3" accent4="accent4" accent5="accent5" accent6="accent6" hlink="hlink" folHlink="folHlink"/>
   </p:clrMapOvr>
 </p:sldLayout>
 </file>
@@ -2297,13 +2308,7 @@
       </p:grpSpPr>
       <p:sp>
         <p:nvSpPr>
-          <p:cNvPr id="2" name="Title 1">
-            <a:extLst>
-              <a:ext uri="{FF2B5EF4-FFF2-40B4-BE49-F238E27FC236}">
-                <a16:creationId xmlns:a16="http://schemas.microsoft.com/office/drawing/2014/main" id="{010A8679-1BF0-8340-BB4A-4FC337F43A3F}"/>
-              </a:ext>
-            </a:extLst>
-          </p:cNvPr>
+          <p:cNvPr id="2" name="Title 1"/>
           <p:cNvSpPr>
             <a:spLocks noGrp="1"/>
           </p:cNvSpPr>
@@ -2320,18 +2325,13 @@
               <a:rPr lang="en-US"/>
               <a:t>Click to edit Master title style</a:t>
             </a:r>
-          </a:p>
-        </p:txBody>
-      </p:sp>
-      <p:sp>
-        <p:nvSpPr>
-          <p:cNvPr id="3" name="Content Placeholder 2">
-            <a:extLst>
-              <a:ext uri="{FF2B5EF4-FFF2-40B4-BE49-F238E27FC236}">
-                <a16:creationId xmlns:a16="http://schemas.microsoft.com/office/drawing/2014/main" id="{CBADC218-AECB-A34E-B0BF-62F8E2C26731}"/>
-              </a:ext>
-            </a:extLst>
-          </p:cNvPr>
+            <a:endParaRPr lang="en-US" dirty="0"/>
+          </a:p>
+        </p:txBody>
+      </p:sp>
+      <p:sp>
+        <p:nvSpPr>
+          <p:cNvPr id="3" name="Content Placeholder 2"/>
           <p:cNvSpPr>
             <a:spLocks noGrp="1"/>
           </p:cNvSpPr>
@@ -2341,8 +2341,8 @@
         </p:nvSpPr>
         <p:spPr>
           <a:xfrm>
-            <a:off x="838200" y="1825625"/>
-            <a:ext cx="5181600" cy="4351338"/>
+            <a:off x="1581912" y="2638044"/>
+            <a:ext cx="4271771" cy="3101982"/>
           </a:xfrm>
         </p:spPr>
         <p:txBody>
@@ -2382,18 +2382,13 @@
               <a:rPr lang="en-US"/>
               <a:t>Fifth level</a:t>
             </a:r>
-          </a:p>
-        </p:txBody>
-      </p:sp>
-      <p:sp>
-        <p:nvSpPr>
-          <p:cNvPr id="4" name="Content Placeholder 3">
-            <a:extLst>
-              <a:ext uri="{FF2B5EF4-FFF2-40B4-BE49-F238E27FC236}">
-                <a16:creationId xmlns:a16="http://schemas.microsoft.com/office/drawing/2014/main" id="{86FDF2FF-1973-E349-8BA4-D2B552638BE9}"/>
-              </a:ext>
-            </a:extLst>
-          </p:cNvPr>
+            <a:endParaRPr lang="en-US" dirty="0"/>
+          </a:p>
+        </p:txBody>
+      </p:sp>
+      <p:sp>
+        <p:nvSpPr>
+          <p:cNvPr id="4" name="Content Placeholder 3"/>
           <p:cNvSpPr>
             <a:spLocks noGrp="1"/>
           </p:cNvSpPr>
@@ -2403,8 +2398,8 @@
         </p:nvSpPr>
         <p:spPr>
           <a:xfrm>
-            <a:off x="6172200" y="1825625"/>
-            <a:ext cx="5181600" cy="4351338"/>
+            <a:off x="6338315" y="2638044"/>
+            <a:ext cx="4270247" cy="3101982"/>
           </a:xfrm>
         </p:spPr>
         <p:txBody>
@@ -2444,18 +2439,13 @@
               <a:rPr lang="en-US"/>
               <a:t>Fifth level</a:t>
             </a:r>
-          </a:p>
-        </p:txBody>
-      </p:sp>
-      <p:sp>
-        <p:nvSpPr>
-          <p:cNvPr id="5" name="Date Placeholder 4">
-            <a:extLst>
-              <a:ext uri="{FF2B5EF4-FFF2-40B4-BE49-F238E27FC236}">
-                <a16:creationId xmlns:a16="http://schemas.microsoft.com/office/drawing/2014/main" id="{4373CA23-9F87-1545-85AD-B7BA620DF76A}"/>
-              </a:ext>
-            </a:extLst>
-          </p:cNvPr>
+            <a:endParaRPr lang="en-US" dirty="0"/>
+          </a:p>
+        </p:txBody>
+      </p:sp>
+      <p:sp>
+        <p:nvSpPr>
+          <p:cNvPr id="8" name="Date Placeholder 7"/>
           <p:cNvSpPr>
             <a:spLocks noGrp="1"/>
           </p:cNvSpPr>
@@ -2478,13 +2468,7 @@
       </p:sp>
       <p:sp>
         <p:nvSpPr>
-          <p:cNvPr id="6" name="Footer Placeholder 5">
-            <a:extLst>
-              <a:ext uri="{FF2B5EF4-FFF2-40B4-BE49-F238E27FC236}">
-                <a16:creationId xmlns:a16="http://schemas.microsoft.com/office/drawing/2014/main" id="{3DDB52AB-DDC4-1943-AAFF-4F09796250FA}"/>
-              </a:ext>
-            </a:extLst>
-          </p:cNvPr>
+          <p:cNvPr id="9" name="Footer Placeholder 8"/>
           <p:cNvSpPr>
             <a:spLocks noGrp="1"/>
           </p:cNvSpPr>
@@ -2503,13 +2487,7 @@
       </p:sp>
       <p:sp>
         <p:nvSpPr>
-          <p:cNvPr id="7" name="Slide Number Placeholder 6">
-            <a:extLst>
-              <a:ext uri="{FF2B5EF4-FFF2-40B4-BE49-F238E27FC236}">
-                <a16:creationId xmlns:a16="http://schemas.microsoft.com/office/drawing/2014/main" id="{A7548229-346B-3348-9A64-C3A58812C527}"/>
-              </a:ext>
-            </a:extLst>
-          </p:cNvPr>
+          <p:cNvPr id="10" name="Slide Number Placeholder 9"/>
           <p:cNvSpPr>
             <a:spLocks noGrp="1"/>
           </p:cNvSpPr>
@@ -2533,7 +2511,7 @@
     </p:spTree>
     <p:extLst>
       <p:ext uri="{BB962C8B-B14F-4D97-AF65-F5344CB8AC3E}">
-        <p14:creationId xmlns:p14="http://schemas.microsoft.com/office/powerpoint/2010/main" val="3442926784"/>
+        <p14:creationId xmlns:p14="http://schemas.microsoft.com/office/powerpoint/2010/main" val="3843555136"/>
       </p:ext>
     </p:extLst>
   </p:cSld>
@@ -2562,69 +2540,38 @@
       </p:grpSpPr>
       <p:sp>
         <p:nvSpPr>
-          <p:cNvPr id="2" name="Title 1">
-            <a:extLst>
-              <a:ext uri="{FF2B5EF4-FFF2-40B4-BE49-F238E27FC236}">
-                <a16:creationId xmlns:a16="http://schemas.microsoft.com/office/drawing/2014/main" id="{1B8036D8-819A-D042-916B-A8C47C1B9B2A}"/>
-              </a:ext>
-            </a:extLst>
-          </p:cNvPr>
-          <p:cNvSpPr>
-            <a:spLocks noGrp="1"/>
-          </p:cNvSpPr>
-          <p:nvPr>
-            <p:ph type="title"/>
+          <p:cNvPr id="3" name="Text Placeholder 2"/>
+          <p:cNvSpPr>
+            <a:spLocks noGrp="1"/>
+          </p:cNvSpPr>
+          <p:nvPr>
+            <p:ph type="body" idx="1"/>
           </p:nvPr>
         </p:nvSpPr>
         <p:spPr>
           <a:xfrm>
-            <a:off x="839788" y="365125"/>
-            <a:ext cx="10515600" cy="1325563"/>
+            <a:off x="1583436" y="2313433"/>
+            <a:ext cx="4270248" cy="704087"/>
           </a:xfrm>
         </p:spPr>
         <p:txBody>
-          <a:bodyPr/>
-          <a:lstStyle/>
-          <a:p>
-            <a:r>
-              <a:rPr lang="en-US"/>
-              <a:t>Click to edit Master title style</a:t>
-            </a:r>
-          </a:p>
-        </p:txBody>
-      </p:sp>
-      <p:sp>
-        <p:nvSpPr>
-          <p:cNvPr id="3" name="Text Placeholder 2">
-            <a:extLst>
-              <a:ext uri="{FF2B5EF4-FFF2-40B4-BE49-F238E27FC236}">
-                <a16:creationId xmlns:a16="http://schemas.microsoft.com/office/drawing/2014/main" id="{6F7CB33E-E07D-6D40-8107-A9D64517C1EA}"/>
-              </a:ext>
-            </a:extLst>
-          </p:cNvPr>
-          <p:cNvSpPr>
-            <a:spLocks noGrp="1"/>
-          </p:cNvSpPr>
-          <p:nvPr>
-            <p:ph type="body" idx="1"/>
-          </p:nvPr>
-        </p:nvSpPr>
-        <p:spPr>
-          <a:xfrm>
-            <a:off x="839788" y="1681163"/>
-            <a:ext cx="5157787" cy="823912"/>
-          </a:xfrm>
-        </p:spPr>
-        <p:txBody>
-          <a:bodyPr anchor="b"/>
+          <a:bodyPr anchor="b" anchorCtr="1">
+            <a:normAutofit/>
+          </a:bodyPr>
           <a:lstStyle>
-            <a:lvl1pPr marL="0" indent="0">
-              <a:buNone/>
-              <a:defRPr sz="2400" b="1"/>
+            <a:lvl1pPr marL="0" indent="0" algn="ctr">
+              <a:buNone/>
+              <a:defRPr sz="1900" b="0" cap="all" spc="100" baseline="0">
+                <a:solidFill>
+                  <a:schemeClr val="accent2">
+                    <a:lumMod val="75000"/>
+                  </a:schemeClr>
+                </a:solidFill>
+              </a:defRPr>
             </a:lvl1pPr>
             <a:lvl2pPr marL="457200" indent="0">
               <a:buNone/>
-              <a:defRPr sz="2000" b="1"/>
+              <a:defRPr sz="1900" b="1"/>
             </a:lvl2pPr>
             <a:lvl3pPr marL="914400" indent="0">
               <a:buNone/>
@@ -2666,13 +2613,7 @@
       </p:sp>
       <p:sp>
         <p:nvSpPr>
-          <p:cNvPr id="4" name="Content Placeholder 3">
-            <a:extLst>
-              <a:ext uri="{FF2B5EF4-FFF2-40B4-BE49-F238E27FC236}">
-                <a16:creationId xmlns:a16="http://schemas.microsoft.com/office/drawing/2014/main" id="{627BCFEF-7A77-6B46-81F2-054D606D78C4}"/>
-              </a:ext>
-            </a:extLst>
-          </p:cNvPr>
+          <p:cNvPr id="4" name="Content Placeholder 3"/>
           <p:cNvSpPr>
             <a:spLocks noGrp="1"/>
           </p:cNvSpPr>
@@ -2682,8 +2623,8 @@
         </p:nvSpPr>
         <p:spPr>
           <a:xfrm>
-            <a:off x="839788" y="2505075"/>
-            <a:ext cx="5157787" cy="3684588"/>
+            <a:off x="1583436" y="3143250"/>
+            <a:ext cx="4270248" cy="2596776"/>
           </a:xfrm>
         </p:spPr>
         <p:txBody>
@@ -2723,41 +2664,105 @@
               <a:rPr lang="en-US"/>
               <a:t>Fifth level</a:t>
             </a:r>
-          </a:p>
-        </p:txBody>
-      </p:sp>
-      <p:sp>
-        <p:nvSpPr>
-          <p:cNvPr id="5" name="Text Placeholder 4">
-            <a:extLst>
-              <a:ext uri="{FF2B5EF4-FFF2-40B4-BE49-F238E27FC236}">
-                <a16:creationId xmlns:a16="http://schemas.microsoft.com/office/drawing/2014/main" id="{0BFAD62C-19F1-5F4B-AFD2-4FCA59FE5FF0}"/>
-              </a:ext>
-            </a:extLst>
-          </p:cNvPr>
-          <p:cNvSpPr>
-            <a:spLocks noGrp="1"/>
-          </p:cNvSpPr>
-          <p:nvPr>
-            <p:ph type="body" sz="quarter" idx="3"/>
+            <a:endParaRPr lang="en-US" dirty="0"/>
+          </a:p>
+        </p:txBody>
+      </p:sp>
+      <p:sp>
+        <p:nvSpPr>
+          <p:cNvPr id="6" name="Content Placeholder 5"/>
+          <p:cNvSpPr>
+            <a:spLocks noGrp="1"/>
+          </p:cNvSpPr>
+          <p:nvPr>
+            <p:ph sz="quarter" idx="4"/>
           </p:nvPr>
         </p:nvSpPr>
         <p:spPr>
           <a:xfrm>
-            <a:off x="6172200" y="1681163"/>
-            <a:ext cx="5183188" cy="823912"/>
+            <a:off x="6338316" y="3143250"/>
+            <a:ext cx="4253484" cy="2596776"/>
           </a:xfrm>
         </p:spPr>
         <p:txBody>
-          <a:bodyPr anchor="b"/>
+          <a:bodyPr/>
           <a:lstStyle>
-            <a:lvl1pPr marL="0" indent="0">
-              <a:buNone/>
-              <a:defRPr sz="2400" b="1"/>
+            <a:lvl5pPr>
+              <a:defRPr/>
+            </a:lvl5pPr>
+          </a:lstStyle>
+          <a:p>
+            <a:pPr lvl="0"/>
+            <a:r>
+              <a:rPr lang="en-US"/>
+              <a:t>Click to edit Master text styles</a:t>
+            </a:r>
+          </a:p>
+          <a:p>
+            <a:pPr lvl="1"/>
+            <a:r>
+              <a:rPr lang="en-US"/>
+              <a:t>Second level</a:t>
+            </a:r>
+          </a:p>
+          <a:p>
+            <a:pPr lvl="2"/>
+            <a:r>
+              <a:rPr lang="en-US"/>
+              <a:t>Third level</a:t>
+            </a:r>
+          </a:p>
+          <a:p>
+            <a:pPr lvl="3"/>
+            <a:r>
+              <a:rPr lang="en-US"/>
+              <a:t>Fourth level</a:t>
+            </a:r>
+          </a:p>
+          <a:p>
+            <a:pPr lvl="4"/>
+            <a:r>
+              <a:rPr lang="en-US"/>
+              <a:t>Fifth level</a:t>
+            </a:r>
+            <a:endParaRPr lang="en-US" dirty="0"/>
+          </a:p>
+        </p:txBody>
+      </p:sp>
+      <p:sp>
+        <p:nvSpPr>
+          <p:cNvPr id="11" name="Text Placeholder 4"/>
+          <p:cNvSpPr>
+            <a:spLocks noGrp="1"/>
+          </p:cNvSpPr>
+          <p:nvPr>
+            <p:ph type="body" sz="quarter" idx="13"/>
+          </p:nvPr>
+        </p:nvSpPr>
+        <p:spPr>
+          <a:xfrm>
+            <a:off x="6338316" y="2313433"/>
+            <a:ext cx="4270248" cy="704087"/>
+          </a:xfrm>
+        </p:spPr>
+        <p:txBody>
+          <a:bodyPr anchor="b" anchorCtr="1">
+            <a:normAutofit/>
+          </a:bodyPr>
+          <a:lstStyle>
+            <a:lvl1pPr marL="0" indent="0" algn="ctr">
+              <a:buNone/>
+              <a:defRPr sz="1900" b="0" cap="all" spc="100" baseline="0">
+                <a:solidFill>
+                  <a:schemeClr val="accent2">
+                    <a:lumMod val="75000"/>
+                  </a:schemeClr>
+                </a:solidFill>
+              </a:defRPr>
             </a:lvl1pPr>
             <a:lvl2pPr marL="457200" indent="0">
               <a:buNone/>
-              <a:defRPr sz="2000" b="1"/>
+              <a:defRPr sz="1900" b="1"/>
             </a:lvl2pPr>
             <a:lvl3pPr marL="914400" indent="0">
               <a:buNone/>
@@ -2799,75 +2804,7 @@
       </p:sp>
       <p:sp>
         <p:nvSpPr>
-          <p:cNvPr id="6" name="Content Placeholder 5">
-            <a:extLst>
-              <a:ext uri="{FF2B5EF4-FFF2-40B4-BE49-F238E27FC236}">
-                <a16:creationId xmlns:a16="http://schemas.microsoft.com/office/drawing/2014/main" id="{798A7667-1947-A744-81FB-29DEEB005082}"/>
-              </a:ext>
-            </a:extLst>
-          </p:cNvPr>
-          <p:cNvSpPr>
-            <a:spLocks noGrp="1"/>
-          </p:cNvSpPr>
-          <p:nvPr>
-            <p:ph sz="quarter" idx="4"/>
-          </p:nvPr>
-        </p:nvSpPr>
-        <p:spPr>
-          <a:xfrm>
-            <a:off x="6172200" y="2505075"/>
-            <a:ext cx="5183188" cy="3684588"/>
-          </a:xfrm>
-        </p:spPr>
-        <p:txBody>
-          <a:bodyPr/>
-          <a:lstStyle/>
-          <a:p>
-            <a:pPr lvl="0"/>
-            <a:r>
-              <a:rPr lang="en-US"/>
-              <a:t>Click to edit Master text styles</a:t>
-            </a:r>
-          </a:p>
-          <a:p>
-            <a:pPr lvl="1"/>
-            <a:r>
-              <a:rPr lang="en-US"/>
-              <a:t>Second level</a:t>
-            </a:r>
-          </a:p>
-          <a:p>
-            <a:pPr lvl="2"/>
-            <a:r>
-              <a:rPr lang="en-US"/>
-              <a:t>Third level</a:t>
-            </a:r>
-          </a:p>
-          <a:p>
-            <a:pPr lvl="3"/>
-            <a:r>
-              <a:rPr lang="en-US"/>
-              <a:t>Fourth level</a:t>
-            </a:r>
-          </a:p>
-          <a:p>
-            <a:pPr lvl="4"/>
-            <a:r>
-              <a:rPr lang="en-US"/>
-              <a:t>Fifth level</a:t>
-            </a:r>
-          </a:p>
-        </p:txBody>
-      </p:sp>
-      <p:sp>
-        <p:nvSpPr>
-          <p:cNvPr id="7" name="Date Placeholder 6">
-            <a:extLst>
-              <a:ext uri="{FF2B5EF4-FFF2-40B4-BE49-F238E27FC236}">
-                <a16:creationId xmlns:a16="http://schemas.microsoft.com/office/drawing/2014/main" id="{0E36CB8B-6DF3-EE41-92E0-3543CC3AE2F5}"/>
-              </a:ext>
-            </a:extLst>
-          </p:cNvPr>
+          <p:cNvPr id="7" name="Date Placeholder 6"/>
           <p:cNvSpPr>
             <a:spLocks noGrp="1"/>
           </p:cNvSpPr>
@@ -2890,13 +2827,7 @@
       </p:sp>
       <p:sp>
         <p:nvSpPr>
-          <p:cNvPr id="8" name="Footer Placeholder 7">
-            <a:extLst>
-              <a:ext uri="{FF2B5EF4-FFF2-40B4-BE49-F238E27FC236}">
-                <a16:creationId xmlns:a16="http://schemas.microsoft.com/office/drawing/2014/main" id="{026180E3-1904-E444-9E9F-77FB06F5B340}"/>
-              </a:ext>
-            </a:extLst>
-          </p:cNvPr>
+          <p:cNvPr id="8" name="Footer Placeholder 7"/>
           <p:cNvSpPr>
             <a:spLocks noGrp="1"/>
           </p:cNvSpPr>
@@ -2915,13 +2846,7 @@
       </p:sp>
       <p:sp>
         <p:nvSpPr>
-          <p:cNvPr id="9" name="Slide Number Placeholder 8">
-            <a:extLst>
-              <a:ext uri="{FF2B5EF4-FFF2-40B4-BE49-F238E27FC236}">
-                <a16:creationId xmlns:a16="http://schemas.microsoft.com/office/drawing/2014/main" id="{B96365D2-4EE0-2C45-A77D-B0BE88FA3E67}"/>
-              </a:ext>
-            </a:extLst>
-          </p:cNvPr>
+          <p:cNvPr id="9" name="Slide Number Placeholder 8"/>
           <p:cNvSpPr>
             <a:spLocks noGrp="1"/>
           </p:cNvSpPr>
@@ -2942,10 +2867,33 @@
           </a:p>
         </p:txBody>
       </p:sp>
+      <p:sp>
+        <p:nvSpPr>
+          <p:cNvPr id="10" name="Title 9"/>
+          <p:cNvSpPr>
+            <a:spLocks noGrp="1"/>
+          </p:cNvSpPr>
+          <p:nvPr>
+            <p:ph type="title"/>
+          </p:nvPr>
+        </p:nvSpPr>
+        <p:spPr/>
+        <p:txBody>
+          <a:bodyPr/>
+          <a:lstStyle/>
+          <a:p>
+            <a:r>
+              <a:rPr lang="en-US"/>
+              <a:t>Click to edit Master title style</a:t>
+            </a:r>
+            <a:endParaRPr lang="en-US" dirty="0"/>
+          </a:p>
+        </p:txBody>
+      </p:sp>
     </p:spTree>
     <p:extLst>
       <p:ext uri="{BB962C8B-B14F-4D97-AF65-F5344CB8AC3E}">
-        <p14:creationId xmlns:p14="http://schemas.microsoft.com/office/powerpoint/2010/main" val="569671535"/>
+        <p14:creationId xmlns:p14="http://schemas.microsoft.com/office/powerpoint/2010/main" val="3287093860"/>
       </p:ext>
     </p:extLst>
   </p:cSld>
@@ -2974,13 +2922,7 @@
       </p:grpSpPr>
       <p:sp>
         <p:nvSpPr>
-          <p:cNvPr id="2" name="Title 1">
-            <a:extLst>
-              <a:ext uri="{FF2B5EF4-FFF2-40B4-BE49-F238E27FC236}">
-                <a16:creationId xmlns:a16="http://schemas.microsoft.com/office/drawing/2014/main" id="{12461AC8-2A59-5844-AC72-8D4B757D5702}"/>
-              </a:ext>
-            </a:extLst>
-          </p:cNvPr>
+          <p:cNvPr id="2" name="Title 1"/>
           <p:cNvSpPr>
             <a:spLocks noGrp="1"/>
           </p:cNvSpPr>
@@ -2997,18 +2939,13 @@
               <a:rPr lang="en-US"/>
               <a:t>Click to edit Master title style</a:t>
             </a:r>
-          </a:p>
-        </p:txBody>
-      </p:sp>
-      <p:sp>
-        <p:nvSpPr>
-          <p:cNvPr id="3" name="Date Placeholder 2">
-            <a:extLst>
-              <a:ext uri="{FF2B5EF4-FFF2-40B4-BE49-F238E27FC236}">
-                <a16:creationId xmlns:a16="http://schemas.microsoft.com/office/drawing/2014/main" id="{6C1430CA-066E-5C4F-A737-167884CB3B3D}"/>
-              </a:ext>
-            </a:extLst>
-          </p:cNvPr>
+            <a:endParaRPr lang="en-US" dirty="0"/>
+          </a:p>
+        </p:txBody>
+      </p:sp>
+      <p:sp>
+        <p:nvSpPr>
+          <p:cNvPr id="3" name="Date Placeholder 2"/>
           <p:cNvSpPr>
             <a:spLocks noGrp="1"/>
           </p:cNvSpPr>
@@ -3031,13 +2968,7 @@
       </p:sp>
       <p:sp>
         <p:nvSpPr>
-          <p:cNvPr id="4" name="Footer Placeholder 3">
-            <a:extLst>
-              <a:ext uri="{FF2B5EF4-FFF2-40B4-BE49-F238E27FC236}">
-                <a16:creationId xmlns:a16="http://schemas.microsoft.com/office/drawing/2014/main" id="{C5FEB384-50C9-4842-8C26-6DEAB01966B1}"/>
-              </a:ext>
-            </a:extLst>
-          </p:cNvPr>
+          <p:cNvPr id="4" name="Footer Placeholder 3"/>
           <p:cNvSpPr>
             <a:spLocks noGrp="1"/>
           </p:cNvSpPr>
@@ -3056,13 +2987,7 @@
       </p:sp>
       <p:sp>
         <p:nvSpPr>
-          <p:cNvPr id="5" name="Slide Number Placeholder 4">
-            <a:extLst>
-              <a:ext uri="{FF2B5EF4-FFF2-40B4-BE49-F238E27FC236}">
-                <a16:creationId xmlns:a16="http://schemas.microsoft.com/office/drawing/2014/main" id="{5FE3BA01-7DDB-7C4A-B21C-F2030996ED09}"/>
-              </a:ext>
-            </a:extLst>
-          </p:cNvPr>
+          <p:cNvPr id="5" name="Slide Number Placeholder 4"/>
           <p:cNvSpPr>
             <a:spLocks noGrp="1"/>
           </p:cNvSpPr>
@@ -3086,7 +3011,7 @@
     </p:spTree>
     <p:extLst>
       <p:ext uri="{BB962C8B-B14F-4D97-AF65-F5344CB8AC3E}">
-        <p14:creationId xmlns:p14="http://schemas.microsoft.com/office/powerpoint/2010/main" val="653094638"/>
+        <p14:creationId xmlns:p14="http://schemas.microsoft.com/office/powerpoint/2010/main" val="1970168289"/>
       </p:ext>
     </p:extLst>
   </p:cSld>
@@ -3115,13 +3040,7 @@
       </p:grpSpPr>
       <p:sp>
         <p:nvSpPr>
-          <p:cNvPr id="2" name="Date Placeholder 1">
-            <a:extLst>
-              <a:ext uri="{FF2B5EF4-FFF2-40B4-BE49-F238E27FC236}">
-                <a16:creationId xmlns:a16="http://schemas.microsoft.com/office/drawing/2014/main" id="{A1D7EEFD-ACC9-BF46-9EB7-79E1E28BF239}"/>
-              </a:ext>
-            </a:extLst>
-          </p:cNvPr>
+          <p:cNvPr id="2" name="Date Placeholder 1"/>
           <p:cNvSpPr>
             <a:spLocks noGrp="1"/>
           </p:cNvSpPr>
@@ -3144,13 +3063,7 @@
       </p:sp>
       <p:sp>
         <p:nvSpPr>
-          <p:cNvPr id="3" name="Footer Placeholder 2">
-            <a:extLst>
-              <a:ext uri="{FF2B5EF4-FFF2-40B4-BE49-F238E27FC236}">
-                <a16:creationId xmlns:a16="http://schemas.microsoft.com/office/drawing/2014/main" id="{AA4B20EB-2106-654B-8532-D9E45A628ED5}"/>
-              </a:ext>
-            </a:extLst>
-          </p:cNvPr>
+          <p:cNvPr id="3" name="Footer Placeholder 2"/>
           <p:cNvSpPr>
             <a:spLocks noGrp="1"/>
           </p:cNvSpPr>
@@ -3169,13 +3082,7 @@
       </p:sp>
       <p:sp>
         <p:nvSpPr>
-          <p:cNvPr id="4" name="Slide Number Placeholder 3">
-            <a:extLst>
-              <a:ext uri="{FF2B5EF4-FFF2-40B4-BE49-F238E27FC236}">
-                <a16:creationId xmlns:a16="http://schemas.microsoft.com/office/drawing/2014/main" id="{B59E6BEE-6EDE-8945-84BE-43A1B0B4B5A2}"/>
-              </a:ext>
-            </a:extLst>
-          </p:cNvPr>
+          <p:cNvPr id="4" name="Slide Number Placeholder 3"/>
           <p:cNvSpPr>
             <a:spLocks noGrp="1"/>
           </p:cNvSpPr>
@@ -3199,7 +3106,7 @@
     </p:spTree>
     <p:extLst>
       <p:ext uri="{BB962C8B-B14F-4D97-AF65-F5344CB8AC3E}">
-        <p14:creationId xmlns:p14="http://schemas.microsoft.com/office/powerpoint/2010/main" val="1181938288"/>
+        <p14:creationId xmlns:p14="http://schemas.microsoft.com/office/powerpoint/2010/main" val="2009200057"/>
       </p:ext>
     </p:extLst>
   </p:cSld>
@@ -3228,159 +3135,223 @@
       </p:grpSpPr>
       <p:sp>
         <p:nvSpPr>
-          <p:cNvPr id="2" name="Title 1">
-            <a:extLst>
-              <a:ext uri="{FF2B5EF4-FFF2-40B4-BE49-F238E27FC236}">
-                <a16:creationId xmlns:a16="http://schemas.microsoft.com/office/drawing/2014/main" id="{365BDCB2-7157-BF49-8A7A-ECFE2E1912CA}"/>
-              </a:ext>
-            </a:extLst>
-          </p:cNvPr>
-          <p:cNvSpPr>
-            <a:spLocks noGrp="1"/>
-          </p:cNvSpPr>
-          <p:nvPr>
-            <p:ph type="title"/>
-          </p:nvPr>
+          <p:cNvPr id="26" name="Rectangle 25"/>
+          <p:cNvSpPr/>
+          <p:nvPr/>
         </p:nvSpPr>
         <p:spPr>
           <a:xfrm>
-            <a:off x="839788" y="457200"/>
-            <a:ext cx="3932237" cy="1600200"/>
+            <a:off x="0" y="0"/>
+            <a:ext cx="6096000" cy="6858000"/>
+          </a:xfrm>
+          <a:prstGeom prst="rect">
+            <a:avLst/>
+          </a:prstGeom>
+          <a:solidFill>
+            <a:schemeClr val="accent2"/>
+          </a:solidFill>
+          <a:ln>
+            <a:noFill/>
+          </a:ln>
+        </p:spPr>
+        <p:style>
+          <a:lnRef idx="2">
+            <a:schemeClr val="accent1">
+              <a:shade val="50000"/>
+            </a:schemeClr>
+          </a:lnRef>
+          <a:fillRef idx="1">
+            <a:schemeClr val="accent1"/>
+          </a:fillRef>
+          <a:effectRef idx="0">
+            <a:schemeClr val="accent1"/>
+          </a:effectRef>
+          <a:fontRef idx="minor">
+            <a:schemeClr val="lt1"/>
+          </a:fontRef>
+        </p:style>
+      </p:sp>
+      <p:sp>
+        <p:nvSpPr>
+          <p:cNvPr id="2" name="Title 1"/>
+          <p:cNvSpPr>
+            <a:spLocks noGrp="1"/>
+          </p:cNvSpPr>
+          <p:nvPr>
+            <p:ph type="title"/>
+          </p:nvPr>
+        </p:nvSpPr>
+        <p:spPr bwMode="blackWhite">
+          <a:xfrm>
+            <a:off x="804672" y="2243828"/>
+            <a:ext cx="4486656" cy="1141497"/>
+          </a:xfrm>
+          <a:solidFill>
+            <a:srgbClr val="FFFFFF"/>
+          </a:solidFill>
+          <a:ln>
+            <a:solidFill>
+              <a:srgbClr val="404040"/>
+            </a:solidFill>
+          </a:ln>
+        </p:spPr>
+        <p:txBody>
+          <a:bodyPr anchor="ctr" anchorCtr="1">
+            <a:normAutofit/>
+          </a:bodyPr>
+          <a:lstStyle>
+            <a:lvl1pPr>
+              <a:defRPr sz="2200">
+                <a:solidFill>
+                  <a:srgbClr val="262626"/>
+                </a:solidFill>
+              </a:defRPr>
+            </a:lvl1pPr>
+          </a:lstStyle>
+          <a:p>
+            <a:r>
+              <a:rPr lang="en-US"/>
+              <a:t>Click to edit Master title style</a:t>
+            </a:r>
+            <a:endParaRPr lang="en-US" dirty="0"/>
+          </a:p>
+        </p:txBody>
+      </p:sp>
+      <p:sp>
+        <p:nvSpPr>
+          <p:cNvPr id="3" name="Content Placeholder 2"/>
+          <p:cNvSpPr>
+            <a:spLocks noGrp="1"/>
+          </p:cNvSpPr>
+          <p:nvPr>
+            <p:ph idx="1"/>
+          </p:nvPr>
+        </p:nvSpPr>
+        <p:spPr>
+          <a:xfrm>
+            <a:off x="6736080" y="804672"/>
+            <a:ext cx="4815840" cy="5248656"/>
           </a:xfrm>
         </p:spPr>
         <p:txBody>
-          <a:bodyPr anchor="b"/>
+          <a:bodyPr>
+            <a:normAutofit/>
+          </a:bodyPr>
           <a:lstStyle>
             <a:lvl1pPr>
-              <a:defRPr sz="3200"/>
+              <a:defRPr sz="1900">
+                <a:solidFill>
+                  <a:schemeClr val="tx1"/>
+                </a:solidFill>
+              </a:defRPr>
             </a:lvl1pPr>
+            <a:lvl2pPr>
+              <a:defRPr sz="1600">
+                <a:solidFill>
+                  <a:schemeClr val="tx1"/>
+                </a:solidFill>
+              </a:defRPr>
+            </a:lvl2pPr>
+            <a:lvl3pPr>
+              <a:defRPr sz="1600">
+                <a:solidFill>
+                  <a:schemeClr val="tx1"/>
+                </a:solidFill>
+              </a:defRPr>
+            </a:lvl3pPr>
+            <a:lvl4pPr>
+              <a:defRPr sz="1600">
+                <a:solidFill>
+                  <a:schemeClr val="tx1"/>
+                </a:solidFill>
+              </a:defRPr>
+            </a:lvl4pPr>
+            <a:lvl5pPr>
+              <a:defRPr sz="1600">
+                <a:solidFill>
+                  <a:schemeClr val="tx1"/>
+                </a:solidFill>
+              </a:defRPr>
+            </a:lvl5pPr>
+            <a:lvl6pPr>
+              <a:defRPr sz="1600"/>
+            </a:lvl6pPr>
+            <a:lvl7pPr>
+              <a:defRPr sz="1600"/>
+            </a:lvl7pPr>
+            <a:lvl8pPr>
+              <a:defRPr sz="1600"/>
+            </a:lvl8pPr>
+            <a:lvl9pPr>
+              <a:defRPr sz="1600"/>
+            </a:lvl9pPr>
           </a:lstStyle>
           <a:p>
-            <a:r>
-              <a:rPr lang="en-US"/>
-              <a:t>Click to edit Master title style</a:t>
-            </a:r>
-          </a:p>
-        </p:txBody>
-      </p:sp>
-      <p:sp>
-        <p:nvSpPr>
-          <p:cNvPr id="3" name="Content Placeholder 2">
-            <a:extLst>
-              <a:ext uri="{FF2B5EF4-FFF2-40B4-BE49-F238E27FC236}">
-                <a16:creationId xmlns:a16="http://schemas.microsoft.com/office/drawing/2014/main" id="{64D55EB0-70D9-2942-BEB2-5EDFE45926B9}"/>
-              </a:ext>
-            </a:extLst>
-          </p:cNvPr>
-          <p:cNvSpPr>
-            <a:spLocks noGrp="1"/>
-          </p:cNvSpPr>
-          <p:nvPr>
-            <p:ph idx="1"/>
+            <a:pPr lvl="0"/>
+            <a:r>
+              <a:rPr lang="en-US"/>
+              <a:t>Click to edit Master text styles</a:t>
+            </a:r>
+          </a:p>
+          <a:p>
+            <a:pPr lvl="1"/>
+            <a:r>
+              <a:rPr lang="en-US"/>
+              <a:t>Second level</a:t>
+            </a:r>
+          </a:p>
+          <a:p>
+            <a:pPr lvl="2"/>
+            <a:r>
+              <a:rPr lang="en-US"/>
+              <a:t>Third level</a:t>
+            </a:r>
+          </a:p>
+          <a:p>
+            <a:pPr lvl="3"/>
+            <a:r>
+              <a:rPr lang="en-US"/>
+              <a:t>Fourth level</a:t>
+            </a:r>
+          </a:p>
+          <a:p>
+            <a:pPr lvl="4"/>
+            <a:r>
+              <a:rPr lang="en-US"/>
+              <a:t>Fifth level</a:t>
+            </a:r>
+            <a:endParaRPr lang="en-US" dirty="0"/>
+          </a:p>
+        </p:txBody>
+      </p:sp>
+      <p:sp>
+        <p:nvSpPr>
+          <p:cNvPr id="4" name="Text Placeholder 3"/>
+          <p:cNvSpPr>
+            <a:spLocks noGrp="1"/>
+          </p:cNvSpPr>
+          <p:nvPr>
+            <p:ph type="body" sz="half" idx="2"/>
           </p:nvPr>
         </p:nvSpPr>
         <p:spPr>
           <a:xfrm>
-            <a:off x="5183188" y="987425"/>
-            <a:ext cx="6172200" cy="4873625"/>
+            <a:off x="1115568" y="3549918"/>
+            <a:ext cx="3794760" cy="2194036"/>
           </a:xfrm>
         </p:spPr>
         <p:txBody>
-          <a:bodyPr/>
+          <a:bodyPr anchor="t" anchorCtr="1">
+            <a:normAutofit/>
+          </a:bodyPr>
           <a:lstStyle>
-            <a:lvl1pPr>
-              <a:defRPr sz="3200"/>
-            </a:lvl1pPr>
-            <a:lvl2pPr>
-              <a:defRPr sz="2800"/>
-            </a:lvl2pPr>
-            <a:lvl3pPr>
-              <a:defRPr sz="2400"/>
-            </a:lvl3pPr>
-            <a:lvl4pPr>
-              <a:defRPr sz="2000"/>
-            </a:lvl4pPr>
-            <a:lvl5pPr>
-              <a:defRPr sz="2000"/>
-            </a:lvl5pPr>
-            <a:lvl6pPr>
-              <a:defRPr sz="2000"/>
-            </a:lvl6pPr>
-            <a:lvl7pPr>
-              <a:defRPr sz="2000"/>
-            </a:lvl7pPr>
-            <a:lvl8pPr>
-              <a:defRPr sz="2000"/>
-            </a:lvl8pPr>
-            <a:lvl9pPr>
-              <a:defRPr sz="2000"/>
-            </a:lvl9pPr>
-          </a:lstStyle>
-          <a:p>
-            <a:pPr lvl="0"/>
-            <a:r>
-              <a:rPr lang="en-US"/>
-              <a:t>Click to edit Master text styles</a:t>
-            </a:r>
-          </a:p>
-          <a:p>
-            <a:pPr lvl="1"/>
-            <a:r>
-              <a:rPr lang="en-US"/>
-              <a:t>Second level</a:t>
-            </a:r>
-          </a:p>
-          <a:p>
-            <a:pPr lvl="2"/>
-            <a:r>
-              <a:rPr lang="en-US"/>
-              <a:t>Third level</a:t>
-            </a:r>
-          </a:p>
-          <a:p>
-            <a:pPr lvl="3"/>
-            <a:r>
-              <a:rPr lang="en-US"/>
-              <a:t>Fourth level</a:t>
-            </a:r>
-          </a:p>
-          <a:p>
-            <a:pPr lvl="4"/>
-            <a:r>
-              <a:rPr lang="en-US"/>
-              <a:t>Fifth level</a:t>
-            </a:r>
-          </a:p>
-        </p:txBody>
-      </p:sp>
-      <p:sp>
-        <p:nvSpPr>
-          <p:cNvPr id="4" name="Text Placeholder 3">
-            <a:extLst>
-              <a:ext uri="{FF2B5EF4-FFF2-40B4-BE49-F238E27FC236}">
-                <a16:creationId xmlns:a16="http://schemas.microsoft.com/office/drawing/2014/main" id="{3074BEFB-6EF3-3F44-A1DC-77DB2C46A856}"/>
-              </a:ext>
-            </a:extLst>
-          </p:cNvPr>
-          <p:cNvSpPr>
-            <a:spLocks noGrp="1"/>
-          </p:cNvSpPr>
-          <p:nvPr>
-            <p:ph type="body" sz="half" idx="2"/>
-          </p:nvPr>
-        </p:nvSpPr>
-        <p:spPr>
-          <a:xfrm>
-            <a:off x="839788" y="2057400"/>
-            <a:ext cx="3932237" cy="3811588"/>
-          </a:xfrm>
-        </p:spPr>
-        <p:txBody>
-          <a:bodyPr/>
-          <a:lstStyle>
-            <a:lvl1pPr marL="0" indent="0">
-              <a:buNone/>
-              <a:defRPr sz="1600"/>
+            <a:lvl1pPr marL="0" indent="0" algn="ctr">
+              <a:buNone/>
+              <a:defRPr sz="1500">
+                <a:solidFill>
+                  <a:srgbClr val="FFFFFF"/>
+                </a:solidFill>
+              </a:defRPr>
             </a:lvl1pPr>
             <a:lvl2pPr marL="457200" indent="0">
               <a:buNone/>
@@ -3426,13 +3397,7 @@
       </p:sp>
       <p:sp>
         <p:nvSpPr>
-          <p:cNvPr id="5" name="Date Placeholder 4">
-            <a:extLst>
-              <a:ext uri="{FF2B5EF4-FFF2-40B4-BE49-F238E27FC236}">
-                <a16:creationId xmlns:a16="http://schemas.microsoft.com/office/drawing/2014/main" id="{AB6CD090-0016-5941-A548-DDAF23CFEEB2}"/>
-              </a:ext>
-            </a:extLst>
-          </p:cNvPr>
+          <p:cNvPr id="9" name="Date Placeholder 8"/>
           <p:cNvSpPr>
             <a:spLocks noGrp="1"/>
           </p:cNvSpPr>
@@ -3455,13 +3420,7 @@
       </p:sp>
       <p:sp>
         <p:nvSpPr>
-          <p:cNvPr id="6" name="Footer Placeholder 5">
-            <a:extLst>
-              <a:ext uri="{FF2B5EF4-FFF2-40B4-BE49-F238E27FC236}">
-                <a16:creationId xmlns:a16="http://schemas.microsoft.com/office/drawing/2014/main" id="{7FBCF214-2B64-454C-ABC6-4DB783B0E980}"/>
-              </a:ext>
-            </a:extLst>
-          </p:cNvPr>
+          <p:cNvPr id="10" name="Footer Placeholder 9"/>
           <p:cNvSpPr>
             <a:spLocks noGrp="1"/>
           </p:cNvSpPr>
@@ -3469,10 +3428,25 @@
             <p:ph type="ftr" sz="quarter" idx="11"/>
           </p:nvPr>
         </p:nvSpPr>
-        <p:spPr/>
-        <p:txBody>
-          <a:bodyPr/>
-          <a:lstStyle/>
+        <p:spPr>
+          <a:xfrm>
+            <a:off x="804672" y="6236208"/>
+            <a:ext cx="5124797" cy="320040"/>
+          </a:xfrm>
+        </p:spPr>
+        <p:txBody>
+          <a:bodyPr/>
+          <a:lstStyle>
+            <a:lvl1pPr>
+              <a:defRPr>
+                <a:solidFill>
+                  <a:srgbClr val="FFFFFF">
+                    <a:alpha val="70000"/>
+                  </a:srgbClr>
+                </a:solidFill>
+              </a:defRPr>
+            </a:lvl1pPr>
+          </a:lstStyle>
           <a:p>
             <a:endParaRPr lang="en-US"/>
           </a:p>
@@ -3480,13 +3454,7 @@
       </p:sp>
       <p:sp>
         <p:nvSpPr>
-          <p:cNvPr id="7" name="Slide Number Placeholder 6">
-            <a:extLst>
-              <a:ext uri="{FF2B5EF4-FFF2-40B4-BE49-F238E27FC236}">
-                <a16:creationId xmlns:a16="http://schemas.microsoft.com/office/drawing/2014/main" id="{12476B00-FC8C-004A-A7E1-38FE57ACF488}"/>
-              </a:ext>
-            </a:extLst>
-          </p:cNvPr>
+          <p:cNvPr id="11" name="Slide Number Placeholder 10"/>
           <p:cNvSpPr>
             <a:spLocks noGrp="1"/>
           </p:cNvSpPr>
@@ -3510,7 +3478,7 @@
     </p:spTree>
     <p:extLst>
       <p:ext uri="{BB962C8B-B14F-4D97-AF65-F5344CB8AC3E}">
-        <p14:creationId xmlns:p14="http://schemas.microsoft.com/office/powerpoint/2010/main" val="500069141"/>
+        <p14:creationId xmlns:p14="http://schemas.microsoft.com/office/powerpoint/2010/main" val="2112425390"/>
       </p:ext>
     </p:extLst>
   </p:cSld>
@@ -3539,31 +3507,77 @@
       </p:grpSpPr>
       <p:sp>
         <p:nvSpPr>
-          <p:cNvPr id="2" name="Title 1">
-            <a:extLst>
-              <a:ext uri="{FF2B5EF4-FFF2-40B4-BE49-F238E27FC236}">
-                <a16:creationId xmlns:a16="http://schemas.microsoft.com/office/drawing/2014/main" id="{57C154B1-759B-214F-A26D-13F7A25D67C3}"/>
-              </a:ext>
-            </a:extLst>
-          </p:cNvPr>
-          <p:cNvSpPr>
-            <a:spLocks noGrp="1"/>
-          </p:cNvSpPr>
-          <p:nvPr>
-            <p:ph type="title"/>
-          </p:nvPr>
+          <p:cNvPr id="18" name="Rectangle 17"/>
+          <p:cNvSpPr/>
+          <p:nvPr/>
         </p:nvSpPr>
         <p:spPr>
           <a:xfrm>
-            <a:off x="839788" y="457200"/>
-            <a:ext cx="3932237" cy="1600200"/>
+            <a:off x="0" y="0"/>
+            <a:ext cx="6095999" cy="6858000"/>
           </a:xfrm>
+          <a:prstGeom prst="rect">
+            <a:avLst/>
+          </a:prstGeom>
+          <a:solidFill>
+            <a:schemeClr val="accent2"/>
+          </a:solidFill>
+          <a:ln>
+            <a:noFill/>
+          </a:ln>
         </p:spPr>
-        <p:txBody>
-          <a:bodyPr anchor="b"/>
+        <p:style>
+          <a:lnRef idx="2">
+            <a:schemeClr val="accent1">
+              <a:shade val="50000"/>
+            </a:schemeClr>
+          </a:lnRef>
+          <a:fillRef idx="1">
+            <a:schemeClr val="accent1"/>
+          </a:fillRef>
+          <a:effectRef idx="0">
+            <a:schemeClr val="accent1"/>
+          </a:effectRef>
+          <a:fontRef idx="minor">
+            <a:schemeClr val="lt1"/>
+          </a:fontRef>
+        </p:style>
+      </p:sp>
+      <p:sp>
+        <p:nvSpPr>
+          <p:cNvPr id="2" name="Title 1"/>
+          <p:cNvSpPr>
+            <a:spLocks noGrp="1"/>
+          </p:cNvSpPr>
+          <p:nvPr>
+            <p:ph type="title"/>
+          </p:nvPr>
+        </p:nvSpPr>
+        <p:spPr bwMode="blackWhite">
+          <a:xfrm>
+            <a:off x="808523" y="2243828"/>
+            <a:ext cx="4494998" cy="1134640"/>
+          </a:xfrm>
+          <a:solidFill>
+            <a:srgbClr val="FFFFFF"/>
+          </a:solidFill>
+          <a:ln>
+            <a:solidFill>
+              <a:srgbClr val="404040"/>
+            </a:solidFill>
+          </a:ln>
+        </p:spPr>
+        <p:txBody>
+          <a:bodyPr anchor="ctr" anchorCtr="1">
+            <a:noAutofit/>
+          </a:bodyPr>
           <a:lstStyle>
             <a:lvl1pPr>
-              <a:defRPr sz="3200"/>
+              <a:defRPr sz="2200">
+                <a:solidFill>
+                  <a:srgbClr val="262626"/>
+                </a:solidFill>
+              </a:defRPr>
             </a:lvl1pPr>
           </a:lstStyle>
           <a:p>
@@ -3571,20 +3585,15 @@
               <a:rPr lang="en-US"/>
               <a:t>Click to edit Master title style</a:t>
             </a:r>
-          </a:p>
-        </p:txBody>
-      </p:sp>
-      <p:sp>
-        <p:nvSpPr>
-          <p:cNvPr id="3" name="Picture Placeholder 2">
-            <a:extLst>
-              <a:ext uri="{FF2B5EF4-FFF2-40B4-BE49-F238E27FC236}">
-                <a16:creationId xmlns:a16="http://schemas.microsoft.com/office/drawing/2014/main" id="{803376DF-4DF6-ED43-A242-A45BD8747246}"/>
-              </a:ext>
-            </a:extLst>
-          </p:cNvPr>
-          <p:cNvSpPr>
-            <a:spLocks noGrp="1"/>
+            <a:endParaRPr lang="en-US" dirty="0"/>
+          </a:p>
+        </p:txBody>
+      </p:sp>
+      <p:sp>
+        <p:nvSpPr>
+          <p:cNvPr id="3" name="Picture Placeholder 2"/>
+          <p:cNvSpPr>
+            <a:spLocks noGrp="1" noChangeAspect="1"/>
           </p:cNvSpPr>
           <p:nvPr>
             <p:ph type="pic" idx="1"/>
@@ -3592,16 +3601,28 @@
         </p:nvSpPr>
         <p:spPr>
           <a:xfrm>
-            <a:off x="5183188" y="987425"/>
-            <a:ext cx="6172200" cy="4873625"/>
+            <a:off x="6095999" y="0"/>
+            <a:ext cx="6102097" cy="6858000"/>
           </a:xfrm>
+          <a:solidFill>
+            <a:schemeClr val="bg1">
+              <a:lumMod val="75000"/>
+            </a:schemeClr>
+          </a:solidFill>
         </p:spPr>
         <p:txBody>
-          <a:bodyPr/>
+          <a:bodyPr anchor="t"/>
           <a:lstStyle>
             <a:lvl1pPr marL="0" indent="0">
               <a:buNone/>
-              <a:defRPr sz="3200"/>
+              <a:defRPr sz="3200">
+                <a:solidFill>
+                  <a:schemeClr val="bg1">
+                    <a:lumMod val="85000"/>
+                    <a:lumOff val="15000"/>
+                  </a:schemeClr>
+                </a:solidFill>
+              </a:defRPr>
             </a:lvl1pPr>
             <a:lvl2pPr marL="457200" indent="0">
               <a:buNone/>
@@ -3637,19 +3658,17 @@
             </a:lvl9pPr>
           </a:lstStyle>
           <a:p>
-            <a:endParaRPr lang="en-US"/>
-          </a:p>
-        </p:txBody>
-      </p:sp>
-      <p:sp>
-        <p:nvSpPr>
-          <p:cNvPr id="4" name="Text Placeholder 3">
-            <a:extLst>
-              <a:ext uri="{FF2B5EF4-FFF2-40B4-BE49-F238E27FC236}">
-                <a16:creationId xmlns:a16="http://schemas.microsoft.com/office/drawing/2014/main" id="{5BA3EB24-A9A5-DC4B-8784-75339FC47632}"/>
-              </a:ext>
-            </a:extLst>
-          </p:cNvPr>
+            <a:r>
+              <a:rPr lang="en-US"/>
+              <a:t>Click icon to add picture</a:t>
+            </a:r>
+            <a:endParaRPr lang="en-US" dirty="0"/>
+          </a:p>
+        </p:txBody>
+      </p:sp>
+      <p:sp>
+        <p:nvSpPr>
+          <p:cNvPr id="4" name="Text Placeholder 3"/>
           <p:cNvSpPr>
             <a:spLocks noGrp="1"/>
           </p:cNvSpPr>
@@ -3659,16 +3678,22 @@
         </p:nvSpPr>
         <p:spPr>
           <a:xfrm>
-            <a:off x="839788" y="2057400"/>
-            <a:ext cx="3932237" cy="3811588"/>
+            <a:off x="1115568" y="3549918"/>
+            <a:ext cx="3794760" cy="2194037"/>
           </a:xfrm>
         </p:spPr>
         <p:txBody>
-          <a:bodyPr/>
+          <a:bodyPr anchor="t" anchorCtr="1">
+            <a:normAutofit/>
+          </a:bodyPr>
           <a:lstStyle>
-            <a:lvl1pPr marL="0" indent="0">
-              <a:buNone/>
-              <a:defRPr sz="1600"/>
+            <a:lvl1pPr marL="0" indent="0" algn="ctr">
+              <a:buNone/>
+              <a:defRPr sz="1500">
+                <a:solidFill>
+                  <a:srgbClr val="FFFFFF"/>
+                </a:solidFill>
+              </a:defRPr>
             </a:lvl1pPr>
             <a:lvl2pPr marL="457200" indent="0">
               <a:buNone/>
@@ -3714,13 +3739,7 @@
       </p:sp>
       <p:sp>
         <p:nvSpPr>
-          <p:cNvPr id="5" name="Date Placeholder 4">
-            <a:extLst>
-              <a:ext uri="{FF2B5EF4-FFF2-40B4-BE49-F238E27FC236}">
-                <a16:creationId xmlns:a16="http://schemas.microsoft.com/office/drawing/2014/main" id="{600820BF-19D3-7845-B2E4-1EFFD8E9AB5C}"/>
-              </a:ext>
-            </a:extLst>
-          </p:cNvPr>
+          <p:cNvPr id="8" name="Date Placeholder 7"/>
           <p:cNvSpPr>
             <a:spLocks noGrp="1"/>
           </p:cNvSpPr>
@@ -3731,7 +3750,22 @@
         <p:spPr/>
         <p:txBody>
           <a:bodyPr/>
-          <a:lstStyle/>
+          <a:lstStyle>
+            <a:lvl1pPr>
+              <a:defRPr>
+                <a:solidFill>
+                  <a:srgbClr val="FFFFFF"/>
+                </a:solidFill>
+                <a:effectLst>
+                  <a:outerShdw blurRad="50800" dist="38100" dir="2700000" algn="tl" rotWithShape="0">
+                    <a:prstClr val="black">
+                      <a:alpha val="43000"/>
+                    </a:prstClr>
+                  </a:outerShdw>
+                </a:effectLst>
+              </a:defRPr>
+            </a:lvl1pPr>
+          </a:lstStyle>
           <a:p>
             <a:fld id="{89F057F0-796C-3E48-9337-35B32FA723F8}" type="datetimeFigureOut">
               <a:rPr lang="en-US" smtClean="0"/>
@@ -3743,13 +3777,7 @@
       </p:sp>
       <p:sp>
         <p:nvSpPr>
-          <p:cNvPr id="6" name="Footer Placeholder 5">
-            <a:extLst>
-              <a:ext uri="{FF2B5EF4-FFF2-40B4-BE49-F238E27FC236}">
-                <a16:creationId xmlns:a16="http://schemas.microsoft.com/office/drawing/2014/main" id="{BB8EA13D-3D44-1A48-9115-06987B612D89}"/>
-              </a:ext>
-            </a:extLst>
-          </p:cNvPr>
+          <p:cNvPr id="9" name="Footer Placeholder 8"/>
           <p:cNvSpPr>
             <a:spLocks noGrp="1"/>
           </p:cNvSpPr>
@@ -3757,10 +3785,25 @@
             <p:ph type="ftr" sz="quarter" idx="11"/>
           </p:nvPr>
         </p:nvSpPr>
-        <p:spPr/>
-        <p:txBody>
-          <a:bodyPr/>
-          <a:lstStyle/>
+        <p:spPr>
+          <a:xfrm>
+            <a:off x="804672" y="6236208"/>
+            <a:ext cx="5124797" cy="320040"/>
+          </a:xfrm>
+        </p:spPr>
+        <p:txBody>
+          <a:bodyPr/>
+          <a:lstStyle>
+            <a:lvl1pPr>
+              <a:defRPr>
+                <a:solidFill>
+                  <a:srgbClr val="FFFFFF">
+                    <a:alpha val="70000"/>
+                  </a:srgbClr>
+                </a:solidFill>
+              </a:defRPr>
+            </a:lvl1pPr>
+          </a:lstStyle>
           <a:p>
             <a:endParaRPr lang="en-US"/>
           </a:p>
@@ -3768,13 +3811,7 @@
       </p:sp>
       <p:sp>
         <p:nvSpPr>
-          <p:cNvPr id="7" name="Slide Number Placeholder 6">
-            <a:extLst>
-              <a:ext uri="{FF2B5EF4-FFF2-40B4-BE49-F238E27FC236}">
-                <a16:creationId xmlns:a16="http://schemas.microsoft.com/office/drawing/2014/main" id="{20207875-6D0E-CA43-B3B7-8CB9451D304A}"/>
-              </a:ext>
-            </a:extLst>
-          </p:cNvPr>
+          <p:cNvPr id="10" name="Slide Number Placeholder 9"/>
           <p:cNvSpPr>
             <a:spLocks noGrp="1"/>
           </p:cNvSpPr>
@@ -3798,7 +3835,7 @@
     </p:spTree>
     <p:extLst>
       <p:ext uri="{BB962C8B-B14F-4D97-AF65-F5344CB8AC3E}">
-        <p14:creationId xmlns:p14="http://schemas.microsoft.com/office/powerpoint/2010/main" val="3115320002"/>
+        <p14:creationId xmlns:p14="http://schemas.microsoft.com/office/powerpoint/2010/main" val="2121757949"/>
       </p:ext>
     </p:extLst>
   </p:cSld>
@@ -3812,9 +3849,14 @@
 <p:sldMaster xmlns:a="http://schemas.openxmlformats.org/drawingml/2006/main" xmlns:r="http://schemas.openxmlformats.org/officeDocument/2006/relationships" xmlns:p="http://schemas.openxmlformats.org/presentationml/2006/main">
   <p:cSld>
     <p:bg>
-      <p:bgRef idx="1001">
-        <a:schemeClr val="bg1"/>
-      </p:bgRef>
+      <p:bgPr>
+        <a:solidFill>
+          <a:schemeClr val="bg1">
+            <a:lumMod val="95000"/>
+          </a:schemeClr>
+        </a:solidFill>
+        <a:effectLst/>
+      </p:bgPr>
     </p:bg>
     <p:spTree>
       <p:nvGrpSpPr>
@@ -3832,129 +3874,163 @@
       </p:grpSpPr>
       <p:sp>
         <p:nvSpPr>
-          <p:cNvPr id="2" name="Title Placeholder 1">
-            <a:extLst>
-              <a:ext uri="{FF2B5EF4-FFF2-40B4-BE49-F238E27FC236}">
-                <a16:creationId xmlns:a16="http://schemas.microsoft.com/office/drawing/2014/main" id="{435856BD-3B12-2B4B-9CD1-6D6C275D6B1F}"/>
-              </a:ext>
-            </a:extLst>
-          </p:cNvPr>
+          <p:cNvPr id="2" name="Title Placeholder 1"/>
           <p:cNvSpPr>
             <a:spLocks noGrp="1"/>
           </p:cNvSpPr>
           <p:nvPr>
             <p:ph type="title"/>
+          </p:nvPr>
+        </p:nvSpPr>
+        <p:spPr bwMode="black">
+          <a:xfrm>
+            <a:off x="2231136" y="964692"/>
+            <a:ext cx="7729728" cy="1188720"/>
+          </a:xfrm>
+          <a:prstGeom prst="rect">
+            <a:avLst/>
+          </a:prstGeom>
+          <a:solidFill>
+            <a:srgbClr val="FFFFFF"/>
+          </a:solidFill>
+          <a:ln w="31750" cap="sq">
+            <a:solidFill>
+              <a:srgbClr val="404040"/>
+            </a:solidFill>
+            <a:miter lim="800000"/>
+          </a:ln>
+        </p:spPr>
+        <p:txBody>
+          <a:bodyPr vert="horz" lIns="182880" tIns="182880" rIns="182880" bIns="182880" rtlCol="0" anchor="ctr">
+            <a:normAutofit/>
+          </a:bodyPr>
+          <a:lstStyle/>
+          <a:p>
+            <a:r>
+              <a:rPr lang="en-US"/>
+              <a:t>Click to edit Master title style</a:t>
+            </a:r>
+            <a:endParaRPr lang="en-US" dirty="0"/>
+          </a:p>
+        </p:txBody>
+      </p:sp>
+      <p:sp>
+        <p:nvSpPr>
+          <p:cNvPr id="3" name="Text Placeholder 2"/>
+          <p:cNvSpPr>
+            <a:spLocks noGrp="1"/>
+          </p:cNvSpPr>
+          <p:nvPr>
+            <p:ph type="body" idx="1"/>
           </p:nvPr>
         </p:nvSpPr>
         <p:spPr>
           <a:xfrm>
-            <a:off x="838200" y="365125"/>
-            <a:ext cx="10515600" cy="1325563"/>
+            <a:off x="2231136" y="2638044"/>
+            <a:ext cx="7729728" cy="3101983"/>
           </a:xfrm>
           <a:prstGeom prst="rect">
             <a:avLst/>
           </a:prstGeom>
         </p:spPr>
         <p:txBody>
-          <a:bodyPr vert="horz" lIns="91440" tIns="45720" rIns="91440" bIns="45720" rtlCol="0" anchor="ctr">
+          <a:bodyPr vert="horz" lIns="91440" tIns="45720" rIns="91440" bIns="45720" rtlCol="0">
             <a:normAutofit/>
           </a:bodyPr>
           <a:lstStyle/>
           <a:p>
-            <a:r>
-              <a:rPr lang="en-US"/>
-              <a:t>Click to edit Master title style</a:t>
-            </a:r>
-          </a:p>
-        </p:txBody>
-      </p:sp>
-      <p:sp>
-        <p:nvSpPr>
-          <p:cNvPr id="3" name="Text Placeholder 2">
-            <a:extLst>
-              <a:ext uri="{FF2B5EF4-FFF2-40B4-BE49-F238E27FC236}">
-                <a16:creationId xmlns:a16="http://schemas.microsoft.com/office/drawing/2014/main" id="{ADA5CAF3-440A-8B47-A1F0-732F9E6F6BD1}"/>
-              </a:ext>
-            </a:extLst>
-          </p:cNvPr>
-          <p:cNvSpPr>
-            <a:spLocks noGrp="1"/>
-          </p:cNvSpPr>
-          <p:nvPr>
-            <p:ph type="body" idx="1"/>
+            <a:pPr lvl="0"/>
+            <a:r>
+              <a:rPr lang="en-US"/>
+              <a:t>Click to edit Master text styles</a:t>
+            </a:r>
+          </a:p>
+          <a:p>
+            <a:pPr lvl="1"/>
+            <a:r>
+              <a:rPr lang="en-US"/>
+              <a:t>Second level</a:t>
+            </a:r>
+          </a:p>
+          <a:p>
+            <a:pPr lvl="2"/>
+            <a:r>
+              <a:rPr lang="en-US"/>
+              <a:t>Third level</a:t>
+            </a:r>
+          </a:p>
+          <a:p>
+            <a:pPr lvl="3"/>
+            <a:r>
+              <a:rPr lang="en-US"/>
+              <a:t>Fourth level</a:t>
+            </a:r>
+          </a:p>
+          <a:p>
+            <a:pPr lvl="4"/>
+            <a:r>
+              <a:rPr lang="en-US"/>
+              <a:t>Fifth level</a:t>
+            </a:r>
+            <a:endParaRPr lang="en-US" dirty="0"/>
+          </a:p>
+        </p:txBody>
+      </p:sp>
+      <p:sp>
+        <p:nvSpPr>
+          <p:cNvPr id="4" name="Date Placeholder 3"/>
+          <p:cNvSpPr>
+            <a:spLocks noGrp="1"/>
+          </p:cNvSpPr>
+          <p:nvPr>
+            <p:ph type="dt" sz="half" idx="2"/>
           </p:nvPr>
         </p:nvSpPr>
         <p:spPr>
           <a:xfrm>
-            <a:off x="838200" y="1825625"/>
-            <a:ext cx="10515600" cy="4351338"/>
+            <a:off x="7821429" y="6238816"/>
+            <a:ext cx="2753746" cy="323968"/>
           </a:xfrm>
           <a:prstGeom prst="rect">
             <a:avLst/>
           </a:prstGeom>
         </p:spPr>
         <p:txBody>
-          <a:bodyPr vert="horz" lIns="91440" tIns="45720" rIns="91440" bIns="45720" rtlCol="0">
-            <a:normAutofit/>
-          </a:bodyPr>
-          <a:lstStyle/>
-          <a:p>
-            <a:pPr lvl="0"/>
-            <a:r>
-              <a:rPr lang="en-US"/>
-              <a:t>Click to edit Master text styles</a:t>
-            </a:r>
-          </a:p>
-          <a:p>
-            <a:pPr lvl="1"/>
-            <a:r>
-              <a:rPr lang="en-US"/>
-              <a:t>Second level</a:t>
-            </a:r>
-          </a:p>
-          <a:p>
-            <a:pPr lvl="2"/>
-            <a:r>
-              <a:rPr lang="en-US"/>
-              <a:t>Third level</a:t>
-            </a:r>
-          </a:p>
-          <a:p>
-            <a:pPr lvl="3"/>
-            <a:r>
-              <a:rPr lang="en-US"/>
-              <a:t>Fourth level</a:t>
-            </a:r>
-          </a:p>
-          <a:p>
-            <a:pPr lvl="4"/>
-            <a:r>
-              <a:rPr lang="en-US"/>
-              <a:t>Fifth level</a:t>
-            </a:r>
-          </a:p>
-        </p:txBody>
-      </p:sp>
-      <p:sp>
-        <p:nvSpPr>
-          <p:cNvPr id="4" name="Date Placeholder 3">
-            <a:extLst>
-              <a:ext uri="{FF2B5EF4-FFF2-40B4-BE49-F238E27FC236}">
-                <a16:creationId xmlns:a16="http://schemas.microsoft.com/office/drawing/2014/main" id="{E48E7F8A-F0A2-ED44-966E-A6FAC831E727}"/>
-              </a:ext>
-            </a:extLst>
-          </p:cNvPr>
-          <p:cNvSpPr>
-            <a:spLocks noGrp="1"/>
-          </p:cNvSpPr>
-          <p:nvPr>
-            <p:ph type="dt" sz="half" idx="2"/>
+          <a:bodyPr vert="horz" lIns="91440" tIns="45720" rIns="91440" bIns="45720" rtlCol="0" anchor="ctr"/>
+          <a:lstStyle>
+            <a:lvl1pPr algn="r">
+              <a:defRPr sz="1050">
+                <a:solidFill>
+                  <a:schemeClr val="tx1">
+                    <a:alpha val="70000"/>
+                  </a:schemeClr>
+                </a:solidFill>
+              </a:defRPr>
+            </a:lvl1pPr>
+          </a:lstStyle>
+          <a:p>
+            <a:fld id="{89F057F0-796C-3E48-9337-35B32FA723F8}" type="datetimeFigureOut">
+              <a:rPr lang="en-US" smtClean="0"/>
+              <a:t>11/30/20</a:t>
+            </a:fld>
+            <a:endParaRPr lang="en-US"/>
+          </a:p>
+        </p:txBody>
+      </p:sp>
+      <p:sp>
+        <p:nvSpPr>
+          <p:cNvPr id="5" name="Footer Placeholder 4"/>
+          <p:cNvSpPr>
+            <a:spLocks noGrp="1"/>
+          </p:cNvSpPr>
+          <p:nvPr>
+            <p:ph type="ftr" sz="quarter" idx="3"/>
           </p:nvPr>
         </p:nvSpPr>
         <p:spPr>
           <a:xfrm>
-            <a:off x="838200" y="6356350"/>
-            <a:ext cx="2743200" cy="365125"/>
+            <a:off x="1600200" y="6236208"/>
+            <a:ext cx="5901189" cy="320040"/>
           </a:xfrm>
           <a:prstGeom prst="rect">
             <a:avLst/>
@@ -3964,101 +4040,53 @@
           <a:bodyPr vert="horz" lIns="91440" tIns="45720" rIns="91440" bIns="45720" rtlCol="0" anchor="ctr"/>
           <a:lstStyle>
             <a:lvl1pPr algn="l">
-              <a:defRPr sz="1200">
+              <a:defRPr sz="1050">
                 <a:solidFill>
                   <a:schemeClr val="tx1">
-                    <a:tint val="75000"/>
+                    <a:alpha val="70000"/>
                   </a:schemeClr>
                 </a:solidFill>
               </a:defRPr>
             </a:lvl1pPr>
           </a:lstStyle>
           <a:p>
-            <a:fld id="{89F057F0-796C-3E48-9337-35B32FA723F8}" type="datetimeFigureOut">
-              <a:rPr lang="en-US" smtClean="0"/>
-              <a:t>11/30/20</a:t>
-            </a:fld>
             <a:endParaRPr lang="en-US"/>
           </a:p>
         </p:txBody>
       </p:sp>
       <p:sp>
         <p:nvSpPr>
-          <p:cNvPr id="5" name="Footer Placeholder 4">
-            <a:extLst>
-              <a:ext uri="{FF2B5EF4-FFF2-40B4-BE49-F238E27FC236}">
-                <a16:creationId xmlns:a16="http://schemas.microsoft.com/office/drawing/2014/main" id="{045418FB-70E5-8749-89B4-D77A7D1CD92C}"/>
-              </a:ext>
-            </a:extLst>
-          </p:cNvPr>
-          <p:cNvSpPr>
-            <a:spLocks noGrp="1"/>
-          </p:cNvSpPr>
-          <p:nvPr>
-            <p:ph type="ftr" sz="quarter" idx="3"/>
+          <p:cNvPr id="6" name="Slide Number Placeholder 5"/>
+          <p:cNvSpPr>
+            <a:spLocks noGrp="1"/>
+          </p:cNvSpPr>
+          <p:nvPr>
+            <p:ph type="sldNum" sz="quarter" idx="4"/>
           </p:nvPr>
         </p:nvSpPr>
         <p:spPr>
           <a:xfrm>
-            <a:off x="4038600" y="6356350"/>
-            <a:ext cx="4114800" cy="365125"/>
+            <a:off x="10758922" y="6217920"/>
+            <a:ext cx="365760" cy="365760"/>
           </a:xfrm>
-          <a:prstGeom prst="rect">
+          <a:prstGeom prst="ellipse">
             <a:avLst/>
           </a:prstGeom>
+          <a:solidFill>
+            <a:srgbClr val="1D1D1D">
+              <a:alpha val="70000"/>
+            </a:srgbClr>
+          </a:solidFill>
         </p:spPr>
         <p:txBody>
-          <a:bodyPr vert="horz" lIns="91440" tIns="45720" rIns="91440" bIns="45720" rtlCol="0" anchor="ctr"/>
+          <a:bodyPr vert="horz" lIns="18288" tIns="45720" rIns="18288" bIns="45720" rtlCol="0" anchor="ctr">
+            <a:noAutofit/>
+          </a:bodyPr>
           <a:lstStyle>
             <a:lvl1pPr algn="ctr">
-              <a:defRPr sz="1200">
+              <a:defRPr sz="1100" spc="0" baseline="0">
                 <a:solidFill>
-                  <a:schemeClr val="tx1">
-                    <a:tint val="75000"/>
-                  </a:schemeClr>
-                </a:solidFill>
-              </a:defRPr>
-            </a:lvl1pPr>
-          </a:lstStyle>
-          <a:p>
-            <a:endParaRPr lang="en-US"/>
-          </a:p>
-        </p:txBody>
-      </p:sp>
-      <p:sp>
-        <p:nvSpPr>
-          <p:cNvPr id="6" name="Slide Number Placeholder 5">
-            <a:extLst>
-              <a:ext uri="{FF2B5EF4-FFF2-40B4-BE49-F238E27FC236}">
-                <a16:creationId xmlns:a16="http://schemas.microsoft.com/office/drawing/2014/main" id="{E6BAF138-A853-394F-8485-1F5D2B85DE51}"/>
-              </a:ext>
-            </a:extLst>
-          </p:cNvPr>
-          <p:cNvSpPr>
-            <a:spLocks noGrp="1"/>
-          </p:cNvSpPr>
-          <p:nvPr>
-            <p:ph type="sldNum" sz="quarter" idx="4"/>
-          </p:nvPr>
-        </p:nvSpPr>
-        <p:spPr>
-          <a:xfrm>
-            <a:off x="8610600" y="6356350"/>
-            <a:ext cx="2743200" cy="365125"/>
-          </a:xfrm>
-          <a:prstGeom prst="rect">
-            <a:avLst/>
-          </a:prstGeom>
-        </p:spPr>
-        <p:txBody>
-          <a:bodyPr vert="horz" lIns="91440" tIns="45720" rIns="91440" bIns="45720" rtlCol="0" anchor="ctr"/>
-          <a:lstStyle>
-            <a:lvl1pPr algn="r">
-              <a:defRPr sz="1200">
-                <a:solidFill>
-                  <a:schemeClr val="tx1">
-                    <a:tint val="75000"/>
-                  </a:schemeClr>
+                  <a:srgbClr val="FFFFFF"/>
                 </a:solidFill>
               </a:defRPr>
             </a:lvl1pPr>
@@ -4075,27 +4103,27 @@
     </p:spTree>
     <p:extLst>
       <p:ext uri="{BB962C8B-B14F-4D97-AF65-F5344CB8AC3E}">
-        <p14:creationId xmlns:p14="http://schemas.microsoft.com/office/powerpoint/2010/main" val="2426098768"/>
+        <p14:creationId xmlns:p14="http://schemas.microsoft.com/office/powerpoint/2010/main" val="106623375"/>
       </p:ext>
     </p:extLst>
   </p:cSld>
   <p:clrMap bg1="lt1" tx1="dk1" bg2="lt2" tx2="dk2" accent1="accent1" accent2="accent2" accent3="accent3" accent4="accent4" accent5="accent5" accent6="accent6" hlink="hlink" folHlink="folHlink"/>
   <p:sldLayoutIdLst>
-    <p:sldLayoutId id="2147483649" r:id="rId1"/>
-    <p:sldLayoutId id="2147483650" r:id="rId2"/>
-    <p:sldLayoutId id="2147483651" r:id="rId3"/>
-    <p:sldLayoutId id="2147483652" r:id="rId4"/>
-    <p:sldLayoutId id="2147483653" r:id="rId5"/>
-    <p:sldLayoutId id="2147483654" r:id="rId6"/>
-    <p:sldLayoutId id="2147483655" r:id="rId7"/>
-    <p:sldLayoutId id="2147483656" r:id="rId8"/>
-    <p:sldLayoutId id="2147483657" r:id="rId9"/>
-    <p:sldLayoutId id="2147483658" r:id="rId10"/>
-    <p:sldLayoutId id="2147483659" r:id="rId11"/>
+    <p:sldLayoutId id="2147483685" r:id="rId1"/>
+    <p:sldLayoutId id="2147483686" r:id="rId2"/>
+    <p:sldLayoutId id="2147483687" r:id="rId3"/>
+    <p:sldLayoutId id="2147483688" r:id="rId4"/>
+    <p:sldLayoutId id="2147483689" r:id="rId5"/>
+    <p:sldLayoutId id="2147483690" r:id="rId6"/>
+    <p:sldLayoutId id="2147483691" r:id="rId7"/>
+    <p:sldLayoutId id="2147483692" r:id="rId8"/>
+    <p:sldLayoutId id="2147483693" r:id="rId9"/>
+    <p:sldLayoutId id="2147483694" r:id="rId10"/>
+    <p:sldLayoutId id="2147483695" r:id="rId11"/>
   </p:sldLayoutIdLst>
   <p:txStyles>
     <p:titleStyle>
-      <a:lvl1pPr algn="l" defTabSz="914400" rtl="0" eaLnBrk="1" latinLnBrk="0" hangingPunct="1">
+      <a:lvl1pPr algn="ctr" defTabSz="914400" rtl="0" eaLnBrk="1" latinLnBrk="0" hangingPunct="1">
         <a:lnSpc>
           <a:spcPct val="90000"/>
         </a:lnSpc>
@@ -4103,9 +4131,9 @@
           <a:spcPct val="0"/>
         </a:spcBef>
         <a:buNone/>
-        <a:defRPr sz="4400" kern="1200">
+        <a:defRPr sz="2800" kern="1200" cap="all" spc="200" baseline="0">
           <a:solidFill>
-            <a:schemeClr val="tx1"/>
+            <a:srgbClr val="262626"/>
           </a:solidFill>
           <a:latin typeface="+mj-lt"/>
           <a:ea typeface="+mj-ea"/>
@@ -4116,104 +4144,137 @@
     <p:bodyStyle>
       <a:lvl1pPr marL="228600" indent="-228600" algn="l" defTabSz="914400" rtl="0" eaLnBrk="1" latinLnBrk="0" hangingPunct="1">
         <a:lnSpc>
-          <a:spcPct val="90000"/>
+          <a:spcPct val="100000"/>
         </a:lnSpc>
         <a:spcBef>
           <a:spcPts val="1000"/>
         </a:spcBef>
+        <a:buClr>
+          <a:schemeClr val="accent2"/>
+        </a:buClr>
         <a:buFont typeface="Arial" panose="020B0604020202020204" pitchFamily="34" charset="0"/>
         <a:buChar char="•"/>
-        <a:defRPr sz="2800" kern="1200">
+        <a:defRPr sz="1800" kern="1200">
           <a:solidFill>
-            <a:schemeClr val="tx1"/>
+            <a:schemeClr val="tx1">
+              <a:lumMod val="85000"/>
+              <a:lumOff val="15000"/>
+            </a:schemeClr>
           </a:solidFill>
           <a:latin typeface="+mn-lt"/>
           <a:ea typeface="+mn-ea"/>
           <a:cs typeface="+mn-cs"/>
         </a:defRPr>
       </a:lvl1pPr>
-      <a:lvl2pPr marL="685800" indent="-228600" algn="l" defTabSz="914400" rtl="0" eaLnBrk="1" latinLnBrk="0" hangingPunct="1">
+      <a:lvl2pPr marL="457200" indent="-228600" algn="l" defTabSz="914400" rtl="0" eaLnBrk="1" latinLnBrk="0" hangingPunct="1">
         <a:lnSpc>
-          <a:spcPct val="90000"/>
+          <a:spcPct val="100000"/>
         </a:lnSpc>
         <a:spcBef>
-          <a:spcPts val="500"/>
+          <a:spcPts val="1000"/>
         </a:spcBef>
+        <a:buClr>
+          <a:schemeClr val="accent2"/>
+        </a:buClr>
         <a:buFont typeface="Arial" panose="020B0604020202020204" pitchFamily="34" charset="0"/>
         <a:buChar char="•"/>
-        <a:defRPr sz="2400" kern="1200">
+        <a:defRPr sz="1600" kern="1200">
           <a:solidFill>
-            <a:schemeClr val="tx1"/>
+            <a:schemeClr val="tx1">
+              <a:lumMod val="85000"/>
+              <a:lumOff val="15000"/>
+            </a:schemeClr>
           </a:solidFill>
           <a:latin typeface="+mn-lt"/>
           <a:ea typeface="+mn-ea"/>
           <a:cs typeface="+mn-cs"/>
         </a:defRPr>
       </a:lvl2pPr>
-      <a:lvl3pPr marL="1143000" indent="-228600" algn="l" defTabSz="914400" rtl="0" eaLnBrk="1" latinLnBrk="0" hangingPunct="1">
+      <a:lvl3pPr marL="685800" indent="-228600" algn="l" defTabSz="914400" rtl="0" eaLnBrk="1" latinLnBrk="0" hangingPunct="1">
         <a:lnSpc>
-          <a:spcPct val="90000"/>
+          <a:spcPct val="100000"/>
         </a:lnSpc>
         <a:spcBef>
-          <a:spcPts val="500"/>
+          <a:spcPts val="1000"/>
         </a:spcBef>
+        <a:buClr>
+          <a:schemeClr val="accent2"/>
+        </a:buClr>
         <a:buFont typeface="Arial" panose="020B0604020202020204" pitchFamily="34" charset="0"/>
         <a:buChar char="•"/>
-        <a:defRPr sz="2000" kern="1200">
+        <a:defRPr sz="1600" kern="1200">
           <a:solidFill>
-            <a:schemeClr val="tx1"/>
+            <a:schemeClr val="tx1">
+              <a:lumMod val="85000"/>
+              <a:lumOff val="15000"/>
+            </a:schemeClr>
           </a:solidFill>
           <a:latin typeface="+mn-lt"/>
           <a:ea typeface="+mn-ea"/>
           <a:cs typeface="+mn-cs"/>
         </a:defRPr>
       </a:lvl3pPr>
-      <a:lvl4pPr marL="1600200" indent="-228600" algn="l" defTabSz="914400" rtl="0" eaLnBrk="1" latinLnBrk="0" hangingPunct="1">
+      <a:lvl4pPr marL="914400" indent="-228600" algn="l" defTabSz="914400" rtl="0" eaLnBrk="1" latinLnBrk="0" hangingPunct="1">
         <a:lnSpc>
-          <a:spcPct val="90000"/>
+          <a:spcPct val="100000"/>
         </a:lnSpc>
         <a:spcBef>
-          <a:spcPts val="500"/>
+          <a:spcPts val="1000"/>
         </a:spcBef>
+        <a:buClr>
+          <a:schemeClr val="accent2"/>
+        </a:buClr>
         <a:buFont typeface="Arial" panose="020B0604020202020204" pitchFamily="34" charset="0"/>
         <a:buChar char="•"/>
-        <a:defRPr sz="1800" kern="1200">
+        <a:defRPr sz="1600" kern="1200">
           <a:solidFill>
-            <a:schemeClr val="tx1"/>
+            <a:schemeClr val="tx1">
+              <a:lumMod val="85000"/>
+              <a:lumOff val="15000"/>
+            </a:schemeClr>
           </a:solidFill>
           <a:latin typeface="+mn-lt"/>
           <a:ea typeface="+mn-ea"/>
           <a:cs typeface="+mn-cs"/>
         </a:defRPr>
       </a:lvl4pPr>
-      <a:lvl5pPr marL="2057400" indent="-228600" algn="l" defTabSz="914400" rtl="0" eaLnBrk="1" latinLnBrk="0" hangingPunct="1">
+      <a:lvl5pPr marL="1143000" indent="-228600" algn="l" defTabSz="914400" rtl="0" eaLnBrk="1" latinLnBrk="0" hangingPunct="1">
         <a:lnSpc>
-          <a:spcPct val="90000"/>
+          <a:spcPct val="100000"/>
         </a:lnSpc>
         <a:spcBef>
-          <a:spcPts val="500"/>
+          <a:spcPts val="1000"/>
         </a:spcBef>
+        <a:buClr>
+          <a:schemeClr val="accent2"/>
+        </a:buClr>
         <a:buFont typeface="Arial" panose="020B0604020202020204" pitchFamily="34" charset="0"/>
         <a:buChar char="•"/>
-        <a:defRPr sz="1800" kern="1200">
+        <a:defRPr sz="1600" kern="1200">
           <a:solidFill>
-            <a:schemeClr val="tx1"/>
+            <a:schemeClr val="tx1">
+              <a:lumMod val="85000"/>
+              <a:lumOff val="15000"/>
+            </a:schemeClr>
           </a:solidFill>
           <a:latin typeface="+mn-lt"/>
           <a:ea typeface="+mn-ea"/>
           <a:cs typeface="+mn-cs"/>
         </a:defRPr>
       </a:lvl5pPr>
-      <a:lvl6pPr marL="2514600" indent="-228600" algn="l" defTabSz="914400" rtl="0" eaLnBrk="1" latinLnBrk="0" hangingPunct="1">
+      <a:lvl6pPr marL="1312863" indent="-228600" algn="l" defTabSz="914400" rtl="0" eaLnBrk="1" latinLnBrk="0" hangingPunct="1">
         <a:lnSpc>
-          <a:spcPct val="90000"/>
+          <a:spcPct val="100000"/>
         </a:lnSpc>
         <a:spcBef>
-          <a:spcPts val="500"/>
+          <a:spcPts val="1000"/>
         </a:spcBef>
+        <a:buClr>
+          <a:schemeClr val="accent2"/>
+        </a:buClr>
         <a:buFont typeface="Arial" panose="020B0604020202020204" pitchFamily="34" charset="0"/>
         <a:buChar char="•"/>
-        <a:defRPr sz="1800" kern="1200">
+        <a:defRPr sz="1600" kern="1200">
           <a:solidFill>
             <a:schemeClr val="tx1"/>
           </a:solidFill>
@@ -4222,16 +4283,19 @@
           <a:cs typeface="+mn-cs"/>
         </a:defRPr>
       </a:lvl6pPr>
-      <a:lvl7pPr marL="2971800" indent="-228600" algn="l" defTabSz="914400" rtl="0" eaLnBrk="1" latinLnBrk="0" hangingPunct="1">
+      <a:lvl7pPr marL="1484313" indent="-228600" algn="l" defTabSz="914400" rtl="0" eaLnBrk="1" latinLnBrk="0" hangingPunct="1">
         <a:lnSpc>
-          <a:spcPct val="90000"/>
+          <a:spcPct val="100000"/>
         </a:lnSpc>
         <a:spcBef>
-          <a:spcPts val="500"/>
+          <a:spcPts val="1000"/>
         </a:spcBef>
+        <a:buClr>
+          <a:schemeClr val="accent2"/>
+        </a:buClr>
         <a:buFont typeface="Arial" panose="020B0604020202020204" pitchFamily="34" charset="0"/>
         <a:buChar char="•"/>
-        <a:defRPr sz="1800" kern="1200">
+        <a:defRPr sz="1600" kern="1200">
           <a:solidFill>
             <a:schemeClr val="tx1"/>
           </a:solidFill>
@@ -4240,16 +4304,19 @@
           <a:cs typeface="+mn-cs"/>
         </a:defRPr>
       </a:lvl7pPr>
-      <a:lvl8pPr marL="3429000" indent="-228600" algn="l" defTabSz="914400" rtl="0" eaLnBrk="1" latinLnBrk="0" hangingPunct="1">
+      <a:lvl8pPr marL="1657350" indent="-228600" algn="l" defTabSz="914400" rtl="0" eaLnBrk="1" latinLnBrk="0" hangingPunct="1">
         <a:lnSpc>
-          <a:spcPct val="90000"/>
+          <a:spcPct val="100000"/>
         </a:lnSpc>
         <a:spcBef>
-          <a:spcPts val="500"/>
+          <a:spcPts val="1000"/>
         </a:spcBef>
+        <a:buClr>
+          <a:schemeClr val="accent2"/>
+        </a:buClr>
         <a:buFont typeface="Arial" panose="020B0604020202020204" pitchFamily="34" charset="0"/>
         <a:buChar char="•"/>
-        <a:defRPr sz="1800" kern="1200">
+        <a:defRPr sz="1600" kern="1200" baseline="0">
           <a:solidFill>
             <a:schemeClr val="tx1"/>
           </a:solidFill>
@@ -4258,16 +4325,19 @@
           <a:cs typeface="+mn-cs"/>
         </a:defRPr>
       </a:lvl8pPr>
-      <a:lvl9pPr marL="3886200" indent="-228600" algn="l" defTabSz="914400" rtl="0" eaLnBrk="1" latinLnBrk="0" hangingPunct="1">
+      <a:lvl9pPr marL="1882775" indent="-228600" algn="l" defTabSz="914400" rtl="0" eaLnBrk="1" latinLnBrk="0" hangingPunct="1">
         <a:lnSpc>
-          <a:spcPct val="90000"/>
+          <a:spcPct val="100000"/>
         </a:lnSpc>
         <a:spcBef>
-          <a:spcPts val="500"/>
+          <a:spcPts val="1000"/>
         </a:spcBef>
+        <a:buClr>
+          <a:schemeClr val="accent2"/>
+        </a:buClr>
         <a:buFont typeface="Arial" panose="020B0604020202020204" pitchFamily="34" charset="0"/>
         <a:buChar char="•"/>
-        <a:defRPr sz="1800" kern="1200">
+        <a:defRPr sz="1600" kern="1200" baseline="0">
           <a:solidFill>
             <a:schemeClr val="tx1"/>
           </a:solidFill>
@@ -4379,6 +4449,17 @@
 <file path=ppt/slides/slide1.xml><?xml version="1.0" encoding="utf-8"?>
 <p:sld xmlns:a="http://schemas.openxmlformats.org/drawingml/2006/main" xmlns:r="http://schemas.openxmlformats.org/officeDocument/2006/relationships" xmlns:p="http://schemas.openxmlformats.org/presentationml/2006/main">
   <p:cSld>
+    <p:bg>
+      <p:bgPr>
+        <a:solidFill>
+          <a:schemeClr val="bg2">
+            <a:tint val="95000"/>
+            <a:satMod val="170000"/>
+          </a:schemeClr>
+        </a:solidFill>
+        <a:effectLst/>
+      </p:bgPr>
+    </p:bg>
     <p:spTree>
       <p:nvGrpSpPr>
         <p:cNvPr id="1" name=""/>
@@ -4409,12 +4490,29 @@
             <p:ph type="ctrTitle"/>
           </p:nvPr>
         </p:nvSpPr>
-        <p:spPr/>
-        <p:txBody>
-          <a:bodyPr/>
-          <a:lstStyle/>
-          <a:p>
-            <a:endParaRPr lang="en-US"/>
+        <p:spPr>
+          <a:xfrm>
+            <a:off x="1600200" y="2286000"/>
+            <a:ext cx="8991600" cy="1828800"/>
+          </a:xfrm>
+          <a:noFill/>
+          <a:ln>
+            <a:solidFill>
+              <a:schemeClr val="tx1"/>
+            </a:solidFill>
+          </a:ln>
+        </p:spPr>
+        <p:txBody>
+          <a:bodyPr>
+            <a:normAutofit/>
+          </a:bodyPr>
+          <a:lstStyle/>
+          <a:p>
+            <a:endParaRPr lang="en-US" sz="3200" dirty="0">
+              <a:solidFill>
+                <a:schemeClr val="tx1"/>
+              </a:solidFill>
+            </a:endParaRPr>
           </a:p>
         </p:txBody>
       </p:sp>
@@ -4434,9 +4532,16 @@
             <p:ph type="subTitle" idx="1"/>
           </p:nvPr>
         </p:nvSpPr>
-        <p:spPr/>
-        <p:txBody>
-          <a:bodyPr/>
+        <p:spPr>
+          <a:xfrm>
+            <a:off x="2695194" y="4483290"/>
+            <a:ext cx="6801612" cy="1329208"/>
+          </a:xfrm>
+        </p:spPr>
+        <p:txBody>
+          <a:bodyPr>
+            <a:normAutofit/>
+          </a:bodyPr>
           <a:lstStyle/>
           <a:p>
             <a:endParaRPr lang="en-US"/>
@@ -4451,7 +4556,7 @@
     </p:extLst>
   </p:cSld>
   <p:clrMapOvr>
-    <a:masterClrMapping/>
+    <a:overrideClrMapping bg1="dk1" tx1="lt1" bg2="dk2" tx2="lt2" accent1="accent1" accent2="accent2" accent3="accent3" accent4="accent4" accent5="accent5" accent6="accent6" hlink="hlink" folHlink="folHlink"/>
   </p:clrMapOvr>
 </p:sld>
 </file>
@@ -4478,7 +4583,7 @@
           <p:cNvPr id="2" name="Title 1">
             <a:extLst>
               <a:ext uri="{FF2B5EF4-FFF2-40B4-BE49-F238E27FC236}">
-                <a16:creationId xmlns:a16="http://schemas.microsoft.com/office/drawing/2014/main" id="{651E992A-621B-EA4F-A1B4-31F141F2395C}"/>
+                <a16:creationId xmlns:a16="http://schemas.microsoft.com/office/drawing/2014/main" id="{FC73ECD9-7710-D242-978C-931C084DD875}"/>
               </a:ext>
             </a:extLst>
           </p:cNvPr>
@@ -4494,43 +4599,47 @@
           <a:bodyPr/>
           <a:lstStyle/>
           <a:p>
-            <a:endParaRPr lang="en-US"/>
-          </a:p>
-        </p:txBody>
-      </p:sp>
-      <p:pic>
-        <p:nvPicPr>
-          <p:cNvPr id="5" name="Content Placeholder 4">
+            <a:endParaRPr lang="en-US" dirty="0"/>
+          </a:p>
+        </p:txBody>
+      </p:sp>
+      <p:sp>
+        <p:nvSpPr>
+          <p:cNvPr id="3" name="Content Placeholder 2">
             <a:extLst>
               <a:ext uri="{FF2B5EF4-FFF2-40B4-BE49-F238E27FC236}">
-                <a16:creationId xmlns:a16="http://schemas.microsoft.com/office/drawing/2014/main" id="{4A12FC78-C0CF-0F44-8965-D31FCFBB5845}"/>
+                <a16:creationId xmlns:a16="http://schemas.microsoft.com/office/drawing/2014/main" id="{ACE9C9E1-8765-B64F-849E-F301B95D9C68}"/>
               </a:ext>
             </a:extLst>
           </p:cNvPr>
-          <p:cNvPicPr>
-            <a:picLocks noGrp="1" noChangeAspect="1"/>
-          </p:cNvPicPr>
+          <p:cNvSpPr>
+            <a:spLocks noGrp="1"/>
+          </p:cNvSpPr>
           <p:nvPr>
             <p:ph idx="1"/>
           </p:nvPr>
-        </p:nvPicPr>
-        <p:blipFill>
-          <a:blip r:embed="rId3"/>
-          <a:stretch>
-            <a:fillRect/>
-          </a:stretch>
-        </p:blipFill>
-        <p:spPr>
-          <a:xfrm>
-            <a:off x="838200" y="1027906"/>
-            <a:ext cx="8168400" cy="5105251"/>
-          </a:xfrm>
-        </p:spPr>
-      </p:pic>
+        </p:nvSpPr>
+        <p:spPr/>
+        <p:txBody>
+          <a:bodyPr/>
+          <a:lstStyle/>
+          <a:p>
+            <a:r>
+              <a:rPr lang="en-US" dirty="0"/>
+              <a:t>Relationship between pooling tests </a:t>
+            </a:r>
+            <a:r>
+              <a:rPr lang="en-US"/>
+              <a:t>and efficiency</a:t>
+            </a:r>
+            <a:endParaRPr lang="en-US" dirty="0"/>
+          </a:p>
+        </p:txBody>
+      </p:sp>
     </p:spTree>
     <p:extLst>
       <p:ext uri="{BB962C8B-B14F-4D97-AF65-F5344CB8AC3E}">
-        <p14:creationId xmlns:p14="http://schemas.microsoft.com/office/powerpoint/2010/main" val="3193289949"/>
+        <p14:creationId xmlns:p14="http://schemas.microsoft.com/office/powerpoint/2010/main" val="2086884553"/>
       </p:ext>
     </p:extLst>
   </p:cSld>
@@ -4562,7 +4671,7 @@
           <p:cNvPr id="2" name="Title 1">
             <a:extLst>
               <a:ext uri="{FF2B5EF4-FFF2-40B4-BE49-F238E27FC236}">
-                <a16:creationId xmlns:a16="http://schemas.microsoft.com/office/drawing/2014/main" id="{C960880E-8233-1F46-BA2A-253C3491EC73}"/>
+                <a16:creationId xmlns:a16="http://schemas.microsoft.com/office/drawing/2014/main" id="{57B54E7C-9CE8-934C-9AE8-5B58FC2045C7}"/>
               </a:ext>
             </a:extLst>
           </p:cNvPr>
@@ -4573,66 +4682,69 @@
             <p:ph type="title"/>
           </p:nvPr>
         </p:nvSpPr>
-        <p:spPr>
-          <a:xfrm>
-            <a:off x="81023" y="92598"/>
-            <a:ext cx="11308466" cy="1325563"/>
-          </a:xfrm>
-        </p:spPr>
-        <p:txBody>
-          <a:bodyPr>
-            <a:normAutofit/>
-          </a:bodyPr>
-          <a:lstStyle/>
-          <a:p>
-            <a:r>
-              <a:rPr lang="en-US" sz="3000" dirty="0"/>
-              <a:t>Expected PPA as function of pool size, proportion Ct&gt;</a:t>
-            </a:r>
-            <a:r>
-              <a:rPr lang="en-US" sz="3000" dirty="0" err="1"/>
-              <a:t>LoD</a:t>
-            </a:r>
-            <a:r>
-              <a:rPr lang="en-US" sz="3000" dirty="0"/>
-              <a:t>, proportion of tests positive</a:t>
-            </a:r>
-          </a:p>
-        </p:txBody>
-      </p:sp>
-      <p:pic>
-        <p:nvPicPr>
-          <p:cNvPr id="5" name="Content Placeholder 4">
+        <p:spPr/>
+        <p:txBody>
+          <a:bodyPr/>
+          <a:lstStyle/>
+          <a:p>
+            <a:endParaRPr lang="en-US" dirty="0"/>
+          </a:p>
+        </p:txBody>
+      </p:sp>
+      <p:sp>
+        <p:nvSpPr>
+          <p:cNvPr id="3" name="Content Placeholder 2">
             <a:extLst>
               <a:ext uri="{FF2B5EF4-FFF2-40B4-BE49-F238E27FC236}">
-                <a16:creationId xmlns:a16="http://schemas.microsoft.com/office/drawing/2014/main" id="{36092B21-9CD1-A545-8253-D5C99D91232B}"/>
+                <a16:creationId xmlns:a16="http://schemas.microsoft.com/office/drawing/2014/main" id="{8AC35106-8386-B445-A285-7C7A65B51A0B}"/>
               </a:ext>
             </a:extLst>
           </p:cNvPr>
-          <p:cNvPicPr>
-            <a:picLocks noGrp="1" noChangeAspect="1"/>
-          </p:cNvPicPr>
+          <p:cNvSpPr>
+            <a:spLocks noGrp="1"/>
+          </p:cNvSpPr>
           <p:nvPr>
             <p:ph idx="1"/>
           </p:nvPr>
-        </p:nvPicPr>
-        <p:blipFill>
-          <a:blip r:embed="rId3"/>
-          <a:stretch>
-            <a:fillRect/>
-          </a:stretch>
-        </p:blipFill>
-        <p:spPr>
-          <a:xfrm>
-            <a:off x="528359" y="1325563"/>
-            <a:ext cx="8458234" cy="5286397"/>
-          </a:xfrm>
-        </p:spPr>
-      </p:pic>
+        </p:nvSpPr>
+        <p:spPr/>
+        <p:txBody>
+          <a:bodyPr/>
+          <a:lstStyle/>
+          <a:p>
+            <a:pPr lvl="0"/>
+            <a:r>
+              <a:rPr lang="en-US" dirty="0"/>
+              <a:t>Ct Value = Cycle Threshold Value </a:t>
+            </a:r>
+          </a:p>
+          <a:p>
+            <a:pPr lvl="1"/>
+            <a:r>
+              <a:rPr lang="en-US" dirty="0"/>
+              <a:t>Number of PCR cycles needed to detect the virus</a:t>
+            </a:r>
+          </a:p>
+          <a:p>
+            <a:pPr lvl="1"/>
+            <a:r>
+              <a:rPr lang="en-US" dirty="0"/>
+              <a:t>No detection after 37 to 40 cycles = negative test</a:t>
+            </a:r>
+          </a:p>
+          <a:p>
+            <a:pPr lvl="1"/>
+            <a:r>
+              <a:rPr lang="en-US" dirty="0"/>
+              <a:t>Indicates how much virus an infected person has</a:t>
+            </a:r>
+          </a:p>
+        </p:txBody>
+      </p:sp>
     </p:spTree>
     <p:extLst>
       <p:ext uri="{BB962C8B-B14F-4D97-AF65-F5344CB8AC3E}">
-        <p14:creationId xmlns:p14="http://schemas.microsoft.com/office/powerpoint/2010/main" val="3349247749"/>
+        <p14:creationId xmlns:p14="http://schemas.microsoft.com/office/powerpoint/2010/main" val="1724869148"/>
       </p:ext>
     </p:extLst>
   </p:cSld>
@@ -4664,6 +4776,272 @@
           <p:cNvPr id="2" name="Title 1">
             <a:extLst>
               <a:ext uri="{FF2B5EF4-FFF2-40B4-BE49-F238E27FC236}">
+                <a16:creationId xmlns:a16="http://schemas.microsoft.com/office/drawing/2014/main" id="{231D192D-491D-484A-BAA5-B63378432556}"/>
+              </a:ext>
+            </a:extLst>
+          </p:cNvPr>
+          <p:cNvSpPr>
+            <a:spLocks noGrp="1"/>
+          </p:cNvSpPr>
+          <p:nvPr>
+            <p:ph type="title"/>
+          </p:nvPr>
+        </p:nvSpPr>
+        <p:spPr/>
+        <p:txBody>
+          <a:bodyPr/>
+          <a:lstStyle/>
+          <a:p>
+            <a:endParaRPr lang="en-US"/>
+          </a:p>
+        </p:txBody>
+      </p:sp>
+      <p:sp>
+        <p:nvSpPr>
+          <p:cNvPr id="3" name="Content Placeholder 2">
+            <a:extLst>
+              <a:ext uri="{FF2B5EF4-FFF2-40B4-BE49-F238E27FC236}">
+                <a16:creationId xmlns:a16="http://schemas.microsoft.com/office/drawing/2014/main" id="{72BDDF23-5330-464E-9DB3-1F6F1247ED96}"/>
+              </a:ext>
+            </a:extLst>
+          </p:cNvPr>
+          <p:cNvSpPr>
+            <a:spLocks noGrp="1"/>
+          </p:cNvSpPr>
+          <p:nvPr>
+            <p:ph idx="1"/>
+          </p:nvPr>
+        </p:nvSpPr>
+        <p:spPr/>
+        <p:txBody>
+          <a:bodyPr/>
+          <a:lstStyle/>
+          <a:p>
+            <a:endParaRPr lang="en-US"/>
+          </a:p>
+        </p:txBody>
+      </p:sp>
+    </p:spTree>
+    <p:extLst>
+      <p:ext uri="{BB962C8B-B14F-4D97-AF65-F5344CB8AC3E}">
+        <p14:creationId xmlns:p14="http://schemas.microsoft.com/office/powerpoint/2010/main" val="4165307320"/>
+      </p:ext>
+    </p:extLst>
+  </p:cSld>
+  <p:clrMapOvr>
+    <a:masterClrMapping/>
+  </p:clrMapOvr>
+</p:sld>
+</file>
+
+<file path=ppt/slides/slide5.xml><?xml version="1.0" encoding="utf-8"?>
+<p:sld xmlns:a="http://schemas.openxmlformats.org/drawingml/2006/main" xmlns:r="http://schemas.openxmlformats.org/officeDocument/2006/relationships" xmlns:p="http://schemas.openxmlformats.org/presentationml/2006/main">
+  <p:cSld>
+    <p:spTree>
+      <p:nvGrpSpPr>
+        <p:cNvPr id="1" name=""/>
+        <p:cNvGrpSpPr/>
+        <p:nvPr/>
+      </p:nvGrpSpPr>
+      <p:grpSpPr>
+        <a:xfrm>
+          <a:off x="0" y="0"/>
+          <a:ext cx="0" cy="0"/>
+          <a:chOff x="0" y="0"/>
+          <a:chExt cx="0" cy="0"/>
+        </a:xfrm>
+      </p:grpSpPr>
+      <p:sp>
+        <p:nvSpPr>
+          <p:cNvPr id="2" name="Title 1">
+            <a:extLst>
+              <a:ext uri="{FF2B5EF4-FFF2-40B4-BE49-F238E27FC236}">
+                <a16:creationId xmlns:a16="http://schemas.microsoft.com/office/drawing/2014/main" id="{651E992A-621B-EA4F-A1B4-31F141F2395C}"/>
+              </a:ext>
+            </a:extLst>
+          </p:cNvPr>
+          <p:cNvSpPr>
+            <a:spLocks noGrp="1"/>
+          </p:cNvSpPr>
+          <p:nvPr>
+            <p:ph type="title"/>
+          </p:nvPr>
+        </p:nvSpPr>
+        <p:spPr/>
+        <p:txBody>
+          <a:bodyPr/>
+          <a:lstStyle/>
+          <a:p>
+            <a:endParaRPr lang="en-US" dirty="0"/>
+          </a:p>
+        </p:txBody>
+      </p:sp>
+      <p:pic>
+        <p:nvPicPr>
+          <p:cNvPr id="5" name="Content Placeholder 4">
+            <a:extLst>
+              <a:ext uri="{FF2B5EF4-FFF2-40B4-BE49-F238E27FC236}">
+                <a16:creationId xmlns:a16="http://schemas.microsoft.com/office/drawing/2014/main" id="{4A12FC78-C0CF-0F44-8965-D31FCFBB5845}"/>
+              </a:ext>
+            </a:extLst>
+          </p:cNvPr>
+          <p:cNvPicPr>
+            <a:picLocks noGrp="1" noChangeAspect="1"/>
+          </p:cNvPicPr>
+          <p:nvPr>
+            <p:ph idx="1"/>
+          </p:nvPr>
+        </p:nvPicPr>
+        <p:blipFill>
+          <a:blip r:embed="rId3"/>
+          <a:stretch>
+            <a:fillRect/>
+          </a:stretch>
+        </p:blipFill>
+        <p:spPr>
+          <a:xfrm>
+            <a:off x="472440" y="1393666"/>
+            <a:ext cx="8168400" cy="5105251"/>
+          </a:xfrm>
+        </p:spPr>
+      </p:pic>
+    </p:spTree>
+    <p:extLst>
+      <p:ext uri="{BB962C8B-B14F-4D97-AF65-F5344CB8AC3E}">
+        <p14:creationId xmlns:p14="http://schemas.microsoft.com/office/powerpoint/2010/main" val="3193289949"/>
+      </p:ext>
+    </p:extLst>
+  </p:cSld>
+  <p:clrMapOvr>
+    <a:masterClrMapping/>
+  </p:clrMapOvr>
+</p:sld>
+</file>
+
+<file path=ppt/slides/slide6.xml><?xml version="1.0" encoding="utf-8"?>
+<p:sld xmlns:a="http://schemas.openxmlformats.org/drawingml/2006/main" xmlns:r="http://schemas.openxmlformats.org/officeDocument/2006/relationships" xmlns:p="http://schemas.openxmlformats.org/presentationml/2006/main">
+  <p:cSld>
+    <p:spTree>
+      <p:nvGrpSpPr>
+        <p:cNvPr id="1" name=""/>
+        <p:cNvGrpSpPr/>
+        <p:nvPr/>
+      </p:nvGrpSpPr>
+      <p:grpSpPr>
+        <a:xfrm>
+          <a:off x="0" y="0"/>
+          <a:ext cx="0" cy="0"/>
+          <a:chOff x="0" y="0"/>
+          <a:chExt cx="0" cy="0"/>
+        </a:xfrm>
+      </p:grpSpPr>
+      <p:sp>
+        <p:nvSpPr>
+          <p:cNvPr id="2" name="Title 1">
+            <a:extLst>
+              <a:ext uri="{FF2B5EF4-FFF2-40B4-BE49-F238E27FC236}">
+                <a16:creationId xmlns:a16="http://schemas.microsoft.com/office/drawing/2014/main" id="{C960880E-8233-1F46-BA2A-253C3491EC73}"/>
+              </a:ext>
+            </a:extLst>
+          </p:cNvPr>
+          <p:cNvSpPr>
+            <a:spLocks noGrp="1"/>
+          </p:cNvSpPr>
+          <p:nvPr>
+            <p:ph type="title"/>
+          </p:nvPr>
+        </p:nvSpPr>
+        <p:spPr>
+          <a:xfrm>
+            <a:off x="441767" y="92598"/>
+            <a:ext cx="11308466" cy="1325563"/>
+          </a:xfrm>
+        </p:spPr>
+        <p:txBody>
+          <a:bodyPr>
+            <a:normAutofit/>
+          </a:bodyPr>
+          <a:lstStyle/>
+          <a:p>
+            <a:r>
+              <a:rPr lang="en-US" sz="3000" dirty="0"/>
+              <a:t>Expected PPA as function of pool size, proportion Ct&gt;</a:t>
+            </a:r>
+            <a:r>
+              <a:rPr lang="en-US" sz="3000" dirty="0" err="1"/>
+              <a:t>LoD</a:t>
+            </a:r>
+            <a:r>
+              <a:rPr lang="en-US" sz="3000" dirty="0"/>
+              <a:t>, proportion of tests positive</a:t>
+            </a:r>
+          </a:p>
+        </p:txBody>
+      </p:sp>
+      <p:pic>
+        <p:nvPicPr>
+          <p:cNvPr id="5" name="Content Placeholder 4">
+            <a:extLst>
+              <a:ext uri="{FF2B5EF4-FFF2-40B4-BE49-F238E27FC236}">
+                <a16:creationId xmlns:a16="http://schemas.microsoft.com/office/drawing/2014/main" id="{36092B21-9CD1-A545-8253-D5C99D91232B}"/>
+              </a:ext>
+            </a:extLst>
+          </p:cNvPr>
+          <p:cNvPicPr>
+            <a:picLocks noGrp="1" noChangeAspect="1"/>
+          </p:cNvPicPr>
+          <p:nvPr>
+            <p:ph idx="1"/>
+          </p:nvPr>
+        </p:nvPicPr>
+        <p:blipFill>
+          <a:blip r:embed="rId3"/>
+          <a:stretch>
+            <a:fillRect/>
+          </a:stretch>
+        </p:blipFill>
+        <p:spPr>
+          <a:xfrm>
+            <a:off x="1710046" y="1418161"/>
+            <a:ext cx="8458234" cy="5286397"/>
+          </a:xfrm>
+        </p:spPr>
+      </p:pic>
+    </p:spTree>
+    <p:extLst>
+      <p:ext uri="{BB962C8B-B14F-4D97-AF65-F5344CB8AC3E}">
+        <p14:creationId xmlns:p14="http://schemas.microsoft.com/office/powerpoint/2010/main" val="3349247749"/>
+      </p:ext>
+    </p:extLst>
+  </p:cSld>
+  <p:clrMapOvr>
+    <a:masterClrMapping/>
+  </p:clrMapOvr>
+</p:sld>
+</file>
+
+<file path=ppt/slides/slide7.xml><?xml version="1.0" encoding="utf-8"?>
+<p:sld xmlns:a="http://schemas.openxmlformats.org/drawingml/2006/main" xmlns:r="http://schemas.openxmlformats.org/officeDocument/2006/relationships" xmlns:p="http://schemas.openxmlformats.org/presentationml/2006/main">
+  <p:cSld>
+    <p:spTree>
+      <p:nvGrpSpPr>
+        <p:cNvPr id="1" name=""/>
+        <p:cNvGrpSpPr/>
+        <p:nvPr/>
+      </p:nvGrpSpPr>
+      <p:grpSpPr>
+        <a:xfrm>
+          <a:off x="0" y="0"/>
+          <a:ext cx="0" cy="0"/>
+          <a:chOff x="0" y="0"/>
+          <a:chExt cx="0" cy="0"/>
+        </a:xfrm>
+      </p:grpSpPr>
+      <p:sp>
+        <p:nvSpPr>
+          <p:cNvPr id="2" name="Title 1">
+            <a:extLst>
+              <a:ext uri="{FF2B5EF4-FFF2-40B4-BE49-F238E27FC236}">
                 <a16:creationId xmlns:a16="http://schemas.microsoft.com/office/drawing/2014/main" id="{69AA7B9F-BCD5-3F4C-9DA7-97ACDCA6ED24}"/>
               </a:ext>
             </a:extLst>
@@ -4726,8 +5104,8 @@
         </p:blipFill>
         <p:spPr>
           <a:xfrm>
-            <a:off x="2614930" y="1825625"/>
-            <a:ext cx="6962140" cy="4351338"/>
+            <a:off x="3614420" y="2638425"/>
+            <a:ext cx="4963160" cy="3101975"/>
           </a:xfrm>
         </p:spPr>
       </p:pic>
@@ -4745,108 +5123,58 @@
 </file>
 
 <file path=ppt/theme/theme1.xml><?xml version="1.0" encoding="utf-8"?>
-<a:theme xmlns:a="http://schemas.openxmlformats.org/drawingml/2006/main" name="Office Theme">
+<a:theme xmlns:a="http://schemas.openxmlformats.org/drawingml/2006/main" name="Parcel">
   <a:themeElements>
-    <a:clrScheme name="Office">
+    <a:clrScheme name="Parcel">
       <a:dk1>
-        <a:sysClr val="windowText" lastClr="000000"/>
+        <a:srgbClr val="000000"/>
       </a:dk1>
       <a:lt1>
-        <a:sysClr val="window" lastClr="FFFFFF"/>
+        <a:srgbClr val="FFFFFF"/>
       </a:lt1>
       <a:dk2>
-        <a:srgbClr val="44546A"/>
+        <a:srgbClr val="4A5356"/>
       </a:dk2>
       <a:lt2>
-        <a:srgbClr val="E7E6E6"/>
+        <a:srgbClr val="E8E3CE"/>
       </a:lt2>
       <a:accent1>
-        <a:srgbClr val="4472C4"/>
+        <a:srgbClr val="F6A21D"/>
       </a:accent1>
       <a:accent2>
-        <a:srgbClr val="ED7D31"/>
+        <a:srgbClr val="9BAFB5"/>
       </a:accent2>
       <a:accent3>
-        <a:srgbClr val="A5A5A5"/>
+        <a:srgbClr val="C96731"/>
       </a:accent3>
       <a:accent4>
-        <a:srgbClr val="FFC000"/>
+        <a:srgbClr val="9CA383"/>
       </a:accent4>
       <a:accent5>
-        <a:srgbClr val="5B9BD5"/>
+        <a:srgbClr val="87795D"/>
       </a:accent5>
       <a:accent6>
-        <a:srgbClr val="70AD47"/>
+        <a:srgbClr val="A0988C"/>
       </a:accent6>
       <a:hlink>
-        <a:srgbClr val="0563C1"/>
+        <a:srgbClr val="00B0F0"/>
       </a:hlink>
       <a:folHlink>
-        <a:srgbClr val="954F72"/>
+        <a:srgbClr val="738F97"/>
       </a:folHlink>
     </a:clrScheme>
-    <a:fontScheme name="Office">
+    <a:fontScheme name="Parcel">
       <a:majorFont>
-        <a:latin typeface="Calibri Light" panose="020F0302020204030204"/>
+        <a:latin typeface="Gill Sans MT" panose="020B0502020104020203"/>
         <a:ea typeface=""/>
         <a:cs typeface=""/>
-        <a:font script="Jpan" typeface="游ゴシック Light"/>
-        <a:font script="Hang" typeface="맑은 고딕"/>
-        <a:font script="Hans" typeface="等线 Light"/>
-        <a:font script="Hant" typeface="新細明體"/>
-        <a:font script="Arab" typeface="Times New Roman"/>
-        <a:font script="Hebr" typeface="Times New Roman"/>
-        <a:font script="Thai" typeface="Angsana New"/>
-        <a:font script="Ethi" typeface="Nyala"/>
-        <a:font script="Beng" typeface="Vrinda"/>
-        <a:font script="Gujr" typeface="Shruti"/>
-        <a:font script="Khmr" typeface="MoolBoran"/>
-        <a:font script="Knda" typeface="Tunga"/>
-        <a:font script="Guru" typeface="Raavi"/>
-        <a:font script="Cans" typeface="Euphemia"/>
-        <a:font script="Cher" typeface="Plantagenet Cherokee"/>
-        <a:font script="Yiii" typeface="Microsoft Yi Baiti"/>
-        <a:font script="Tibt" typeface="Microsoft Himalaya"/>
-        <a:font script="Thaa" typeface="MV Boli"/>
-        <a:font script="Deva" typeface="Mangal"/>
-        <a:font script="Telu" typeface="Gautami"/>
-        <a:font script="Taml" typeface="Latha"/>
-        <a:font script="Syrc" typeface="Estrangelo Edessa"/>
-        <a:font script="Orya" typeface="Kalinga"/>
-        <a:font script="Mlym" typeface="Kartika"/>
-        <a:font script="Laoo" typeface="DokChampa"/>
-        <a:font script="Sinh" typeface="Iskoola Pota"/>
-        <a:font script="Mong" typeface="Mongolian Baiti"/>
-        <a:font script="Viet" typeface="Times New Roman"/>
-        <a:font script="Uigh" typeface="Microsoft Uighur"/>
-        <a:font script="Geor" typeface="Sylfaen"/>
-        <a:font script="Armn" typeface="Arial"/>
-        <a:font script="Bugi" typeface="Leelawadee UI"/>
-        <a:font script="Bopo" typeface="Microsoft JhengHei"/>
-        <a:font script="Java" typeface="Javanese Text"/>
-        <a:font script="Lisu" typeface="Segoe UI"/>
-        <a:font script="Mymr" typeface="Myanmar Text"/>
-        <a:font script="Nkoo" typeface="Ebrima"/>
-        <a:font script="Olck" typeface="Nirmala UI"/>
-        <a:font script="Osma" typeface="Ebrima"/>
-        <a:font script="Phag" typeface="Phagspa"/>
-        <a:font script="Syrn" typeface="Estrangelo Edessa"/>
-        <a:font script="Syrj" typeface="Estrangelo Edessa"/>
-        <a:font script="Syre" typeface="Estrangelo Edessa"/>
-        <a:font script="Sora" typeface="Nirmala UI"/>
-        <a:font script="Tale" typeface="Microsoft Tai Le"/>
-        <a:font script="Talu" typeface="Microsoft New Tai Lue"/>
-        <a:font script="Tfng" typeface="Ebrima"/>
-      </a:majorFont>
-      <a:minorFont>
-        <a:latin typeface="Calibri" panose="020F0502020204030204"/>
-        <a:ea typeface=""/>
-        <a:cs typeface=""/>
-        <a:font script="Jpan" typeface="游ゴシック"/>
-        <a:font script="Hang" typeface="맑은 고딕"/>
-        <a:font script="Hans" typeface="等线"/>
-        <a:font script="Hant" typeface="新細明體"/>
-        <a:font script="Arab" typeface="Arial"/>
+        <a:font script="Grek" typeface="Corbel"/>
+        <a:font script="Cyrl" typeface="Corbel"/>
+        <a:font script="Jpan" typeface="HGｺﾞｼｯｸE"/>
+        <a:font script="Hang" typeface="휴먼매직체"/>
+        <a:font script="Hans" typeface="华文中宋"/>
+        <a:font script="Hant" typeface="微軟正黑體"/>
+        <a:font script="Arab" typeface="Majalla UI"/>
         <a:font script="Hebr" typeface="Arial"/>
         <a:font script="Thai" typeface="Cordia New"/>
         <a:font script="Ethi" typeface="Nyala"/>
@@ -4869,29 +5197,49 @@
         <a:font script="Laoo" typeface="DokChampa"/>
         <a:font script="Sinh" typeface="Iskoola Pota"/>
         <a:font script="Mong" typeface="Mongolian Baiti"/>
-        <a:font script="Viet" typeface="Arial"/>
+        <a:font script="Viet" typeface="Tahoma"/>
         <a:font script="Uigh" typeface="Microsoft Uighur"/>
         <a:font script="Geor" typeface="Sylfaen"/>
-        <a:font script="Armn" typeface="Arial"/>
-        <a:font script="Bugi" typeface="Leelawadee UI"/>
-        <a:font script="Bopo" typeface="Microsoft JhengHei"/>
-        <a:font script="Java" typeface="Javanese Text"/>
-        <a:font script="Lisu" typeface="Segoe UI"/>
-        <a:font script="Mymr" typeface="Myanmar Text"/>
-        <a:font script="Nkoo" typeface="Ebrima"/>
-        <a:font script="Olck" typeface="Nirmala UI"/>
-        <a:font script="Osma" typeface="Ebrima"/>
-        <a:font script="Phag" typeface="Phagspa"/>
-        <a:font script="Syrn" typeface="Estrangelo Edessa"/>
-        <a:font script="Syrj" typeface="Estrangelo Edessa"/>
-        <a:font script="Syre" typeface="Estrangelo Edessa"/>
-        <a:font script="Sora" typeface="Nirmala UI"/>
-        <a:font script="Tale" typeface="Microsoft Tai Le"/>
-        <a:font script="Talu" typeface="Microsoft New Tai Lue"/>
-        <a:font script="Tfng" typeface="Ebrima"/>
+      </a:majorFont>
+      <a:minorFont>
+        <a:latin typeface="Gill Sans MT" panose="020B0502020104020203"/>
+        <a:ea typeface=""/>
+        <a:cs typeface=""/>
+        <a:font script="Grek" typeface="Corbel"/>
+        <a:font script="Cyrl" typeface="Corbel"/>
+        <a:font script="Jpan" typeface="HGｺﾞｼｯｸE"/>
+        <a:font script="Hang" typeface="휴먼매직체"/>
+        <a:font script="Hans" typeface="华文中宋"/>
+        <a:font script="Hant" typeface="微軟正黑體"/>
+        <a:font script="Arab" typeface="Majalla UI"/>
+        <a:font script="Hebr" typeface="Arial"/>
+        <a:font script="Thai" typeface="Cordia New"/>
+        <a:font script="Ethi" typeface="Nyala"/>
+        <a:font script="Beng" typeface="Vrinda"/>
+        <a:font script="Gujr" typeface="Shruti"/>
+        <a:font script="Khmr" typeface="DaunPenh"/>
+        <a:font script="Knda" typeface="Tunga"/>
+        <a:font script="Guru" typeface="Raavi"/>
+        <a:font script="Cans" typeface="Euphemia"/>
+        <a:font script="Cher" typeface="Plantagenet Cherokee"/>
+        <a:font script="Yiii" typeface="Microsoft Yi Baiti"/>
+        <a:font script="Tibt" typeface="Microsoft Himalaya"/>
+        <a:font script="Thaa" typeface="MV Boli"/>
+        <a:font script="Deva" typeface="Mangal"/>
+        <a:font script="Telu" typeface="Gautami"/>
+        <a:font script="Taml" typeface="Latha"/>
+        <a:font script="Syrc" typeface="Estrangelo Edessa"/>
+        <a:font script="Orya" typeface="Kalinga"/>
+        <a:font script="Mlym" typeface="Kartika"/>
+        <a:font script="Laoo" typeface="DokChampa"/>
+        <a:font script="Sinh" typeface="Iskoola Pota"/>
+        <a:font script="Mong" typeface="Mongolian Baiti"/>
+        <a:font script="Viet" typeface="Tahoma"/>
+        <a:font script="Uigh" typeface="Microsoft Uighur"/>
+        <a:font script="Geor" typeface="Sylfaen"/>
       </a:minorFont>
     </a:fontScheme>
-    <a:fmtScheme name="Office">
+    <a:fmtScheme name="Parcel">
       <a:fillStyleLst>
         <a:solidFill>
           <a:schemeClr val="phClr"/>
@@ -4900,23 +5248,16 @@
           <a:gsLst>
             <a:gs pos="0">
               <a:schemeClr val="phClr">
-                <a:lumMod val="110000"/>
-                <a:satMod val="105000"/>
-                <a:tint val="67000"/>
-              </a:schemeClr>
-            </a:gs>
-            <a:gs pos="50000">
-              <a:schemeClr val="phClr">
-                <a:lumMod val="105000"/>
-                <a:satMod val="103000"/>
-                <a:tint val="73000"/>
+                <a:tint val="80000"/>
+                <a:satMod val="107000"/>
+                <a:lumMod val="103000"/>
               </a:schemeClr>
             </a:gs>
             <a:gs pos="100000">
               <a:schemeClr val="phClr">
-                <a:lumMod val="105000"/>
+                <a:tint val="82000"/>
                 <a:satMod val="109000"/>
-                <a:tint val="81000"/>
+                <a:lumMod val="103000"/>
               </a:schemeClr>
             </a:gs>
           </a:gsLst>
@@ -4926,23 +5267,23 @@
           <a:gsLst>
             <a:gs pos="0">
               <a:schemeClr val="phClr">
-                <a:satMod val="103000"/>
+                <a:tint val="97000"/>
+                <a:satMod val="100000"/>
                 <a:lumMod val="102000"/>
-                <a:tint val="94000"/>
               </a:schemeClr>
             </a:gs>
             <a:gs pos="50000">
               <a:schemeClr val="phClr">
-                <a:satMod val="110000"/>
+                <a:shade val="100000"/>
+                <a:satMod val="103000"/>
                 <a:lumMod val="100000"/>
-                <a:shade val="100000"/>
               </a:schemeClr>
             </a:gs>
             <a:gs pos="100000">
               <a:schemeClr val="phClr">
+                <a:shade val="93000"/>
+                <a:satMod val="110000"/>
                 <a:lumMod val="99000"/>
-                <a:satMod val="120000"/>
-                <a:shade val="78000"/>
               </a:schemeClr>
             </a:gs>
           </a:gsLst>
@@ -4955,21 +5296,18 @@
             <a:schemeClr val="phClr"/>
           </a:solidFill>
           <a:prstDash val="solid"/>
-          <a:miter lim="800000"/>
         </a:ln>
         <a:ln w="12700" cap="flat" cmpd="sng" algn="ctr">
           <a:solidFill>
             <a:schemeClr val="phClr"/>
           </a:solidFill>
           <a:prstDash val="solid"/>
-          <a:miter lim="800000"/>
         </a:ln>
-        <a:ln w="19050" cap="flat" cmpd="sng" algn="ctr">
+        <a:ln w="31750" cap="flat" cmpd="sng" algn="ctr">
           <a:solidFill>
             <a:schemeClr val="phClr"/>
           </a:solidFill>
           <a:prstDash val="solid"/>
-          <a:miter lim="800000"/>
         </a:ln>
       </a:lnStyleLst>
       <a:effectStyleLst>
@@ -4981,12 +5319,21 @@
         </a:effectStyle>
         <a:effectStyle>
           <a:effectLst>
-            <a:outerShdw blurRad="57150" dist="19050" dir="5400000" algn="ctr" rotWithShape="0">
+            <a:outerShdw blurRad="55880" dist="15240" dir="5400000" algn="ctr" rotWithShape="0">
               <a:srgbClr val="000000">
-                <a:alpha val="63000"/>
+                <a:alpha val="45000"/>
               </a:srgbClr>
             </a:outerShdw>
           </a:effectLst>
+          <a:scene3d>
+            <a:camera prst="orthographicFront">
+              <a:rot lat="0" lon="0" rev="0"/>
+            </a:camera>
+            <a:lightRig rig="brightRoom" dir="tl"/>
+          </a:scene3d>
+          <a:sp3d prstMaterial="dkEdge">
+            <a:bevelT w="0" h="0"/>
+          </a:sp3d>
         </a:effectStyle>
       </a:effectStyleLst>
       <a:bgFillStyleLst>
@@ -5003,28 +5350,24 @@
           <a:gsLst>
             <a:gs pos="0">
               <a:schemeClr val="phClr">
-                <a:tint val="93000"/>
-                <a:satMod val="150000"/>
-                <a:shade val="98000"/>
-                <a:lumMod val="102000"/>
-              </a:schemeClr>
-            </a:gs>
-            <a:gs pos="50000">
-              <a:schemeClr val="phClr">
-                <a:tint val="98000"/>
-                <a:satMod val="130000"/>
-                <a:shade val="90000"/>
-                <a:lumMod val="103000"/>
+                <a:tint val="97000"/>
+                <a:shade val="100000"/>
+                <a:satMod val="185000"/>
+                <a:lumMod val="120000"/>
               </a:schemeClr>
             </a:gs>
             <a:gs pos="100000">
               <a:schemeClr val="phClr">
-                <a:shade val="63000"/>
-                <a:satMod val="120000"/>
+                <a:tint val="96000"/>
+                <a:shade val="95000"/>
+                <a:satMod val="215000"/>
+                <a:lumMod val="80000"/>
               </a:schemeClr>
             </a:gs>
           </a:gsLst>
-          <a:lin ang="5400000" scaled="0"/>
+          <a:path path="circle">
+            <a:fillToRect l="50000" t="55000" r="125000" b="100000"/>
+          </a:path>
         </a:gradFill>
       </a:bgFillStyleLst>
     </a:fmtScheme>
@@ -5033,7 +5376,7 @@
   <a:extraClrSchemeLst/>
   <a:extLst>
     <a:ext uri="{05A4C25C-085E-4340-85A3-A5531E510DB2}">
-      <thm15:themeFamily xmlns:thm15="http://schemas.microsoft.com/office/thememl/2012/main" name="Office Theme" id="{62F939B6-93AF-4DB8-9C6B-D6C7DFDC589F}" vid="{4A3C46E8-61CC-4603-A589-7422A47A8E4A}"/>
+      <thm15:themeFamily xmlns:thm15="http://schemas.microsoft.com/office/thememl/2012/main" name="Parcel" id="{8BEC4385-4EB9-4D53-BFB5-0EA123736B6D}" vid="{4DB32801-28C0-48B0-8C1D-A9A58613615A}"/>
     </a:ext>
   </a:extLst>
 </a:theme>

</xml_diff>